<commit_message>
Implementation of Laplacian filters to find the edges in the images
</commit_message>
<xml_diff>
--- a/Presentation/22BEC032-ARYAN-PURI.pptx
+++ b/Presentation/22BEC032-ARYAN-PURI.pptx
@@ -1,11 +1,11 @@
 
 <file path=ppt/presentation.xml><?xml version="1.0" encoding="utf-8"?>
-<p:presentation xmlns:a="http://schemas.openxmlformats.org/drawingml/2006/main" xmlns:r="http://schemas.openxmlformats.org/officeDocument/2006/relationships" xmlns:p="http://schemas.openxmlformats.org/presentationml/2006/main" saveSubsetFonts="1">
+<p:presentation xmlns:a="http://schemas.openxmlformats.org/drawingml/2006/main" xmlns:r="http://schemas.openxmlformats.org/officeDocument/2006/relationships" xmlns:p="http://schemas.openxmlformats.org/presentationml/2006/main" showSpecialPlsOnTitleSld="0" saveSubsetFonts="1">
   <p:sldMasterIdLst>
     <p:sldMasterId id="2147483660" r:id="rId1"/>
   </p:sldMasterIdLst>
   <p:notesMasterIdLst>
-    <p:notesMasterId r:id="rId17"/>
+    <p:notesMasterId r:id="rId19"/>
   </p:notesMasterIdLst>
   <p:sldIdLst>
     <p:sldId id="256" r:id="rId2"/>
@@ -20,9 +20,11 @@
     <p:sldId id="266" r:id="rId11"/>
     <p:sldId id="265" r:id="rId12"/>
     <p:sldId id="272" r:id="rId13"/>
-    <p:sldId id="264" r:id="rId14"/>
+    <p:sldId id="277" r:id="rId14"/>
     <p:sldId id="259" r:id="rId15"/>
-    <p:sldId id="274" r:id="rId16"/>
+    <p:sldId id="276" r:id="rId16"/>
+    <p:sldId id="274" r:id="rId17"/>
+    <p:sldId id="275" r:id="rId18"/>
   </p:sldIdLst>
   <p:sldSz cx="12192000" cy="6858000"/>
   <p:notesSz cx="6858000" cy="9144000"/>
@@ -959,7 +961,7 @@
         <a:p>
           <a:r>
             <a:rPr lang="en-US" dirty="0" smtClean="0"/>
-            <a:t>What does Computer Vison means</a:t>
+            <a:t>What does Computer Vision means</a:t>
           </a:r>
           <a:endParaRPr lang="en-US" dirty="0"/>
         </a:p>
@@ -1033,7 +1035,7 @@
         <a:p>
           <a:r>
             <a:rPr lang="en-US" dirty="0" smtClean="0"/>
-            <a:t>How Computer Vision Works</a:t>
+            <a:t>How it Works</a:t>
           </a:r>
           <a:endParaRPr lang="en-US" dirty="0"/>
         </a:p>
@@ -1070,7 +1072,7 @@
         <a:p>
           <a:r>
             <a:rPr lang="en-US" dirty="0" smtClean="0"/>
-            <a:t>Applications of Computer Vision</a:t>
+            <a:t>Applications</a:t>
           </a:r>
           <a:endParaRPr lang="en-US" dirty="0"/>
         </a:p>
@@ -1489,14 +1491,14 @@
       </dsp:nvSpPr>
       <dsp:spPr>
         <a:xfrm>
-          <a:off x="-5198831" y="-796648"/>
-          <a:ext cx="6193577" cy="6193577"/>
+          <a:off x="-5411676" y="-829076"/>
+          <a:ext cx="6446970" cy="6446970"/>
         </a:xfrm>
         <a:prstGeom prst="blockArc">
           <a:avLst>
             <a:gd name="adj1" fmla="val 18900000"/>
             <a:gd name="adj2" fmla="val 2700000"/>
-            <a:gd name="adj3" fmla="val 349"/>
+            <a:gd name="adj3" fmla="val 335"/>
           </a:avLst>
         </a:prstGeom>
         <a:noFill/>
@@ -1534,8 +1536,8 @@
       </dsp:nvSpPr>
       <dsp:spPr>
         <a:xfrm>
-          <a:off x="322709" y="209128"/>
-          <a:ext cx="9521876" cy="418073"/>
+          <a:off x="335935" y="217699"/>
+          <a:ext cx="9506133" cy="435207"/>
         </a:xfrm>
         <a:prstGeom prst="rect">
           <a:avLst/>
@@ -1577,12 +1579,12 @@
         </a:fontRef>
       </dsp:style>
       <dsp:txBody>
-        <a:bodyPr spcFirstLastPara="0" vert="horz" wrap="square" lIns="331846" tIns="58420" rIns="58420" bIns="58420" numCol="1" spcCol="1270" anchor="ctr" anchorCtr="0">
+        <a:bodyPr spcFirstLastPara="0" vert="horz" wrap="square" lIns="345446" tIns="60960" rIns="60960" bIns="60960" numCol="1" spcCol="1270" anchor="ctr" anchorCtr="0">
           <a:noAutofit/>
         </a:bodyPr>
         <a:lstStyle/>
         <a:p>
-          <a:pPr lvl="0" algn="l" defTabSz="1022350">
+          <a:pPr lvl="0" algn="l" defTabSz="1066800">
             <a:lnSpc>
               <a:spcPct val="90000"/>
             </a:lnSpc>
@@ -1594,15 +1596,15 @@
             </a:spcAft>
           </a:pPr>
           <a:r>
-            <a:rPr lang="en-US" sz="2300" kern="1200" dirty="0" smtClean="0"/>
-            <a:t>What does Computer Vison means</a:t>
+            <a:rPr lang="en-US" sz="2400" kern="1200" dirty="0" smtClean="0"/>
+            <a:t>What does Computer Vision means</a:t>
           </a:r>
-          <a:endParaRPr lang="en-US" sz="2300" kern="1200" dirty="0"/>
+          <a:endParaRPr lang="en-US" sz="2400" kern="1200" dirty="0"/>
         </a:p>
       </dsp:txBody>
       <dsp:txXfrm>
-        <a:off x="322709" y="209128"/>
-        <a:ext cx="9521876" cy="418073"/>
+        <a:off x="335935" y="217699"/>
+        <a:ext cx="9506133" cy="435207"/>
       </dsp:txXfrm>
     </dsp:sp>
     <dsp:sp modelId="{BF688883-4860-474B-B877-22ED24DF2652}">
@@ -1612,8 +1614,8 @@
       </dsp:nvSpPr>
       <dsp:spPr>
         <a:xfrm>
-          <a:off x="61413" y="156869"/>
-          <a:ext cx="522591" cy="522591"/>
+          <a:off x="63930" y="163298"/>
+          <a:ext cx="544009" cy="544009"/>
         </a:xfrm>
         <a:prstGeom prst="ellipse">
           <a:avLst/>
@@ -1659,8 +1661,8 @@
       </dsp:nvSpPr>
       <dsp:spPr>
         <a:xfrm>
-          <a:off x="701312" y="836607"/>
-          <a:ext cx="9143273" cy="418073"/>
+          <a:off x="730055" y="870894"/>
+          <a:ext cx="9112014" cy="435207"/>
         </a:xfrm>
         <a:prstGeom prst="rect">
           <a:avLst/>
@@ -1702,12 +1704,12 @@
         </a:fontRef>
       </dsp:style>
       <dsp:txBody>
-        <a:bodyPr spcFirstLastPara="0" vert="horz" wrap="square" lIns="331846" tIns="58420" rIns="58420" bIns="58420" numCol="1" spcCol="1270" anchor="ctr" anchorCtr="0">
+        <a:bodyPr spcFirstLastPara="0" vert="horz" wrap="square" lIns="345446" tIns="60960" rIns="60960" bIns="60960" numCol="1" spcCol="1270" anchor="ctr" anchorCtr="0">
           <a:noAutofit/>
         </a:bodyPr>
         <a:lstStyle/>
         <a:p>
-          <a:pPr lvl="0" algn="l" defTabSz="1022350">
+          <a:pPr lvl="0" algn="l" defTabSz="1066800">
             <a:lnSpc>
               <a:spcPct val="90000"/>
             </a:lnSpc>
@@ -1719,15 +1721,15 @@
             </a:spcAft>
           </a:pPr>
           <a:r>
-            <a:rPr lang="en-US" sz="2300" kern="1200" dirty="0" smtClean="0"/>
+            <a:rPr lang="en-US" sz="2400" kern="1200" dirty="0" smtClean="0"/>
             <a:t>How Machines See an Image</a:t>
           </a:r>
-          <a:endParaRPr lang="en-US" sz="2300" kern="1200" dirty="0"/>
+          <a:endParaRPr lang="en-US" sz="2400" kern="1200" dirty="0"/>
         </a:p>
       </dsp:txBody>
       <dsp:txXfrm>
-        <a:off x="701312" y="836607"/>
-        <a:ext cx="9143273" cy="418073"/>
+        <a:off x="730055" y="870894"/>
+        <a:ext cx="9112014" cy="435207"/>
       </dsp:txXfrm>
     </dsp:sp>
     <dsp:sp modelId="{B4777A91-1BA2-4E83-9878-D73BD11C19A2}">
@@ -1737,8 +1739,8 @@
       </dsp:nvSpPr>
       <dsp:spPr>
         <a:xfrm>
-          <a:off x="440016" y="784347"/>
-          <a:ext cx="522591" cy="522591"/>
+          <a:off x="458050" y="816493"/>
+          <a:ext cx="544009" cy="544009"/>
         </a:xfrm>
         <a:prstGeom prst="ellipse">
           <a:avLst/>
@@ -1784,8 +1786,8 @@
       </dsp:nvSpPr>
       <dsp:spPr>
         <a:xfrm>
-          <a:off x="908785" y="1463625"/>
-          <a:ext cx="8935800" cy="418073"/>
+          <a:off x="946030" y="1523610"/>
+          <a:ext cx="8896038" cy="435207"/>
         </a:xfrm>
         <a:prstGeom prst="rect">
           <a:avLst/>
@@ -1827,12 +1829,12 @@
         </a:fontRef>
       </dsp:style>
       <dsp:txBody>
-        <a:bodyPr spcFirstLastPara="0" vert="horz" wrap="square" lIns="331846" tIns="58420" rIns="58420" bIns="58420" numCol="1" spcCol="1270" anchor="ctr" anchorCtr="0">
+        <a:bodyPr spcFirstLastPara="0" vert="horz" wrap="square" lIns="345446" tIns="60960" rIns="60960" bIns="60960" numCol="1" spcCol="1270" anchor="ctr" anchorCtr="0">
           <a:noAutofit/>
         </a:bodyPr>
         <a:lstStyle/>
         <a:p>
-          <a:pPr lvl="0" algn="l" defTabSz="1022350">
+          <a:pPr lvl="0" algn="l" defTabSz="1066800">
             <a:lnSpc>
               <a:spcPct val="90000"/>
             </a:lnSpc>
@@ -1844,15 +1846,15 @@
             </a:spcAft>
           </a:pPr>
           <a:r>
-            <a:rPr lang="en-US" sz="2300" kern="1200" dirty="0" smtClean="0"/>
-            <a:t>How Computer Vision Works</a:t>
+            <a:rPr lang="en-US" sz="2400" kern="1200" dirty="0" smtClean="0"/>
+            <a:t>How it Works</a:t>
           </a:r>
-          <a:endParaRPr lang="en-US" sz="2300" kern="1200" dirty="0"/>
+          <a:endParaRPr lang="en-US" sz="2400" kern="1200" dirty="0"/>
         </a:p>
       </dsp:txBody>
       <dsp:txXfrm>
-        <a:off x="908785" y="1463625"/>
-        <a:ext cx="8935800" cy="418073"/>
+        <a:off x="946030" y="1523610"/>
+        <a:ext cx="8896038" cy="435207"/>
       </dsp:txXfrm>
     </dsp:sp>
     <dsp:sp modelId="{D1E5330D-0050-49F7-83E0-A7D39F8A2155}">
@@ -1862,8 +1864,8 @@
       </dsp:nvSpPr>
       <dsp:spPr>
         <a:xfrm>
-          <a:off x="647489" y="1411366"/>
-          <a:ext cx="522591" cy="522591"/>
+          <a:off x="674025" y="1469209"/>
+          <a:ext cx="544009" cy="544009"/>
         </a:xfrm>
         <a:prstGeom prst="ellipse">
           <a:avLst/>
@@ -1909,8 +1911,8 @@
       </dsp:nvSpPr>
       <dsp:spPr>
         <a:xfrm>
-          <a:off x="975029" y="2091103"/>
-          <a:ext cx="8869556" cy="418073"/>
+          <a:off x="1014989" y="2176804"/>
+          <a:ext cx="8827079" cy="435207"/>
         </a:xfrm>
         <a:prstGeom prst="rect">
           <a:avLst/>
@@ -1952,12 +1954,12 @@
         </a:fontRef>
       </dsp:style>
       <dsp:txBody>
-        <a:bodyPr spcFirstLastPara="0" vert="horz" wrap="square" lIns="331846" tIns="58420" rIns="58420" bIns="58420" numCol="1" spcCol="1270" anchor="ctr" anchorCtr="0">
+        <a:bodyPr spcFirstLastPara="0" vert="horz" wrap="square" lIns="345446" tIns="60960" rIns="60960" bIns="60960" numCol="1" spcCol="1270" anchor="ctr" anchorCtr="0">
           <a:noAutofit/>
         </a:bodyPr>
         <a:lstStyle/>
         <a:p>
-          <a:pPr lvl="0" algn="l" defTabSz="1022350">
+          <a:pPr lvl="0" algn="l" defTabSz="1066800">
             <a:lnSpc>
               <a:spcPct val="90000"/>
             </a:lnSpc>
@@ -1969,15 +1971,15 @@
             </a:spcAft>
           </a:pPr>
           <a:r>
-            <a:rPr lang="en-US" sz="2300" kern="1200" dirty="0" smtClean="0"/>
-            <a:t>Applications of Computer Vision</a:t>
+            <a:rPr lang="en-US" sz="2400" kern="1200" dirty="0" smtClean="0"/>
+            <a:t>Applications</a:t>
           </a:r>
-          <a:endParaRPr lang="en-US" sz="2300" kern="1200" dirty="0"/>
+          <a:endParaRPr lang="en-US" sz="2400" kern="1200" dirty="0"/>
         </a:p>
       </dsp:txBody>
       <dsp:txXfrm>
-        <a:off x="975029" y="2091103"/>
-        <a:ext cx="8869556" cy="418073"/>
+        <a:off x="1014989" y="2176804"/>
+        <a:ext cx="8827079" cy="435207"/>
       </dsp:txXfrm>
     </dsp:sp>
     <dsp:sp modelId="{8387E979-7A1B-487D-A541-430DA223FA3A}">
@@ -1987,8 +1989,8 @@
       </dsp:nvSpPr>
       <dsp:spPr>
         <a:xfrm>
-          <a:off x="713733" y="2038844"/>
-          <a:ext cx="522591" cy="522591"/>
+          <a:off x="742984" y="2122403"/>
+          <a:ext cx="544009" cy="544009"/>
         </a:xfrm>
         <a:prstGeom prst="ellipse">
           <a:avLst/>
@@ -2034,8 +2036,8 @@
       </dsp:nvSpPr>
       <dsp:spPr>
         <a:xfrm>
-          <a:off x="908785" y="2718582"/>
-          <a:ext cx="8935800" cy="418073"/>
+          <a:off x="946030" y="2829999"/>
+          <a:ext cx="8896038" cy="435207"/>
         </a:xfrm>
         <a:prstGeom prst="rect">
           <a:avLst/>
@@ -2077,12 +2079,12 @@
         </a:fontRef>
       </dsp:style>
       <dsp:txBody>
-        <a:bodyPr spcFirstLastPara="0" vert="horz" wrap="square" lIns="331846" tIns="58420" rIns="58420" bIns="58420" numCol="1" spcCol="1270" anchor="ctr" anchorCtr="0">
+        <a:bodyPr spcFirstLastPara="0" vert="horz" wrap="square" lIns="345446" tIns="60960" rIns="60960" bIns="60960" numCol="1" spcCol="1270" anchor="ctr" anchorCtr="0">
           <a:noAutofit/>
         </a:bodyPr>
         <a:lstStyle/>
         <a:p>
-          <a:pPr lvl="0" algn="l" defTabSz="1022350">
+          <a:pPr lvl="0" algn="l" defTabSz="1066800">
             <a:lnSpc>
               <a:spcPct val="90000"/>
             </a:lnSpc>
@@ -2094,15 +2096,15 @@
             </a:spcAft>
           </a:pPr>
           <a:r>
-            <a:rPr lang="en-US" sz="2300" kern="1200" dirty="0" smtClean="0"/>
+            <a:rPr lang="en-US" sz="2400" kern="1200" dirty="0" smtClean="0"/>
             <a:t>Tools and Technology Used</a:t>
           </a:r>
-          <a:endParaRPr lang="en-US" sz="2300" kern="1200" dirty="0"/>
+          <a:endParaRPr lang="en-US" sz="2400" kern="1200" dirty="0"/>
         </a:p>
       </dsp:txBody>
       <dsp:txXfrm>
-        <a:off x="908785" y="2718582"/>
-        <a:ext cx="8935800" cy="418073"/>
+        <a:off x="946030" y="2829999"/>
+        <a:ext cx="8896038" cy="435207"/>
       </dsp:txXfrm>
     </dsp:sp>
     <dsp:sp modelId="{89C86576-8779-47AA-9D1F-4693468EA41D}">
@@ -2112,8 +2114,8 @@
       </dsp:nvSpPr>
       <dsp:spPr>
         <a:xfrm>
-          <a:off x="647489" y="2666322"/>
-          <a:ext cx="522591" cy="522591"/>
+          <a:off x="674025" y="2775598"/>
+          <a:ext cx="544009" cy="544009"/>
         </a:xfrm>
         <a:prstGeom prst="ellipse">
           <a:avLst/>
@@ -2159,8 +2161,8 @@
       </dsp:nvSpPr>
       <dsp:spPr>
         <a:xfrm>
-          <a:off x="701312" y="3345600"/>
-          <a:ext cx="9143273" cy="418073"/>
+          <a:off x="730055" y="3482715"/>
+          <a:ext cx="9112014" cy="435207"/>
         </a:xfrm>
         <a:prstGeom prst="rect">
           <a:avLst/>
@@ -2202,12 +2204,12 @@
         </a:fontRef>
       </dsp:style>
       <dsp:txBody>
-        <a:bodyPr spcFirstLastPara="0" vert="horz" wrap="square" lIns="331846" tIns="58420" rIns="58420" bIns="58420" numCol="1" spcCol="1270" anchor="ctr" anchorCtr="0">
+        <a:bodyPr spcFirstLastPara="0" vert="horz" wrap="square" lIns="345446" tIns="60960" rIns="60960" bIns="60960" numCol="1" spcCol="1270" anchor="ctr" anchorCtr="0">
           <a:noAutofit/>
         </a:bodyPr>
         <a:lstStyle/>
         <a:p>
-          <a:pPr lvl="0" algn="l" defTabSz="1022350">
+          <a:pPr lvl="0" algn="l" defTabSz="1066800">
             <a:lnSpc>
               <a:spcPct val="90000"/>
             </a:lnSpc>
@@ -2219,15 +2221,15 @@
             </a:spcAft>
           </a:pPr>
           <a:r>
-            <a:rPr lang="en-US" sz="2300" kern="1200" dirty="0" smtClean="0"/>
+            <a:rPr lang="en-US" sz="2400" kern="1200" dirty="0" smtClean="0"/>
             <a:t>Challenges</a:t>
           </a:r>
-          <a:endParaRPr lang="en-US" sz="2300" kern="1200" dirty="0"/>
+          <a:endParaRPr lang="en-US" sz="2400" kern="1200" dirty="0"/>
         </a:p>
       </dsp:txBody>
       <dsp:txXfrm>
-        <a:off x="701312" y="3345600"/>
-        <a:ext cx="9143273" cy="418073"/>
+        <a:off x="730055" y="3482715"/>
+        <a:ext cx="9112014" cy="435207"/>
       </dsp:txXfrm>
     </dsp:sp>
     <dsp:sp modelId="{8B8AD307-C1FF-4551-ACC3-CA91D608C3CD}">
@@ -2237,8 +2239,8 @@
       </dsp:nvSpPr>
       <dsp:spPr>
         <a:xfrm>
-          <a:off x="440016" y="3293341"/>
-          <a:ext cx="522591" cy="522591"/>
+          <a:off x="458050" y="3428314"/>
+          <a:ext cx="544009" cy="544009"/>
         </a:xfrm>
         <a:prstGeom prst="ellipse">
           <a:avLst/>
@@ -2284,8 +2286,8 @@
       </dsp:nvSpPr>
       <dsp:spPr>
         <a:xfrm>
-          <a:off x="322709" y="3973078"/>
-          <a:ext cx="9521876" cy="418073"/>
+          <a:off x="335935" y="4135909"/>
+          <a:ext cx="9506133" cy="435207"/>
         </a:xfrm>
         <a:prstGeom prst="rect">
           <a:avLst/>
@@ -2327,12 +2329,12 @@
         </a:fontRef>
       </dsp:style>
       <dsp:txBody>
-        <a:bodyPr spcFirstLastPara="0" vert="horz" wrap="square" lIns="331846" tIns="58420" rIns="58420" bIns="58420" numCol="1" spcCol="1270" anchor="ctr" anchorCtr="0">
+        <a:bodyPr spcFirstLastPara="0" vert="horz" wrap="square" lIns="345446" tIns="60960" rIns="60960" bIns="60960" numCol="1" spcCol="1270" anchor="ctr" anchorCtr="0">
           <a:noAutofit/>
         </a:bodyPr>
         <a:lstStyle/>
         <a:p>
-          <a:pPr lvl="0" algn="l" defTabSz="1022350">
+          <a:pPr lvl="0" algn="l" defTabSz="1066800">
             <a:lnSpc>
               <a:spcPct val="90000"/>
             </a:lnSpc>
@@ -2344,15 +2346,15 @@
             </a:spcAft>
           </a:pPr>
           <a:r>
-            <a:rPr lang="en-US" sz="2300" kern="1200" dirty="0" smtClean="0"/>
+            <a:rPr lang="en-US" sz="2400" kern="1200" dirty="0" smtClean="0"/>
             <a:t>Conclusions</a:t>
           </a:r>
-          <a:endParaRPr lang="en-US" sz="2300" kern="1200" dirty="0"/>
+          <a:endParaRPr lang="en-US" sz="2400" kern="1200" dirty="0"/>
         </a:p>
       </dsp:txBody>
       <dsp:txXfrm>
-        <a:off x="322709" y="3973078"/>
-        <a:ext cx="9521876" cy="418073"/>
+        <a:off x="335935" y="4135909"/>
+        <a:ext cx="9506133" cy="435207"/>
       </dsp:txXfrm>
     </dsp:sp>
     <dsp:sp modelId="{AD0955EC-A162-44CE-B2DC-C714F9DB4418}">
@@ -2362,8 +2364,8 @@
       </dsp:nvSpPr>
       <dsp:spPr>
         <a:xfrm>
-          <a:off x="61413" y="3920819"/>
-          <a:ext cx="522591" cy="522591"/>
+          <a:off x="63930" y="4081508"/>
+          <a:ext cx="544009" cy="544009"/>
         </a:xfrm>
         <a:prstGeom prst="ellipse">
           <a:avLst/>
@@ -4800,7 +4802,7 @@
           <a:p>
             <a:fld id="{2A7BC5EC-9E33-49A7-9216-DEE32BFA872B}" type="datetimeFigureOut">
               <a:rPr lang="en-IN" smtClean="0"/>
-              <a:t>05-02-2025</a:t>
+              <a:t>13-02-2025</a:t>
             </a:fld>
             <a:endParaRPr lang="en-IN"/>
           </a:p>
@@ -9342,9 +9344,9 @@
           <a:bodyPr/>
           <a:lstStyle/>
           <a:p>
-            <a:fld id="{F6A9C4AC-78AE-4945-87BF-8629A8A10DC6}" type="datetime1">
+            <a:fld id="{B52A910B-62A7-4E1E-B3C0-ADEE33A92941}" type="datetime1">
               <a:rPr lang="en-IN" smtClean="0"/>
-              <a:t>05-02-2025</a:t>
+              <a:t>13-02-2025</a:t>
             </a:fld>
             <a:endParaRPr lang="en-IN"/>
           </a:p>
@@ -9612,9 +9614,9 @@
           <a:bodyPr/>
           <a:lstStyle/>
           <a:p>
-            <a:fld id="{39A3CC2C-E02D-408A-926D-CD763B43A6D3}" type="datetime1">
+            <a:fld id="{9D628BE6-4C6E-4407-966D-63568283CF98}" type="datetime1">
               <a:rPr lang="en-IN" smtClean="0"/>
-              <a:t>05-02-2025</a:t>
+              <a:t>13-02-2025</a:t>
             </a:fld>
             <a:endParaRPr lang="en-IN"/>
           </a:p>
@@ -9675,7 +9677,6 @@
   <p:transition spd="slow">
     <p:wipe/>
   </p:transition>
-  <p:hf hdr="0" ftr="0" dt="0"/>
 </p:sldLayout>
 </file>
 
@@ -9812,9 +9813,9 @@
           <a:bodyPr/>
           <a:lstStyle/>
           <a:p>
-            <a:fld id="{39A3CC2C-E02D-408A-926D-CD763B43A6D3}" type="datetime1">
+            <a:fld id="{DA48C904-E2DD-4142-982B-F6DD47119002}" type="datetime1">
               <a:rPr lang="en-IN" smtClean="0"/>
-              <a:t>05-02-2025</a:t>
+              <a:t>13-02-2025</a:t>
             </a:fld>
             <a:endParaRPr lang="en-IN"/>
           </a:p>
@@ -9875,7 +9876,6 @@
   <p:transition spd="slow">
     <p:wipe/>
   </p:transition>
-  <p:hf hdr="0" ftr="0" dt="0"/>
 </p:sldLayout>
 </file>
 
@@ -10079,9 +10079,9 @@
           <a:bodyPr/>
           <a:lstStyle/>
           <a:p>
-            <a:fld id="{39A3CC2C-E02D-408A-926D-CD763B43A6D3}" type="datetime1">
+            <a:fld id="{40948B57-0A93-4B85-A16B-FBC3E100F2BC}" type="datetime1">
               <a:rPr lang="en-IN" smtClean="0"/>
-              <a:t>05-02-2025</a:t>
+              <a:t>13-02-2025</a:t>
             </a:fld>
             <a:endParaRPr lang="en-IN"/>
           </a:p>
@@ -10380,7 +10380,6 @@
   <p:transition spd="slow">
     <p:wipe/>
   </p:transition>
-  <p:hf hdr="0" ftr="0" dt="0"/>
 </p:sldLayout>
 </file>
 
@@ -10517,9 +10516,9 @@
           <a:bodyPr/>
           <a:lstStyle/>
           <a:p>
-            <a:fld id="{39A3CC2C-E02D-408A-926D-CD763B43A6D3}" type="datetime1">
+            <a:fld id="{FECAAA6D-2E8C-4D9A-A6A9-BE966EE6CF5A}" type="datetime1">
               <a:rPr lang="en-IN" smtClean="0"/>
-              <a:t>05-02-2025</a:t>
+              <a:t>13-02-2025</a:t>
             </a:fld>
             <a:endParaRPr lang="en-IN"/>
           </a:p>
@@ -10580,7 +10579,6 @@
   <p:transition spd="slow">
     <p:wipe/>
   </p:transition>
-  <p:hf hdr="0" ftr="0" dt="0"/>
 </p:sldLayout>
 </file>
 
@@ -11067,9 +11065,9 @@
           <a:bodyPr/>
           <a:lstStyle/>
           <a:p>
-            <a:fld id="{39A3CC2C-E02D-408A-926D-CD763B43A6D3}" type="datetime1">
+            <a:fld id="{A93EA0AC-39D6-4A25-9A5E-51C62B544299}" type="datetime1">
               <a:rPr lang="en-IN" smtClean="0"/>
-              <a:t>05-02-2025</a:t>
+              <a:t>13-02-2025</a:t>
             </a:fld>
             <a:endParaRPr lang="en-IN"/>
           </a:p>
@@ -11130,7 +11128,6 @@
   <p:transition spd="slow">
     <p:wipe/>
   </p:transition>
-  <p:hf hdr="0" ftr="0" dt="0"/>
 </p:sldLayout>
 </file>
 
@@ -11791,9 +11788,9 @@
           <a:bodyPr/>
           <a:lstStyle/>
           <a:p>
-            <a:fld id="{39A3CC2C-E02D-408A-926D-CD763B43A6D3}" type="datetime1">
+            <a:fld id="{98569F31-AFCF-445E-850E-43B6AA89D957}" type="datetime1">
               <a:rPr lang="en-IN" smtClean="0"/>
-              <a:t>05-02-2025</a:t>
+              <a:t>13-02-2025</a:t>
             </a:fld>
             <a:endParaRPr lang="en-IN"/>
           </a:p>
@@ -11854,7 +11851,6 @@
   <p:transition spd="slow">
     <p:wipe/>
   </p:transition>
-  <p:hf hdr="0" ftr="0" dt="0"/>
 </p:sldLayout>
 </file>
 
@@ -11965,9 +11961,9 @@
           <a:bodyPr/>
           <a:lstStyle/>
           <a:p>
-            <a:fld id="{8BC07190-C773-4795-9CB1-91054EFC1944}" type="datetime1">
+            <a:fld id="{C50A078A-B9C1-4794-984A-4747680CD064}" type="datetime1">
               <a:rPr lang="en-IN" smtClean="0"/>
-              <a:t>05-02-2025</a:t>
+              <a:t>13-02-2025</a:t>
             </a:fld>
             <a:endParaRPr lang="en-IN"/>
           </a:p>
@@ -12148,9 +12144,9 @@
           <a:bodyPr/>
           <a:lstStyle/>
           <a:p>
-            <a:fld id="{0DC6BC1D-ADB7-4C71-BAE5-DC9B63599D7D}" type="datetime1">
+            <a:fld id="{5D51BB25-042A-40C5-88E0-EEF356BF3F4C}" type="datetime1">
               <a:rPr lang="en-IN" smtClean="0"/>
-              <a:t>05-02-2025</a:t>
+              <a:t>13-02-2025</a:t>
             </a:fld>
             <a:endParaRPr lang="en-IN"/>
           </a:p>
@@ -12321,9 +12317,9 @@
           <a:bodyPr/>
           <a:lstStyle/>
           <a:p>
-            <a:fld id="{97FE4B94-E4FD-4737-8C8C-9AEADB23C545}" type="datetime1">
+            <a:fld id="{62E42470-D56A-4076-8F51-8478B15A0D73}" type="datetime1">
               <a:rPr lang="en-IN" smtClean="0"/>
-              <a:t>05-02-2025</a:t>
+              <a:t>13-02-2025</a:t>
             </a:fld>
             <a:endParaRPr lang="en-IN"/>
           </a:p>
@@ -12574,9 +12570,9 @@
           <a:bodyPr/>
           <a:lstStyle/>
           <a:p>
-            <a:fld id="{ABC59FC6-F408-470B-83FD-D275F464AE1C}" type="datetime1">
+            <a:fld id="{AF607E66-EC2A-416B-B9FE-FAE715ED5641}" type="datetime1">
               <a:rPr lang="en-IN" smtClean="0"/>
-              <a:t>05-02-2025</a:t>
+              <a:t>13-02-2025</a:t>
             </a:fld>
             <a:endParaRPr lang="en-IN"/>
           </a:p>
@@ -12809,9 +12805,9 @@
           <a:bodyPr/>
           <a:lstStyle/>
           <a:p>
-            <a:fld id="{25238236-B933-4F38-8446-2F15045CDFFA}" type="datetime1">
+            <a:fld id="{DC163DA8-612F-4F9C-BE0D-205AD2D114B0}" type="datetime1">
               <a:rPr lang="en-IN" smtClean="0"/>
-              <a:t>05-02-2025</a:t>
+              <a:t>13-02-2025</a:t>
             </a:fld>
             <a:endParaRPr lang="en-IN"/>
           </a:p>
@@ -13193,9 +13189,9 @@
           <a:bodyPr/>
           <a:lstStyle/>
           <a:p>
-            <a:fld id="{1CBADFDF-B2AA-492A-9486-2139597BA49C}" type="datetime1">
+            <a:fld id="{0C329C18-71EC-42F0-B82C-DCB74A79C8EE}" type="datetime1">
               <a:rPr lang="en-IN" smtClean="0"/>
-              <a:t>05-02-2025</a:t>
+              <a:t>13-02-2025</a:t>
             </a:fld>
             <a:endParaRPr lang="en-IN"/>
           </a:p>
@@ -13314,9 +13310,9 @@
           <a:bodyPr/>
           <a:lstStyle/>
           <a:p>
-            <a:fld id="{C8BA6409-1C39-45BD-ABED-E8127D5B8DA2}" type="datetime1">
+            <a:fld id="{42701395-1742-4394-8CB2-120F27E3D1DB}" type="datetime1">
               <a:rPr lang="en-IN" smtClean="0"/>
-              <a:t>05-02-2025</a:t>
+              <a:t>13-02-2025</a:t>
             </a:fld>
             <a:endParaRPr lang="en-IN"/>
           </a:p>
@@ -13412,9 +13408,9 @@
           <a:bodyPr/>
           <a:lstStyle/>
           <a:p>
-            <a:fld id="{E0DE04FF-EEBD-432F-A8FD-37D1F851470E}" type="datetime1">
+            <a:fld id="{87BE0915-5F51-45F2-95F1-63B9B88E8B70}" type="datetime1">
               <a:rPr lang="en-IN" smtClean="0"/>
-              <a:t>05-02-2025</a:t>
+              <a:t>13-02-2025</a:t>
             </a:fld>
             <a:endParaRPr lang="en-IN"/>
           </a:p>
@@ -13664,9 +13660,9 @@
           <a:bodyPr/>
           <a:lstStyle/>
           <a:p>
-            <a:fld id="{77B6C7F9-9949-4E08-8E17-E0AE4CD201EC}" type="datetime1">
+            <a:fld id="{A70AB531-F652-4E7F-8AAF-BB3DD532AE35}" type="datetime1">
               <a:rPr lang="en-IN" smtClean="0"/>
-              <a:t>05-02-2025</a:t>
+              <a:t>13-02-2025</a:t>
             </a:fld>
             <a:endParaRPr lang="en-IN"/>
           </a:p>
@@ -13947,9 +13943,9 @@
           <a:bodyPr/>
           <a:lstStyle/>
           <a:p>
-            <a:fld id="{2596FA6F-C774-47F3-B2BD-2E12A35AF6B4}" type="datetime1">
+            <a:fld id="{EC34000F-8204-4D65-BB89-382291F3BC36}" type="datetime1">
               <a:rPr lang="en-IN" smtClean="0"/>
-              <a:t>05-02-2025</a:t>
+              <a:t>13-02-2025</a:t>
             </a:fld>
             <a:endParaRPr lang="en-IN"/>
           </a:p>
@@ -14020,7 +14016,6 @@
       <p:bgPr>
         <a:blipFill dpi="0" rotWithShape="1">
           <a:blip r:embed="rId19">
-            <a:alphaModFix amt="85000"/>
             <a:duotone>
               <a:schemeClr val="bg2">
                 <a:shade val="88000"/>
@@ -14036,6 +14031,17 @@
               </a:schemeClr>
             </a:duotone>
             <a:lum/>
+            <a:extLst>
+              <a:ext uri="{BEBA8EAE-BF5A-486C-A8C5-ECC9F3942E4B}">
+                <a14:imgProps xmlns:a14="http://schemas.microsoft.com/office/drawing/2010/main">
+                  <a14:imgLayer r:embed="rId20">
+                    <a14:imgEffect>
+                      <a14:artisticPhotocopy trans="0" detail="0"/>
+                    </a14:imgEffect>
+                  </a14:imgLayer>
+                </a14:imgProps>
+              </a:ext>
+            </a:extLst>
           </a:blip>
           <a:srcRect/>
           <a:stretch>
@@ -14068,7 +14074,7 @@
           <p:nvPr/>
         </p:nvPicPr>
         <p:blipFill>
-          <a:blip r:embed="rId20">
+          <a:blip r:embed="rId21">
             <a:alphaModFix amt="30000"/>
             <a:extLst>
               <a:ext uri="{28A0092B-C50C-407E-A947-70E740481C1C}">
@@ -17051,9 +17057,9 @@
             </a:lvl1pPr>
           </a:lstStyle>
           <a:p>
-            <a:fld id="{39A3CC2C-E02D-408A-926D-CD763B43A6D3}" type="datetime1">
+            <a:fld id="{7788B477-5DB7-41ED-AFC5-9BEA61AD1BC6}" type="datetime1">
               <a:rPr lang="en-IN" smtClean="0"/>
-              <a:t>05-02-2025</a:t>
+              <a:t>13-02-2025</a:t>
             </a:fld>
             <a:endParaRPr lang="en-IN"/>
           </a:p>
@@ -17579,10 +17585,24 @@
           <a:p>
             <a:pPr algn="ctr"/>
             <a:r>
-              <a:rPr lang="en-IN" sz="2800" b="1" dirty="0" smtClean="0"/>
+              <a:rPr lang="en-IN" sz="2800" b="1" dirty="0" smtClean="0">
+                <a:solidFill>
+                  <a:schemeClr val="bg1">
+                    <a:lumMod val="95000"/>
+                    <a:lumOff val="5000"/>
+                  </a:schemeClr>
+                </a:solidFill>
+              </a:rPr>
               <a:t>Department of Computer Science and Engineering</a:t>
             </a:r>
-            <a:endParaRPr lang="en-IN" sz="2800" b="1" dirty="0"/>
+            <a:endParaRPr lang="en-IN" sz="2800" b="1" dirty="0">
+              <a:solidFill>
+                <a:schemeClr val="bg1">
+                  <a:lumMod val="95000"/>
+                  <a:lumOff val="5000"/>
+                </a:schemeClr>
+              </a:solidFill>
+            </a:endParaRPr>
           </a:p>
         </p:txBody>
       </p:sp>
@@ -17610,10 +17630,24 @@
           <a:p>
             <a:pPr algn="ctr"/>
             <a:r>
-              <a:rPr lang="en-IN" sz="2400" b="1" dirty="0" smtClean="0"/>
+              <a:rPr lang="en-IN" sz="2400" b="1" dirty="0" smtClean="0">
+                <a:solidFill>
+                  <a:schemeClr val="bg1">
+                    <a:lumMod val="95000"/>
+                    <a:lumOff val="5000"/>
+                  </a:schemeClr>
+                </a:solidFill>
+              </a:rPr>
               <a:t>National Institute of Technology Hamirpur</a:t>
             </a:r>
-            <a:endParaRPr lang="en-IN" sz="2400" b="1" dirty="0"/>
+            <a:endParaRPr lang="en-IN" sz="2400" b="1" dirty="0">
+              <a:solidFill>
+                <a:schemeClr val="bg1">
+                  <a:lumMod val="95000"/>
+                  <a:lumOff val="5000"/>
+                </a:schemeClr>
+              </a:solidFill>
+            </a:endParaRPr>
           </a:p>
         </p:txBody>
       </p:sp>
@@ -17673,29 +17707,6 @@
                 </a:schemeClr>
               </a:solidFill>
             </a:endParaRPr>
-          </a:p>
-        </p:txBody>
-      </p:sp>
-      <p:sp>
-        <p:nvSpPr>
-          <p:cNvPr id="12" name="Slide Number Placeholder 11"/>
-          <p:cNvSpPr>
-            <a:spLocks noGrp="1"/>
-          </p:cNvSpPr>
-          <p:nvPr>
-            <p:ph type="sldNum" sz="quarter" idx="12"/>
-          </p:nvPr>
-        </p:nvSpPr>
-        <p:spPr/>
-        <p:txBody>
-          <a:bodyPr/>
-          <a:lstStyle/>
-          <a:p>
-            <a:fld id="{E9D42EC4-55FD-406C-82BB-203E3BBE455C}" type="slidenum">
-              <a:rPr lang="en-IN" smtClean="0"/>
-              <a:t>1</a:t>
-            </a:fld>
-            <a:endParaRPr lang="en-IN"/>
           </a:p>
         </p:txBody>
       </p:sp>
@@ -18742,7 +18753,7 @@
                   </a:schemeClr>
                 </a:solidFill>
               </a:rPr>
-              <a:t>(You Look Only Once)-used for object detection </a:t>
+              <a:t>(You Only Look Once)-used for object detection </a:t>
             </a:r>
             <a:endParaRPr lang="en-IN" dirty="0">
               <a:solidFill>
@@ -18973,13 +18984,13 @@
         </p:nvSpPr>
         <p:spPr>
           <a:xfrm>
-            <a:off x="675797" y="979714"/>
-            <a:ext cx="10837228" cy="5786846"/>
+            <a:off x="675796" y="979714"/>
+            <a:ext cx="11201243" cy="5786846"/>
           </a:xfrm>
         </p:spPr>
         <p:txBody>
           <a:bodyPr>
-            <a:normAutofit fontScale="92500" lnSpcReduction="10000"/>
+            <a:normAutofit/>
           </a:bodyPr>
           <a:lstStyle/>
           <a:p>
@@ -19010,26 +19021,7 @@
                   <a:srgbClr val="451717"/>
                 </a:solidFill>
               </a:rPr>
-              <a:t>pixels are there in HD Image, require large computational power.</a:t>
-            </a:r>
-          </a:p>
-          <a:p>
-            <a:pPr lvl="1"/>
-            <a:r>
-              <a:rPr lang="en-IN" sz="2400" dirty="0">
-                <a:solidFill>
-                  <a:srgbClr val="451717"/>
-                </a:solidFill>
-              </a:rPr>
-              <a:t>-</a:t>
-            </a:r>
-            <a:r>
-              <a:rPr lang="en-IN" sz="2400" dirty="0" smtClean="0">
-                <a:solidFill>
-                  <a:srgbClr val="451717"/>
-                </a:solidFill>
-              </a:rPr>
-              <a:t>Resolution of images are increasing day by day, resulting in fast GPUs required. </a:t>
+              <a:t>pixels are there in HD Image, require large computational power. </a:t>
             </a:r>
             <a:r>
               <a:rPr lang="en-IN" sz="2400" dirty="0" smtClean="0">
@@ -19072,18 +19064,7 @@
                   <a:srgbClr val="451717"/>
                 </a:solidFill>
               </a:rPr>
-              <a:t>Analog Intensities are digitized into digital form result in loss of data.</a:t>
-            </a:r>
-          </a:p>
-          <a:p>
-            <a:pPr lvl="1"/>
-            <a:r>
-              <a:rPr lang="en-IN" sz="2400" dirty="0" smtClean="0">
-                <a:solidFill>
-                  <a:srgbClr val="451717"/>
-                </a:solidFill>
-              </a:rPr>
-              <a:t>-So, we can not get the exact image of real world, results in limiting the power of CV. </a:t>
+              <a:t>Analog Intensities are digitized into digital form result in loss of data. </a:t>
             </a:r>
             <a:r>
               <a:rPr lang="en-IN" sz="2400" dirty="0" smtClean="0">
@@ -19139,21 +19120,13 @@
               </a:rPr>
               <a:t>.</a:t>
             </a:r>
-            <a:endParaRPr lang="en-IN" sz="2400" dirty="0" smtClean="0">
-              <a:solidFill>
-                <a:srgbClr val="451717"/>
-              </a:solidFill>
-            </a:endParaRPr>
-          </a:p>
-          <a:p>
-            <a:pPr lvl="1"/>
-            <a:r>
-              <a:rPr lang="en-IN" sz="2400" dirty="0" smtClean="0">
+            <a:r>
+              <a:rPr lang="en-IN" sz="2400" dirty="0">
                 <a:solidFill>
                   <a:srgbClr val="451717"/>
                 </a:solidFill>
               </a:rPr>
-              <a:t>-Biased Data set may affect the generalization of the model. </a:t>
+              <a:t> </a:t>
             </a:r>
             <a:r>
               <a:rPr lang="en-IN" sz="2400" dirty="0" smtClean="0">
@@ -19244,7 +19217,7 @@
                                         <p:tgtEl>
                                           <p:spTgt spid="3">
                                             <p:txEl>
-                                              <p:pRg st="0" end="0"/>
+                                              <p:pRg st="3" end="3"/>
                                             </p:txEl>
                                           </p:spTgt>
                                         </p:tgtEl>
@@ -19262,7 +19235,7 @@
                                         <p:tgtEl>
                                           <p:spTgt spid="3">
                                             <p:txEl>
-                                              <p:pRg st="0" end="0"/>
+                                              <p:pRg st="3" end="3"/>
                                             </p:txEl>
                                           </p:spTgt>
                                         </p:tgtEl>
@@ -19289,7 +19262,7 @@
                                         <p:tgtEl>
                                           <p:spTgt spid="3">
                                             <p:txEl>
-                                              <p:pRg st="0" end="0"/>
+                                              <p:pRg st="3" end="3"/>
                                             </p:txEl>
                                           </p:spTgt>
                                         </p:tgtEl>
@@ -19329,7 +19302,7 @@
                                         <p:tgtEl>
                                           <p:spTgt spid="3">
                                             <p:txEl>
-                                              <p:pRg st="1" end="1"/>
+                                              <p:pRg st="4" end="4"/>
                                             </p:txEl>
                                           </p:spTgt>
                                         </p:tgtEl>
@@ -19347,7 +19320,7 @@
                                         <p:tgtEl>
                                           <p:spTgt spid="3">
                                             <p:txEl>
-                                              <p:pRg st="1" end="1"/>
+                                              <p:pRg st="4" end="4"/>
                                             </p:txEl>
                                           </p:spTgt>
                                         </p:tgtEl>
@@ -19374,92 +19347,7 @@
                                         <p:tgtEl>
                                           <p:spTgt spid="3">
                                             <p:txEl>
-                                              <p:pRg st="1" end="1"/>
-                                            </p:txEl>
-                                          </p:spTgt>
-                                        </p:tgtEl>
-                                        <p:attrNameLst>
-                                          <p:attrName>ppt_y</p:attrName>
-                                        </p:attrNameLst>
-                                      </p:cBhvr>
-                                      <p:tavLst>
-                                        <p:tav tm="0">
-                                          <p:val>
-                                            <p:strVal val="1+#ppt_h/2"/>
-                                          </p:val>
-                                        </p:tav>
-                                        <p:tav tm="100000">
-                                          <p:val>
-                                            <p:strVal val="#ppt_y"/>
-                                          </p:val>
-                                        </p:tav>
-                                      </p:tavLst>
-                                    </p:anim>
-                                  </p:childTnLst>
-                                </p:cTn>
-                              </p:par>
-                              <p:par>
-                                <p:cTn id="13" presetID="2" presetClass="entr" presetSubtype="4" fill="hold" nodeType="withEffect">
-                                  <p:stCondLst>
-                                    <p:cond delay="0"/>
-                                  </p:stCondLst>
-                                  <p:childTnLst>
-                                    <p:set>
-                                      <p:cBhvr>
-                                        <p:cTn id="14" dur="1" fill="hold">
-                                          <p:stCondLst>
-                                            <p:cond delay="0"/>
-                                          </p:stCondLst>
-                                        </p:cTn>
-                                        <p:tgtEl>
-                                          <p:spTgt spid="3">
-                                            <p:txEl>
-                                              <p:pRg st="2" end="2"/>
-                                            </p:txEl>
-                                          </p:spTgt>
-                                        </p:tgtEl>
-                                        <p:attrNameLst>
-                                          <p:attrName>style.visibility</p:attrName>
-                                        </p:attrNameLst>
-                                      </p:cBhvr>
-                                      <p:to>
-                                        <p:strVal val="visible"/>
-                                      </p:to>
-                                    </p:set>
-                                    <p:anim calcmode="lin" valueType="num">
-                                      <p:cBhvr additive="base">
-                                        <p:cTn id="15" dur="500" fill="hold"/>
-                                        <p:tgtEl>
-                                          <p:spTgt spid="3">
-                                            <p:txEl>
-                                              <p:pRg st="2" end="2"/>
-                                            </p:txEl>
-                                          </p:spTgt>
-                                        </p:tgtEl>
-                                        <p:attrNameLst>
-                                          <p:attrName>ppt_x</p:attrName>
-                                        </p:attrNameLst>
-                                      </p:cBhvr>
-                                      <p:tavLst>
-                                        <p:tav tm="0">
-                                          <p:val>
-                                            <p:strVal val="#ppt_x"/>
-                                          </p:val>
-                                        </p:tav>
-                                        <p:tav tm="100000">
-                                          <p:val>
-                                            <p:strVal val="#ppt_x"/>
-                                          </p:val>
-                                        </p:tav>
-                                      </p:tavLst>
-                                    </p:anim>
-                                    <p:anim calcmode="lin" valueType="num">
-                                      <p:cBhvr additive="base">
-                                        <p:cTn id="16" dur="500" fill="hold"/>
-                                        <p:tgtEl>
-                                          <p:spTgt spid="3">
-                                            <p:txEl>
-                                              <p:pRg st="2" end="2"/>
+                                              <p:pRg st="4" end="4"/>
                                             </p:txEl>
                                           </p:spTgt>
                                         </p:tgtEl>
@@ -19490,196 +19378,26 @@
                     </p:cTn>
                   </p:par>
                   <p:par>
-                    <p:cTn id="17" fill="hold">
+                    <p:cTn id="13" fill="hold">
                       <p:stCondLst>
                         <p:cond delay="indefinite"/>
                       </p:stCondLst>
                       <p:childTnLst>
                         <p:par>
-                          <p:cTn id="18" fill="hold">
+                          <p:cTn id="14" fill="hold">
                             <p:stCondLst>
                               <p:cond delay="0"/>
                             </p:stCondLst>
                             <p:childTnLst>
                               <p:par>
-                                <p:cTn id="19" presetID="2" presetClass="entr" presetSubtype="4" fill="hold" nodeType="clickEffect">
+                                <p:cTn id="15" presetID="2" presetClass="entr" presetSubtype="4" fill="hold" nodeType="clickEffect">
                                   <p:stCondLst>
                                     <p:cond delay="0"/>
                                   </p:stCondLst>
                                   <p:childTnLst>
                                     <p:set>
                                       <p:cBhvr>
-                                        <p:cTn id="20" dur="1" fill="hold">
-                                          <p:stCondLst>
-                                            <p:cond delay="0"/>
-                                          </p:stCondLst>
-                                        </p:cTn>
-                                        <p:tgtEl>
-                                          <p:spTgt spid="3">
-                                            <p:txEl>
-                                              <p:pRg st="4" end="4"/>
-                                            </p:txEl>
-                                          </p:spTgt>
-                                        </p:tgtEl>
-                                        <p:attrNameLst>
-                                          <p:attrName>style.visibility</p:attrName>
-                                        </p:attrNameLst>
-                                      </p:cBhvr>
-                                      <p:to>
-                                        <p:strVal val="visible"/>
-                                      </p:to>
-                                    </p:set>
-                                    <p:anim calcmode="lin" valueType="num">
-                                      <p:cBhvr additive="base">
-                                        <p:cTn id="21" dur="500" fill="hold"/>
-                                        <p:tgtEl>
-                                          <p:spTgt spid="3">
-                                            <p:txEl>
-                                              <p:pRg st="4" end="4"/>
-                                            </p:txEl>
-                                          </p:spTgt>
-                                        </p:tgtEl>
-                                        <p:attrNameLst>
-                                          <p:attrName>ppt_x</p:attrName>
-                                        </p:attrNameLst>
-                                      </p:cBhvr>
-                                      <p:tavLst>
-                                        <p:tav tm="0">
-                                          <p:val>
-                                            <p:strVal val="#ppt_x"/>
-                                          </p:val>
-                                        </p:tav>
-                                        <p:tav tm="100000">
-                                          <p:val>
-                                            <p:strVal val="#ppt_x"/>
-                                          </p:val>
-                                        </p:tav>
-                                      </p:tavLst>
-                                    </p:anim>
-                                    <p:anim calcmode="lin" valueType="num">
-                                      <p:cBhvr additive="base">
-                                        <p:cTn id="22" dur="500" fill="hold"/>
-                                        <p:tgtEl>
-                                          <p:spTgt spid="3">
-                                            <p:txEl>
-                                              <p:pRg st="4" end="4"/>
-                                            </p:txEl>
-                                          </p:spTgt>
-                                        </p:tgtEl>
-                                        <p:attrNameLst>
-                                          <p:attrName>ppt_y</p:attrName>
-                                        </p:attrNameLst>
-                                      </p:cBhvr>
-                                      <p:tavLst>
-                                        <p:tav tm="0">
-                                          <p:val>
-                                            <p:strVal val="1+#ppt_h/2"/>
-                                          </p:val>
-                                        </p:tav>
-                                        <p:tav tm="100000">
-                                          <p:val>
-                                            <p:strVal val="#ppt_y"/>
-                                          </p:val>
-                                        </p:tav>
-                                      </p:tavLst>
-                                    </p:anim>
-                                  </p:childTnLst>
-                                </p:cTn>
-                              </p:par>
-                              <p:par>
-                                <p:cTn id="23" presetID="2" presetClass="entr" presetSubtype="4" fill="hold" nodeType="withEffect">
-                                  <p:stCondLst>
-                                    <p:cond delay="0"/>
-                                  </p:stCondLst>
-                                  <p:childTnLst>
-                                    <p:set>
-                                      <p:cBhvr>
-                                        <p:cTn id="24" dur="1" fill="hold">
-                                          <p:stCondLst>
-                                            <p:cond delay="0"/>
-                                          </p:stCondLst>
-                                        </p:cTn>
-                                        <p:tgtEl>
-                                          <p:spTgt spid="3">
-                                            <p:txEl>
-                                              <p:pRg st="5" end="5"/>
-                                            </p:txEl>
-                                          </p:spTgt>
-                                        </p:tgtEl>
-                                        <p:attrNameLst>
-                                          <p:attrName>style.visibility</p:attrName>
-                                        </p:attrNameLst>
-                                      </p:cBhvr>
-                                      <p:to>
-                                        <p:strVal val="visible"/>
-                                      </p:to>
-                                    </p:set>
-                                    <p:anim calcmode="lin" valueType="num">
-                                      <p:cBhvr additive="base">
-                                        <p:cTn id="25" dur="500" fill="hold"/>
-                                        <p:tgtEl>
-                                          <p:spTgt spid="3">
-                                            <p:txEl>
-                                              <p:pRg st="5" end="5"/>
-                                            </p:txEl>
-                                          </p:spTgt>
-                                        </p:tgtEl>
-                                        <p:attrNameLst>
-                                          <p:attrName>ppt_x</p:attrName>
-                                        </p:attrNameLst>
-                                      </p:cBhvr>
-                                      <p:tavLst>
-                                        <p:tav tm="0">
-                                          <p:val>
-                                            <p:strVal val="#ppt_x"/>
-                                          </p:val>
-                                        </p:tav>
-                                        <p:tav tm="100000">
-                                          <p:val>
-                                            <p:strVal val="#ppt_x"/>
-                                          </p:val>
-                                        </p:tav>
-                                      </p:tavLst>
-                                    </p:anim>
-                                    <p:anim calcmode="lin" valueType="num">
-                                      <p:cBhvr additive="base">
-                                        <p:cTn id="26" dur="500" fill="hold"/>
-                                        <p:tgtEl>
-                                          <p:spTgt spid="3">
-                                            <p:txEl>
-                                              <p:pRg st="5" end="5"/>
-                                            </p:txEl>
-                                          </p:spTgt>
-                                        </p:tgtEl>
-                                        <p:attrNameLst>
-                                          <p:attrName>ppt_y</p:attrName>
-                                        </p:attrNameLst>
-                                      </p:cBhvr>
-                                      <p:tavLst>
-                                        <p:tav tm="0">
-                                          <p:val>
-                                            <p:strVal val="1+#ppt_h/2"/>
-                                          </p:val>
-                                        </p:tav>
-                                        <p:tav tm="100000">
-                                          <p:val>
-                                            <p:strVal val="#ppt_y"/>
-                                          </p:val>
-                                        </p:tav>
-                                      </p:tavLst>
-                                    </p:anim>
-                                  </p:childTnLst>
-                                </p:cTn>
-                              </p:par>
-                              <p:par>
-                                <p:cTn id="27" presetID="2" presetClass="entr" presetSubtype="4" fill="hold" nodeType="withEffect">
-                                  <p:stCondLst>
-                                    <p:cond delay="0"/>
-                                  </p:stCondLst>
-                                  <p:childTnLst>
-                                    <p:set>
-                                      <p:cBhvr>
-                                        <p:cTn id="28" dur="1" fill="hold">
+                                        <p:cTn id="16" dur="1" fill="hold">
                                           <p:stCondLst>
                                             <p:cond delay="0"/>
                                           </p:stCondLst>
@@ -19701,7 +19419,7 @@
                                     </p:set>
                                     <p:anim calcmode="lin" valueType="num">
                                       <p:cBhvr additive="base">
-                                        <p:cTn id="29" dur="500" fill="hold"/>
+                                        <p:cTn id="17" dur="500" fill="hold"/>
                                         <p:tgtEl>
                                           <p:spTgt spid="3">
                                             <p:txEl>
@@ -19728,7 +19446,7 @@
                                     </p:anim>
                                     <p:anim calcmode="lin" valueType="num">
                                       <p:cBhvr additive="base">
-                                        <p:cTn id="30" dur="500" fill="hold"/>
+                                        <p:cTn id="18" dur="500" fill="hold"/>
                                         <p:tgtEl>
                                           <p:spTgt spid="3">
                                             <p:txEl>
@@ -19756,33 +19474,15 @@
                                   </p:childTnLst>
                                 </p:cTn>
                               </p:par>
-                            </p:childTnLst>
-                          </p:cTn>
-                        </p:par>
-                      </p:childTnLst>
-                    </p:cTn>
-                  </p:par>
-                  <p:par>
-                    <p:cTn id="31" fill="hold">
-                      <p:stCondLst>
-                        <p:cond delay="indefinite"/>
-                      </p:stCondLst>
-                      <p:childTnLst>
-                        <p:par>
-                          <p:cTn id="32" fill="hold">
-                            <p:stCondLst>
-                              <p:cond delay="0"/>
-                            </p:stCondLst>
-                            <p:childTnLst>
                               <p:par>
-                                <p:cTn id="33" presetID="2" presetClass="entr" presetSubtype="4" fill="hold" nodeType="clickEffect">
+                                <p:cTn id="19" presetID="2" presetClass="entr" presetSubtype="4" fill="hold" nodeType="withEffect">
                                   <p:stCondLst>
                                     <p:cond delay="0"/>
                                   </p:stCondLst>
                                   <p:childTnLst>
                                     <p:set>
                                       <p:cBhvr>
-                                        <p:cTn id="34" dur="1" fill="hold">
+                                        <p:cTn id="20" dur="1" fill="hold">
                                           <p:stCondLst>
                                             <p:cond delay="0"/>
                                           </p:stCondLst>
@@ -19790,7 +19490,7 @@
                                         <p:tgtEl>
                                           <p:spTgt spid="3">
                                             <p:txEl>
-                                              <p:pRg st="8" end="8"/>
+                                              <p:pRg st="7" end="7"/>
                                             </p:txEl>
                                           </p:spTgt>
                                         </p:tgtEl>
@@ -19804,11 +19504,11 @@
                                     </p:set>
                                     <p:anim calcmode="lin" valueType="num">
                                       <p:cBhvr additive="base">
-                                        <p:cTn id="35" dur="500" fill="hold"/>
+                                        <p:cTn id="21" dur="500" fill="hold"/>
                                         <p:tgtEl>
                                           <p:spTgt spid="3">
                                             <p:txEl>
-                                              <p:pRg st="8" end="8"/>
+                                              <p:pRg st="7" end="7"/>
                                             </p:txEl>
                                           </p:spTgt>
                                         </p:tgtEl>
@@ -19831,181 +19531,11 @@
                                     </p:anim>
                                     <p:anim calcmode="lin" valueType="num">
                                       <p:cBhvr additive="base">
-                                        <p:cTn id="36" dur="500" fill="hold"/>
+                                        <p:cTn id="22" dur="500" fill="hold"/>
                                         <p:tgtEl>
                                           <p:spTgt spid="3">
                                             <p:txEl>
-                                              <p:pRg st="8" end="8"/>
-                                            </p:txEl>
-                                          </p:spTgt>
-                                        </p:tgtEl>
-                                        <p:attrNameLst>
-                                          <p:attrName>ppt_y</p:attrName>
-                                        </p:attrNameLst>
-                                      </p:cBhvr>
-                                      <p:tavLst>
-                                        <p:tav tm="0">
-                                          <p:val>
-                                            <p:strVal val="1+#ppt_h/2"/>
-                                          </p:val>
-                                        </p:tav>
-                                        <p:tav tm="100000">
-                                          <p:val>
-                                            <p:strVal val="#ppt_y"/>
-                                          </p:val>
-                                        </p:tav>
-                                      </p:tavLst>
-                                    </p:anim>
-                                  </p:childTnLst>
-                                </p:cTn>
-                              </p:par>
-                              <p:par>
-                                <p:cTn id="37" presetID="2" presetClass="entr" presetSubtype="4" fill="hold" nodeType="withEffect">
-                                  <p:stCondLst>
-                                    <p:cond delay="0"/>
-                                  </p:stCondLst>
-                                  <p:childTnLst>
-                                    <p:set>
-                                      <p:cBhvr>
-                                        <p:cTn id="38" dur="1" fill="hold">
-                                          <p:stCondLst>
-                                            <p:cond delay="0"/>
-                                          </p:stCondLst>
-                                        </p:cTn>
-                                        <p:tgtEl>
-                                          <p:spTgt spid="3">
-                                            <p:txEl>
-                                              <p:pRg st="9" end="9"/>
-                                            </p:txEl>
-                                          </p:spTgt>
-                                        </p:tgtEl>
-                                        <p:attrNameLst>
-                                          <p:attrName>style.visibility</p:attrName>
-                                        </p:attrNameLst>
-                                      </p:cBhvr>
-                                      <p:to>
-                                        <p:strVal val="visible"/>
-                                      </p:to>
-                                    </p:set>
-                                    <p:anim calcmode="lin" valueType="num">
-                                      <p:cBhvr additive="base">
-                                        <p:cTn id="39" dur="500" fill="hold"/>
-                                        <p:tgtEl>
-                                          <p:spTgt spid="3">
-                                            <p:txEl>
-                                              <p:pRg st="9" end="9"/>
-                                            </p:txEl>
-                                          </p:spTgt>
-                                        </p:tgtEl>
-                                        <p:attrNameLst>
-                                          <p:attrName>ppt_x</p:attrName>
-                                        </p:attrNameLst>
-                                      </p:cBhvr>
-                                      <p:tavLst>
-                                        <p:tav tm="0">
-                                          <p:val>
-                                            <p:strVal val="#ppt_x"/>
-                                          </p:val>
-                                        </p:tav>
-                                        <p:tav tm="100000">
-                                          <p:val>
-                                            <p:strVal val="#ppt_x"/>
-                                          </p:val>
-                                        </p:tav>
-                                      </p:tavLst>
-                                    </p:anim>
-                                    <p:anim calcmode="lin" valueType="num">
-                                      <p:cBhvr additive="base">
-                                        <p:cTn id="40" dur="500" fill="hold"/>
-                                        <p:tgtEl>
-                                          <p:spTgt spid="3">
-                                            <p:txEl>
-                                              <p:pRg st="9" end="9"/>
-                                            </p:txEl>
-                                          </p:spTgt>
-                                        </p:tgtEl>
-                                        <p:attrNameLst>
-                                          <p:attrName>ppt_y</p:attrName>
-                                        </p:attrNameLst>
-                                      </p:cBhvr>
-                                      <p:tavLst>
-                                        <p:tav tm="0">
-                                          <p:val>
-                                            <p:strVal val="1+#ppt_h/2"/>
-                                          </p:val>
-                                        </p:tav>
-                                        <p:tav tm="100000">
-                                          <p:val>
-                                            <p:strVal val="#ppt_y"/>
-                                          </p:val>
-                                        </p:tav>
-                                      </p:tavLst>
-                                    </p:anim>
-                                  </p:childTnLst>
-                                </p:cTn>
-                              </p:par>
-                              <p:par>
-                                <p:cTn id="41" presetID="2" presetClass="entr" presetSubtype="4" fill="hold" nodeType="withEffect">
-                                  <p:stCondLst>
-                                    <p:cond delay="0"/>
-                                  </p:stCondLst>
-                                  <p:childTnLst>
-                                    <p:set>
-                                      <p:cBhvr>
-                                        <p:cTn id="42" dur="1" fill="hold">
-                                          <p:stCondLst>
-                                            <p:cond delay="0"/>
-                                          </p:stCondLst>
-                                        </p:cTn>
-                                        <p:tgtEl>
-                                          <p:spTgt spid="3">
-                                            <p:txEl>
-                                              <p:pRg st="10" end="10"/>
-                                            </p:txEl>
-                                          </p:spTgt>
-                                        </p:tgtEl>
-                                        <p:attrNameLst>
-                                          <p:attrName>style.visibility</p:attrName>
-                                        </p:attrNameLst>
-                                      </p:cBhvr>
-                                      <p:to>
-                                        <p:strVal val="visible"/>
-                                      </p:to>
-                                    </p:set>
-                                    <p:anim calcmode="lin" valueType="num">
-                                      <p:cBhvr additive="base">
-                                        <p:cTn id="43" dur="500" fill="hold"/>
-                                        <p:tgtEl>
-                                          <p:spTgt spid="3">
-                                            <p:txEl>
-                                              <p:pRg st="10" end="10"/>
-                                            </p:txEl>
-                                          </p:spTgt>
-                                        </p:tgtEl>
-                                        <p:attrNameLst>
-                                          <p:attrName>ppt_x</p:attrName>
-                                        </p:attrNameLst>
-                                      </p:cBhvr>
-                                      <p:tavLst>
-                                        <p:tav tm="0">
-                                          <p:val>
-                                            <p:strVal val="#ppt_x"/>
-                                          </p:val>
-                                        </p:tav>
-                                        <p:tav tm="100000">
-                                          <p:val>
-                                            <p:strVal val="#ppt_x"/>
-                                          </p:val>
-                                        </p:tav>
-                                      </p:tavLst>
-                                    </p:anim>
-                                    <p:anim calcmode="lin" valueType="num">
-                                      <p:cBhvr additive="base">
-                                        <p:cTn id="44" dur="500" fill="hold"/>
-                                        <p:tgtEl>
-                                          <p:spTgt spid="3">
-                                            <p:txEl>
-                                              <p:pRg st="10" end="10"/>
+                                              <p:pRg st="7" end="7"/>
                                             </p:txEl>
                                           </p:spTgt>
                                         </p:tgtEl>
@@ -20400,7 +19930,7 @@
                                         <p:tgtEl>
                                           <p:spTgt spid="3">
                                             <p:txEl>
-                                              <p:pRg st="0" end="0"/>
+                                              <p:pRg st="6" end="6"/>
                                             </p:txEl>
                                           </p:spTgt>
                                         </p:tgtEl>
@@ -20418,7 +19948,7 @@
                                         <p:tgtEl>
                                           <p:spTgt spid="3">
                                             <p:txEl>
-                                              <p:pRg st="0" end="0"/>
+                                              <p:pRg st="6" end="6"/>
                                             </p:txEl>
                                           </p:spTgt>
                                         </p:tgtEl>
@@ -20445,7 +19975,7 @@
                                         <p:tgtEl>
                                           <p:spTgt spid="3">
                                             <p:txEl>
-                                              <p:pRg st="0" end="0"/>
+                                              <p:pRg st="6" end="6"/>
                                             </p:txEl>
                                           </p:spTgt>
                                         </p:tgtEl>
@@ -20485,7 +20015,7 @@
                                         <p:tgtEl>
                                           <p:spTgt spid="3">
                                             <p:txEl>
-                                              <p:pRg st="1" end="1"/>
+                                              <p:pRg st="7" end="7"/>
                                             </p:txEl>
                                           </p:spTgt>
                                         </p:tgtEl>
@@ -20503,7 +20033,7 @@
                                         <p:tgtEl>
                                           <p:spTgt spid="3">
                                             <p:txEl>
-                                              <p:pRg st="1" end="1"/>
+                                              <p:pRg st="7" end="7"/>
                                             </p:txEl>
                                           </p:spTgt>
                                         </p:tgtEl>
@@ -20530,7 +20060,7 @@
                                         <p:tgtEl>
                                           <p:spTgt spid="3">
                                             <p:txEl>
-                                              <p:pRg st="1" end="1"/>
+                                              <p:pRg st="7" end="7"/>
                                             </p:txEl>
                                           </p:spTgt>
                                         </p:tgtEl>
@@ -20570,7 +20100,7 @@
                                         <p:tgtEl>
                                           <p:spTgt spid="3">
                                             <p:txEl>
-                                              <p:pRg st="2" end="2"/>
+                                              <p:pRg st="8" end="8"/>
                                             </p:txEl>
                                           </p:spTgt>
                                         </p:tgtEl>
@@ -20585,449 +20115,6 @@
                                     <p:anim calcmode="lin" valueType="num">
                                       <p:cBhvr additive="base">
                                         <p:cTn id="15" dur="500" fill="hold"/>
-                                        <p:tgtEl>
-                                          <p:spTgt spid="3">
-                                            <p:txEl>
-                                              <p:pRg st="2" end="2"/>
-                                            </p:txEl>
-                                          </p:spTgt>
-                                        </p:tgtEl>
-                                        <p:attrNameLst>
-                                          <p:attrName>ppt_x</p:attrName>
-                                        </p:attrNameLst>
-                                      </p:cBhvr>
-                                      <p:tavLst>
-                                        <p:tav tm="0">
-                                          <p:val>
-                                            <p:strVal val="#ppt_x"/>
-                                          </p:val>
-                                        </p:tav>
-                                        <p:tav tm="100000">
-                                          <p:val>
-                                            <p:strVal val="#ppt_x"/>
-                                          </p:val>
-                                        </p:tav>
-                                      </p:tavLst>
-                                    </p:anim>
-                                    <p:anim calcmode="lin" valueType="num">
-                                      <p:cBhvr additive="base">
-                                        <p:cTn id="16" dur="500" fill="hold"/>
-                                        <p:tgtEl>
-                                          <p:spTgt spid="3">
-                                            <p:txEl>
-                                              <p:pRg st="2" end="2"/>
-                                            </p:txEl>
-                                          </p:spTgt>
-                                        </p:tgtEl>
-                                        <p:attrNameLst>
-                                          <p:attrName>ppt_y</p:attrName>
-                                        </p:attrNameLst>
-                                      </p:cBhvr>
-                                      <p:tavLst>
-                                        <p:tav tm="0">
-                                          <p:val>
-                                            <p:strVal val="1+#ppt_h/2"/>
-                                          </p:val>
-                                        </p:tav>
-                                        <p:tav tm="100000">
-                                          <p:val>
-                                            <p:strVal val="#ppt_y"/>
-                                          </p:val>
-                                        </p:tav>
-                                      </p:tavLst>
-                                    </p:anim>
-                                  </p:childTnLst>
-                                </p:cTn>
-                              </p:par>
-                              <p:par>
-                                <p:cTn id="17" presetID="2" presetClass="entr" presetSubtype="4" fill="hold" nodeType="withEffect">
-                                  <p:stCondLst>
-                                    <p:cond delay="0"/>
-                                  </p:stCondLst>
-                                  <p:childTnLst>
-                                    <p:set>
-                                      <p:cBhvr>
-                                        <p:cTn id="18" dur="1" fill="hold">
-                                          <p:stCondLst>
-                                            <p:cond delay="0"/>
-                                          </p:stCondLst>
-                                        </p:cTn>
-                                        <p:tgtEl>
-                                          <p:spTgt spid="3">
-                                            <p:txEl>
-                                              <p:pRg st="3" end="3"/>
-                                            </p:txEl>
-                                          </p:spTgt>
-                                        </p:tgtEl>
-                                        <p:attrNameLst>
-                                          <p:attrName>style.visibility</p:attrName>
-                                        </p:attrNameLst>
-                                      </p:cBhvr>
-                                      <p:to>
-                                        <p:strVal val="visible"/>
-                                      </p:to>
-                                    </p:set>
-                                    <p:anim calcmode="lin" valueType="num">
-                                      <p:cBhvr additive="base">
-                                        <p:cTn id="19" dur="500" fill="hold"/>
-                                        <p:tgtEl>
-                                          <p:spTgt spid="3">
-                                            <p:txEl>
-                                              <p:pRg st="3" end="3"/>
-                                            </p:txEl>
-                                          </p:spTgt>
-                                        </p:tgtEl>
-                                        <p:attrNameLst>
-                                          <p:attrName>ppt_x</p:attrName>
-                                        </p:attrNameLst>
-                                      </p:cBhvr>
-                                      <p:tavLst>
-                                        <p:tav tm="0">
-                                          <p:val>
-                                            <p:strVal val="#ppt_x"/>
-                                          </p:val>
-                                        </p:tav>
-                                        <p:tav tm="100000">
-                                          <p:val>
-                                            <p:strVal val="#ppt_x"/>
-                                          </p:val>
-                                        </p:tav>
-                                      </p:tavLst>
-                                    </p:anim>
-                                    <p:anim calcmode="lin" valueType="num">
-                                      <p:cBhvr additive="base">
-                                        <p:cTn id="20" dur="500" fill="hold"/>
-                                        <p:tgtEl>
-                                          <p:spTgt spid="3">
-                                            <p:txEl>
-                                              <p:pRg st="3" end="3"/>
-                                            </p:txEl>
-                                          </p:spTgt>
-                                        </p:tgtEl>
-                                        <p:attrNameLst>
-                                          <p:attrName>ppt_y</p:attrName>
-                                        </p:attrNameLst>
-                                      </p:cBhvr>
-                                      <p:tavLst>
-                                        <p:tav tm="0">
-                                          <p:val>
-                                            <p:strVal val="1+#ppt_h/2"/>
-                                          </p:val>
-                                        </p:tav>
-                                        <p:tav tm="100000">
-                                          <p:val>
-                                            <p:strVal val="#ppt_y"/>
-                                          </p:val>
-                                        </p:tav>
-                                      </p:tavLst>
-                                    </p:anim>
-                                  </p:childTnLst>
-                                </p:cTn>
-                              </p:par>
-                              <p:par>
-                                <p:cTn id="21" presetID="2" presetClass="entr" presetSubtype="4" fill="hold" nodeType="withEffect">
-                                  <p:stCondLst>
-                                    <p:cond delay="0"/>
-                                  </p:stCondLst>
-                                  <p:childTnLst>
-                                    <p:set>
-                                      <p:cBhvr>
-                                        <p:cTn id="22" dur="1" fill="hold">
-                                          <p:stCondLst>
-                                            <p:cond delay="0"/>
-                                          </p:stCondLst>
-                                        </p:cTn>
-                                        <p:tgtEl>
-                                          <p:spTgt spid="3">
-                                            <p:txEl>
-                                              <p:pRg st="4" end="4"/>
-                                            </p:txEl>
-                                          </p:spTgt>
-                                        </p:tgtEl>
-                                        <p:attrNameLst>
-                                          <p:attrName>style.visibility</p:attrName>
-                                        </p:attrNameLst>
-                                      </p:cBhvr>
-                                      <p:to>
-                                        <p:strVal val="visible"/>
-                                      </p:to>
-                                    </p:set>
-                                    <p:anim calcmode="lin" valueType="num">
-                                      <p:cBhvr additive="base">
-                                        <p:cTn id="23" dur="500" fill="hold"/>
-                                        <p:tgtEl>
-                                          <p:spTgt spid="3">
-                                            <p:txEl>
-                                              <p:pRg st="4" end="4"/>
-                                            </p:txEl>
-                                          </p:spTgt>
-                                        </p:tgtEl>
-                                        <p:attrNameLst>
-                                          <p:attrName>ppt_x</p:attrName>
-                                        </p:attrNameLst>
-                                      </p:cBhvr>
-                                      <p:tavLst>
-                                        <p:tav tm="0">
-                                          <p:val>
-                                            <p:strVal val="#ppt_x"/>
-                                          </p:val>
-                                        </p:tav>
-                                        <p:tav tm="100000">
-                                          <p:val>
-                                            <p:strVal val="#ppt_x"/>
-                                          </p:val>
-                                        </p:tav>
-                                      </p:tavLst>
-                                    </p:anim>
-                                    <p:anim calcmode="lin" valueType="num">
-                                      <p:cBhvr additive="base">
-                                        <p:cTn id="24" dur="500" fill="hold"/>
-                                        <p:tgtEl>
-                                          <p:spTgt spid="3">
-                                            <p:txEl>
-                                              <p:pRg st="4" end="4"/>
-                                            </p:txEl>
-                                          </p:spTgt>
-                                        </p:tgtEl>
-                                        <p:attrNameLst>
-                                          <p:attrName>ppt_y</p:attrName>
-                                        </p:attrNameLst>
-                                      </p:cBhvr>
-                                      <p:tavLst>
-                                        <p:tav tm="0">
-                                          <p:val>
-                                            <p:strVal val="1+#ppt_h/2"/>
-                                          </p:val>
-                                        </p:tav>
-                                        <p:tav tm="100000">
-                                          <p:val>
-                                            <p:strVal val="#ppt_y"/>
-                                          </p:val>
-                                        </p:tav>
-                                      </p:tavLst>
-                                    </p:anim>
-                                  </p:childTnLst>
-                                </p:cTn>
-                              </p:par>
-                            </p:childTnLst>
-                          </p:cTn>
-                        </p:par>
-                      </p:childTnLst>
-                    </p:cTn>
-                  </p:par>
-                  <p:par>
-                    <p:cTn id="25" fill="hold">
-                      <p:stCondLst>
-                        <p:cond delay="indefinite"/>
-                      </p:stCondLst>
-                      <p:childTnLst>
-                        <p:par>
-                          <p:cTn id="26" fill="hold">
-                            <p:stCondLst>
-                              <p:cond delay="0"/>
-                            </p:stCondLst>
-                            <p:childTnLst>
-                              <p:par>
-                                <p:cTn id="27" presetID="2" presetClass="entr" presetSubtype="4" fill="hold" nodeType="clickEffect">
-                                  <p:stCondLst>
-                                    <p:cond delay="0"/>
-                                  </p:stCondLst>
-                                  <p:childTnLst>
-                                    <p:set>
-                                      <p:cBhvr>
-                                        <p:cTn id="28" dur="1" fill="hold">
-                                          <p:stCondLst>
-                                            <p:cond delay="0"/>
-                                          </p:stCondLst>
-                                        </p:cTn>
-                                        <p:tgtEl>
-                                          <p:spTgt spid="3">
-                                            <p:txEl>
-                                              <p:pRg st="6" end="6"/>
-                                            </p:txEl>
-                                          </p:spTgt>
-                                        </p:tgtEl>
-                                        <p:attrNameLst>
-                                          <p:attrName>style.visibility</p:attrName>
-                                        </p:attrNameLst>
-                                      </p:cBhvr>
-                                      <p:to>
-                                        <p:strVal val="visible"/>
-                                      </p:to>
-                                    </p:set>
-                                    <p:anim calcmode="lin" valueType="num">
-                                      <p:cBhvr additive="base">
-                                        <p:cTn id="29" dur="500" fill="hold"/>
-                                        <p:tgtEl>
-                                          <p:spTgt spid="3">
-                                            <p:txEl>
-                                              <p:pRg st="6" end="6"/>
-                                            </p:txEl>
-                                          </p:spTgt>
-                                        </p:tgtEl>
-                                        <p:attrNameLst>
-                                          <p:attrName>ppt_x</p:attrName>
-                                        </p:attrNameLst>
-                                      </p:cBhvr>
-                                      <p:tavLst>
-                                        <p:tav tm="0">
-                                          <p:val>
-                                            <p:strVal val="#ppt_x"/>
-                                          </p:val>
-                                        </p:tav>
-                                        <p:tav tm="100000">
-                                          <p:val>
-                                            <p:strVal val="#ppt_x"/>
-                                          </p:val>
-                                        </p:tav>
-                                      </p:tavLst>
-                                    </p:anim>
-                                    <p:anim calcmode="lin" valueType="num">
-                                      <p:cBhvr additive="base">
-                                        <p:cTn id="30" dur="500" fill="hold"/>
-                                        <p:tgtEl>
-                                          <p:spTgt spid="3">
-                                            <p:txEl>
-                                              <p:pRg st="6" end="6"/>
-                                            </p:txEl>
-                                          </p:spTgt>
-                                        </p:tgtEl>
-                                        <p:attrNameLst>
-                                          <p:attrName>ppt_y</p:attrName>
-                                        </p:attrNameLst>
-                                      </p:cBhvr>
-                                      <p:tavLst>
-                                        <p:tav tm="0">
-                                          <p:val>
-                                            <p:strVal val="1+#ppt_h/2"/>
-                                          </p:val>
-                                        </p:tav>
-                                        <p:tav tm="100000">
-                                          <p:val>
-                                            <p:strVal val="#ppt_y"/>
-                                          </p:val>
-                                        </p:tav>
-                                      </p:tavLst>
-                                    </p:anim>
-                                  </p:childTnLst>
-                                </p:cTn>
-                              </p:par>
-                              <p:par>
-                                <p:cTn id="31" presetID="2" presetClass="entr" presetSubtype="4" fill="hold" nodeType="withEffect">
-                                  <p:stCondLst>
-                                    <p:cond delay="0"/>
-                                  </p:stCondLst>
-                                  <p:childTnLst>
-                                    <p:set>
-                                      <p:cBhvr>
-                                        <p:cTn id="32" dur="1" fill="hold">
-                                          <p:stCondLst>
-                                            <p:cond delay="0"/>
-                                          </p:stCondLst>
-                                        </p:cTn>
-                                        <p:tgtEl>
-                                          <p:spTgt spid="3">
-                                            <p:txEl>
-                                              <p:pRg st="7" end="7"/>
-                                            </p:txEl>
-                                          </p:spTgt>
-                                        </p:tgtEl>
-                                        <p:attrNameLst>
-                                          <p:attrName>style.visibility</p:attrName>
-                                        </p:attrNameLst>
-                                      </p:cBhvr>
-                                      <p:to>
-                                        <p:strVal val="visible"/>
-                                      </p:to>
-                                    </p:set>
-                                    <p:anim calcmode="lin" valueType="num">
-                                      <p:cBhvr additive="base">
-                                        <p:cTn id="33" dur="500" fill="hold"/>
-                                        <p:tgtEl>
-                                          <p:spTgt spid="3">
-                                            <p:txEl>
-                                              <p:pRg st="7" end="7"/>
-                                            </p:txEl>
-                                          </p:spTgt>
-                                        </p:tgtEl>
-                                        <p:attrNameLst>
-                                          <p:attrName>ppt_x</p:attrName>
-                                        </p:attrNameLst>
-                                      </p:cBhvr>
-                                      <p:tavLst>
-                                        <p:tav tm="0">
-                                          <p:val>
-                                            <p:strVal val="#ppt_x"/>
-                                          </p:val>
-                                        </p:tav>
-                                        <p:tav tm="100000">
-                                          <p:val>
-                                            <p:strVal val="#ppt_x"/>
-                                          </p:val>
-                                        </p:tav>
-                                      </p:tavLst>
-                                    </p:anim>
-                                    <p:anim calcmode="lin" valueType="num">
-                                      <p:cBhvr additive="base">
-                                        <p:cTn id="34" dur="500" fill="hold"/>
-                                        <p:tgtEl>
-                                          <p:spTgt spid="3">
-                                            <p:txEl>
-                                              <p:pRg st="7" end="7"/>
-                                            </p:txEl>
-                                          </p:spTgt>
-                                        </p:tgtEl>
-                                        <p:attrNameLst>
-                                          <p:attrName>ppt_y</p:attrName>
-                                        </p:attrNameLst>
-                                      </p:cBhvr>
-                                      <p:tavLst>
-                                        <p:tav tm="0">
-                                          <p:val>
-                                            <p:strVal val="1+#ppt_h/2"/>
-                                          </p:val>
-                                        </p:tav>
-                                        <p:tav tm="100000">
-                                          <p:val>
-                                            <p:strVal val="#ppt_y"/>
-                                          </p:val>
-                                        </p:tav>
-                                      </p:tavLst>
-                                    </p:anim>
-                                  </p:childTnLst>
-                                </p:cTn>
-                              </p:par>
-                              <p:par>
-                                <p:cTn id="35" presetID="2" presetClass="entr" presetSubtype="4" fill="hold" nodeType="withEffect">
-                                  <p:stCondLst>
-                                    <p:cond delay="0"/>
-                                  </p:stCondLst>
-                                  <p:childTnLst>
-                                    <p:set>
-                                      <p:cBhvr>
-                                        <p:cTn id="36" dur="1" fill="hold">
-                                          <p:stCondLst>
-                                            <p:cond delay="0"/>
-                                          </p:stCondLst>
-                                        </p:cTn>
-                                        <p:tgtEl>
-                                          <p:spTgt spid="3">
-                                            <p:txEl>
-                                              <p:pRg st="8" end="8"/>
-                                            </p:txEl>
-                                          </p:spTgt>
-                                        </p:tgtEl>
-                                        <p:attrNameLst>
-                                          <p:attrName>style.visibility</p:attrName>
-                                        </p:attrNameLst>
-                                      </p:cBhvr>
-                                      <p:to>
-                                        <p:strVal val="visible"/>
-                                      </p:to>
-                                    </p:set>
-                                    <p:anim calcmode="lin" valueType="num">
-                                      <p:cBhvr additive="base">
-                                        <p:cTn id="37" dur="500" fill="hold"/>
                                         <p:tgtEl>
                                           <p:spTgt spid="3">
                                             <p:txEl>
@@ -21054,7 +20141,7 @@
                                     </p:anim>
                                     <p:anim calcmode="lin" valueType="num">
                                       <p:cBhvr additive="base">
-                                        <p:cTn id="38" dur="500" fill="hold"/>
+                                        <p:cTn id="16" dur="500" fill="hold"/>
                                         <p:tgtEl>
                                           <p:spTgt spid="3">
                                             <p:txEl>
@@ -21335,7 +20422,7 @@
     </p:spTree>
     <p:extLst>
       <p:ext uri="{BB962C8B-B14F-4D97-AF65-F5344CB8AC3E}">
-        <p14:creationId xmlns:p14="http://schemas.microsoft.com/office/powerpoint/2010/main" val="370006920"/>
+        <p14:creationId xmlns:p14="http://schemas.microsoft.com/office/powerpoint/2010/main" val="1196243364"/>
       </p:ext>
     </p:extLst>
   </p:cSld>
@@ -21424,8 +20511,8 @@
         </p:nvSpPr>
         <p:spPr>
           <a:xfrm>
-            <a:off x="558801" y="1329179"/>
-            <a:ext cx="11214100" cy="5335572"/>
+            <a:off x="399068" y="1329179"/>
+            <a:ext cx="11792932" cy="5335572"/>
           </a:xfrm>
         </p:spPr>
         <p:txBody>
@@ -21443,7 +20530,7 @@
                   <a:srgbClr val="451717"/>
                 </a:solidFill>
               </a:rPr>
-              <a:t>[1] IBM, </a:t>
+              <a:t>[1] </a:t>
             </a:r>
             <a:r>
               <a:rPr lang="en-IN" sz="11200" b="1" dirty="0" smtClean="0">
@@ -21475,16 +20562,108 @@
                   <a:srgbClr val="451717"/>
                 </a:solidFill>
               </a:rPr>
+              <a:t>, IBM, [Available </a:t>
+            </a:r>
+            <a:r>
+              <a:rPr lang="en-IN" sz="11200" dirty="0">
+                <a:solidFill>
+                  <a:srgbClr val="451717"/>
+                </a:solidFill>
+              </a:rPr>
+              <a:t>at: </a:t>
+            </a:r>
+            <a:r>
+              <a:rPr lang="en-IN" sz="11200" dirty="0">
+                <a:solidFill>
+                  <a:srgbClr val="0000FF"/>
+                </a:solidFill>
+              </a:rPr>
+              <a:t>https://www.ibm.com/think/topics/computer-vision</a:t>
+            </a:r>
+            <a:r>
+              <a:rPr lang="en-IN" sz="11200" dirty="0" smtClean="0">
+                <a:solidFill>
+                  <a:srgbClr val="451717"/>
+                </a:solidFill>
+              </a:rPr>
+              <a:t>], [</a:t>
+            </a:r>
+            <a:r>
+              <a:rPr lang="en-IN" sz="11200" dirty="0">
+                <a:solidFill>
+                  <a:srgbClr val="451717"/>
+                </a:solidFill>
+              </a:rPr>
+              <a:t>Accessed: </a:t>
+            </a:r>
+            <a:r>
+              <a:rPr lang="en-IN" sz="11200" dirty="0" smtClean="0">
+                <a:solidFill>
+                  <a:srgbClr val="451717"/>
+                </a:solidFill>
+              </a:rPr>
+              <a:t>Feb. 12, 2025].</a:t>
+            </a:r>
+          </a:p>
+          <a:p>
+            <a:pPr marL="0" indent="0">
+              <a:buNone/>
+            </a:pPr>
+            <a:r>
+              <a:rPr lang="en-IN" sz="11200" dirty="0" smtClean="0">
+                <a:solidFill>
+                  <a:srgbClr val="451717"/>
+                </a:solidFill>
+              </a:rPr>
+              <a:t>[2] </a:t>
+            </a:r>
+            <a:r>
+              <a:rPr lang="en-IN" sz="11200" dirty="0" err="1">
+                <a:solidFill>
+                  <a:srgbClr val="451717"/>
+                </a:solidFill>
+              </a:rPr>
+              <a:t>Hmrishav</a:t>
+            </a:r>
+            <a:r>
+              <a:rPr lang="en-IN" sz="11200" dirty="0">
+                <a:solidFill>
+                  <a:srgbClr val="451717"/>
+                </a:solidFill>
+              </a:rPr>
+              <a:t> </a:t>
+            </a:r>
+            <a:r>
+              <a:rPr lang="en-IN" sz="11200" dirty="0" err="1" smtClean="0">
+                <a:solidFill>
+                  <a:srgbClr val="451717"/>
+                </a:solidFill>
+              </a:rPr>
+              <a:t>Bandyopadhyay</a:t>
+            </a:r>
+            <a:r>
+              <a:rPr lang="en-IN" sz="11200" dirty="0" smtClean="0">
+                <a:solidFill>
+                  <a:srgbClr val="451717"/>
+                </a:solidFill>
+              </a:rPr>
               <a:t>, </a:t>
             </a:r>
             <a:r>
+              <a:rPr lang="en-IN" sz="11200" b="1" dirty="0" smtClean="0">
+                <a:solidFill>
+                  <a:srgbClr val="451717"/>
+                </a:solidFill>
+              </a:rPr>
+              <a:t>Human Vision Vs Computer Vision Image</a:t>
+            </a:r>
+            <a:r>
               <a:rPr lang="en-IN" sz="11200" dirty="0" smtClean="0">
                 <a:solidFill>
                   <a:srgbClr val="451717"/>
                 </a:solidFill>
-                <a:hlinkClick r:id="rId2"/>
-              </a:rPr>
-              <a:t>URL</a:t>
+              </a:rPr>
+              <a:t>, V7labs</a:t>
             </a:r>
             <a:r>
               <a:rPr lang="en-IN" sz="11200" dirty="0">
@@ -21492,15 +20671,31 @@
                   <a:srgbClr val="451717"/>
                 </a:solidFill>
               </a:rPr>
-              <a:t> </a:t>
+              <a:t>, [Available at: </a:t>
+            </a:r>
+            <a:r>
+              <a:rPr lang="en-IN" sz="11200" dirty="0">
+                <a:solidFill>
+                  <a:srgbClr val="0000FF"/>
+                </a:solidFill>
+              </a:rPr>
+              <a:t>https://</a:t>
             </a:r>
             <a:r>
               <a:rPr lang="en-IN" sz="11200" dirty="0" smtClean="0">
                 <a:solidFill>
+                  <a:srgbClr val="0000FF"/>
+                </a:solidFill>
+              </a:rPr>
+              <a:t>www.v7labs.com/blog/what-is-computer-vision</a:t>
+            </a:r>
+            <a:r>
+              <a:rPr lang="en-IN" sz="11200" dirty="0" smtClean="0">
+                <a:solidFill>
                   <a:srgbClr val="451717"/>
                 </a:solidFill>
               </a:rPr>
-              <a:t>, [</a:t>
+              <a:t>], </a:t>
             </a:r>
             <a:r>
               <a:rPr lang="en-IN" sz="11200" dirty="0">
@@ -21508,7 +20703,7 @@
                   <a:srgbClr val="451717"/>
                 </a:solidFill>
               </a:rPr>
-              <a:t>Accessed: </a:t>
+              <a:t>[Accessed: Feb. </a:t>
             </a:r>
             <a:r>
               <a:rPr lang="en-IN" sz="11200" dirty="0" smtClean="0">
@@ -21516,7 +20711,23 @@
                   <a:srgbClr val="451717"/>
                 </a:solidFill>
               </a:rPr>
-              <a:t>Feb. 2, 2025].</a:t>
+              <a:t>12</a:t>
+            </a:r>
+            <a:r>
+              <a:rPr lang="en-IN" sz="11200" dirty="0">
+                <a:solidFill>
+                  <a:srgbClr val="451717"/>
+                </a:solidFill>
+              </a:rPr>
+              <a:t>, 2025</a:t>
+            </a:r>
+            <a:r>
+              <a:rPr lang="en-IN" sz="11200" dirty="0" smtClean="0">
+                <a:solidFill>
+                  <a:srgbClr val="451717"/>
+                </a:solidFill>
+              </a:rPr>
+              <a:t>].</a:t>
             </a:r>
           </a:p>
           <a:p>
@@ -21529,34 +20740,71 @@
                   <a:srgbClr val="451717"/>
                 </a:solidFill>
               </a:rPr>
-              <a:t>[2] </a:t>
-            </a:r>
-            <a:r>
-              <a:rPr lang="en-IN" sz="11200" dirty="0" err="1">
+              <a:t>[3] ARYAN-PURI, </a:t>
+            </a:r>
+            <a:r>
+              <a:rPr lang="en-IN" sz="11200" b="1" dirty="0" smtClean="0">
                 <a:solidFill>
                   <a:srgbClr val="451717"/>
                 </a:solidFill>
-                <a:hlinkClick r:id="rId3"/>
-              </a:rPr>
-              <a:t>Hmrishav</a:t>
+              </a:rPr>
+              <a:t>OpenCV-Learning</a:t>
+            </a:r>
+            <a:r>
+              <a:rPr lang="en-IN" sz="11200" dirty="0" smtClean="0">
+                <a:solidFill>
+                  <a:srgbClr val="451717"/>
+                </a:solidFill>
+              </a:rPr>
+              <a:t>, GitHub, </a:t>
             </a:r>
             <a:r>
               <a:rPr lang="en-IN" sz="11200" dirty="0">
                 <a:solidFill>
                   <a:srgbClr val="451717"/>
                 </a:solidFill>
-                <a:hlinkClick r:id="rId3"/>
-              </a:rPr>
-              <a:t> </a:t>
-            </a:r>
-            <a:r>
-              <a:rPr lang="en-IN" sz="11200" dirty="0" err="1" smtClean="0">
+              </a:rPr>
+              <a:t>[Available at: </a:t>
+            </a:r>
+            <a:r>
+              <a:rPr lang="en-IN" sz="11200" dirty="0" smtClean="0">
+                <a:solidFill>
+                  <a:srgbClr val="0000FF"/>
+                </a:solidFill>
+              </a:rPr>
+              <a:t>https</a:t>
+            </a:r>
+            <a:r>
+              <a:rPr lang="en-IN" sz="11200" dirty="0">
+                <a:solidFill>
+                  <a:srgbClr val="0000FF"/>
+                </a:solidFill>
+              </a:rPr>
+              <a:t>://</a:t>
+            </a:r>
+            <a:r>
+              <a:rPr lang="en-IN" sz="11200" dirty="0" smtClean="0">
+                <a:solidFill>
+                  <a:srgbClr val="0000FF"/>
+                </a:solidFill>
+              </a:rPr>
+              <a:t>github.com/ARYAN-PURI/OpenCV-Learning/blob/main/8.py</a:t>
+            </a:r>
+            <a:r>
+              <a:rPr lang="en-IN" sz="11200" dirty="0" smtClean="0">
                 <a:solidFill>
                   <a:srgbClr val="451717"/>
                 </a:solidFill>
-                <a:hlinkClick r:id="rId3"/>
-              </a:rPr>
-              <a:t>Bandyopadhyay</a:t>
+              </a:rPr>
+              <a:t>], </a:t>
+            </a:r>
+            <a:r>
+              <a:rPr lang="en-IN" sz="11200" dirty="0">
+                <a:solidFill>
+                  <a:srgbClr val="451717"/>
+                </a:solidFill>
+              </a:rPr>
+              <a:t>[Accessed: Feb. </a:t>
             </a:r>
             <a:r>
               <a:rPr lang="en-IN" sz="11200" dirty="0" smtClean="0">
@@ -21564,7 +20812,36 @@
                   <a:srgbClr val="451717"/>
                 </a:solidFill>
               </a:rPr>
-              <a:t>, </a:t>
+              <a:t>12</a:t>
+            </a:r>
+            <a:r>
+              <a:rPr lang="en-IN" sz="11200" dirty="0">
+                <a:solidFill>
+                  <a:srgbClr val="451717"/>
+                </a:solidFill>
+              </a:rPr>
+              <a:t>, 2025</a:t>
+            </a:r>
+            <a:r>
+              <a:rPr lang="en-IN" sz="11200" dirty="0" smtClean="0">
+                <a:solidFill>
+                  <a:srgbClr val="451717"/>
+                </a:solidFill>
+              </a:rPr>
+              <a:t>].</a:t>
+            </a:r>
+          </a:p>
+          <a:p>
+            <a:pPr marL="0" indent="0">
+              <a:buNone/>
+            </a:pPr>
+            <a:r>
+              <a:rPr lang="en-IN" sz="11200" dirty="0" smtClean="0">
+                <a:solidFill>
+                  <a:srgbClr val="451717"/>
+                </a:solidFill>
+              </a:rPr>
+              <a:t>[4] </a:t>
             </a:r>
             <a:r>
               <a:rPr lang="en-IN" sz="11200" b="1" dirty="0" smtClean="0">
@@ -21572,7 +20849,7 @@
                   <a:srgbClr val="451717"/>
                 </a:solidFill>
               </a:rPr>
-              <a:t>Human Vision Vs Computer Vision Image</a:t>
+              <a:t>top-11-computer-vision-applications-in-healthcare Image</a:t>
             </a:r>
             <a:r>
               <a:rPr lang="en-IN" sz="11200" dirty="0" smtClean="0">
@@ -21580,16 +20857,47 @@
                   <a:srgbClr val="451717"/>
                 </a:solidFill>
               </a:rPr>
-              <a:t>, V7labs, </a:t>
+              <a:t>, Plugger.AI</a:t>
+            </a:r>
+            <a:r>
+              <a:rPr lang="en-IN" sz="11200" dirty="0">
+                <a:solidFill>
+                  <a:srgbClr val="451717"/>
+                </a:solidFill>
+              </a:rPr>
+              <a:t>, [Available at: </a:t>
+            </a:r>
+            <a:r>
+              <a:rPr lang="en-IN" sz="11200" dirty="0">
+                <a:solidFill>
+                  <a:srgbClr val="0000FF"/>
+                </a:solidFill>
+              </a:rPr>
+              <a:t>https://</a:t>
             </a:r>
             <a:r>
               <a:rPr lang="en-IN" sz="11200" dirty="0" smtClean="0">
                 <a:solidFill>
+                  <a:srgbClr val="0000FF"/>
+                </a:solidFill>
+              </a:rPr>
+              <a:t>www.plugger.ai/blog/top-11-computer-vision-applications-in-healthcare</a:t>
+            </a:r>
+            <a:r>
+              <a:rPr lang="en-IN" sz="11200" dirty="0" smtClean="0">
+                <a:solidFill>
                   <a:srgbClr val="451717"/>
                 </a:solidFill>
-                <a:hlinkClick r:id="rId4"/>
-              </a:rPr>
-              <a:t>URL</a:t>
+              </a:rPr>
+              <a:t>], </a:t>
+            </a:r>
+            <a:r>
+              <a:rPr lang="en-IN" sz="11200" dirty="0">
+                <a:solidFill>
+                  <a:srgbClr val="451717"/>
+                </a:solidFill>
+              </a:rPr>
+              <a:t>[Accessed: Feb. </a:t>
             </a:r>
             <a:r>
               <a:rPr lang="en-IN" sz="11200" dirty="0" smtClean="0">
@@ -21597,7 +20905,7 @@
                   <a:srgbClr val="451717"/>
                 </a:solidFill>
               </a:rPr>
-              <a:t>, </a:t>
+              <a:t>13, </a:t>
             </a:r>
             <a:r>
               <a:rPr lang="en-IN" sz="11200" dirty="0">
@@ -21605,7 +20913,7 @@
                   <a:srgbClr val="451717"/>
                 </a:solidFill>
               </a:rPr>
-              <a:t>[Accessed: Feb. 2, 2025</a:t>
+              <a:t>2025</a:t>
             </a:r>
             <a:r>
               <a:rPr lang="en-IN" sz="11200" dirty="0" smtClean="0">
@@ -21615,343 +20923,6 @@
               </a:rPr>
               <a:t>].</a:t>
             </a:r>
-          </a:p>
-          <a:p>
-            <a:pPr marL="0" indent="0">
-              <a:buNone/>
-            </a:pPr>
-            <a:r>
-              <a:rPr lang="en-IN" sz="11200" dirty="0" smtClean="0">
-                <a:solidFill>
-                  <a:srgbClr val="451717"/>
-                </a:solidFill>
-              </a:rPr>
-              <a:t>[3] ARYAN-PURI, </a:t>
-            </a:r>
-            <a:r>
-              <a:rPr lang="en-IN" sz="11200" b="1" dirty="0" smtClean="0">
-                <a:solidFill>
-                  <a:srgbClr val="451717"/>
-                </a:solidFill>
-              </a:rPr>
-              <a:t>OpenCV-Learning</a:t>
-            </a:r>
-            <a:r>
-              <a:rPr lang="en-IN" sz="11200" dirty="0" smtClean="0">
-                <a:solidFill>
-                  <a:srgbClr val="451717"/>
-                </a:solidFill>
-              </a:rPr>
-              <a:t>, GitHub, </a:t>
-            </a:r>
-            <a:r>
-              <a:rPr lang="en-IN" sz="11200" dirty="0" smtClean="0">
-                <a:solidFill>
-                  <a:srgbClr val="451717"/>
-                </a:solidFill>
-                <a:hlinkClick r:id="rId5"/>
-              </a:rPr>
-              <a:t>URL</a:t>
-            </a:r>
-            <a:r>
-              <a:rPr lang="en-IN" sz="11200" dirty="0" smtClean="0">
-                <a:solidFill>
-                  <a:srgbClr val="451717"/>
-                </a:solidFill>
-              </a:rPr>
-              <a:t>, </a:t>
-            </a:r>
-            <a:r>
-              <a:rPr lang="en-IN" sz="11200" dirty="0">
-                <a:solidFill>
-                  <a:srgbClr val="451717"/>
-                </a:solidFill>
-              </a:rPr>
-              <a:t>[Accessed: Feb. 2, 2025</a:t>
-            </a:r>
-            <a:r>
-              <a:rPr lang="en-IN" sz="11200" dirty="0" smtClean="0">
-                <a:solidFill>
-                  <a:srgbClr val="451717"/>
-                </a:solidFill>
-              </a:rPr>
-              <a:t>].</a:t>
-            </a:r>
-          </a:p>
-          <a:p>
-            <a:pPr marL="0" indent="0">
-              <a:buNone/>
-            </a:pPr>
-            <a:r>
-              <a:rPr lang="en-IN" sz="11200" dirty="0" smtClean="0">
-                <a:solidFill>
-                  <a:srgbClr val="451717"/>
-                </a:solidFill>
-              </a:rPr>
-              <a:t>[4] Plugger.AI</a:t>
-            </a:r>
-            <a:r>
-              <a:rPr lang="en-IN" sz="11200" dirty="0">
-                <a:solidFill>
-                  <a:srgbClr val="451717"/>
-                </a:solidFill>
-              </a:rPr>
-              <a:t>, </a:t>
-            </a:r>
-            <a:r>
-              <a:rPr lang="en-IN" sz="11200" b="1" dirty="0" smtClean="0">
-                <a:solidFill>
-                  <a:srgbClr val="451717"/>
-                </a:solidFill>
-              </a:rPr>
-              <a:t>top-11-computer-vision-applications-in-healthcare Image</a:t>
-            </a:r>
-            <a:r>
-              <a:rPr lang="en-IN" sz="11200" dirty="0" smtClean="0">
-                <a:solidFill>
-                  <a:srgbClr val="451717"/>
-                </a:solidFill>
-              </a:rPr>
-              <a:t>, Plugger.AI, </a:t>
-            </a:r>
-            <a:r>
-              <a:rPr lang="en-IN" sz="11200" dirty="0">
-                <a:solidFill>
-                  <a:srgbClr val="451717"/>
-                </a:solidFill>
-                <a:hlinkClick r:id="rId6"/>
-              </a:rPr>
-              <a:t>URL</a:t>
-            </a:r>
-            <a:r>
-              <a:rPr lang="en-IN" sz="11200" dirty="0">
-                <a:solidFill>
-                  <a:srgbClr val="451717"/>
-                </a:solidFill>
-              </a:rPr>
-              <a:t>, [Accessed: Feb. </a:t>
-            </a:r>
-            <a:r>
-              <a:rPr lang="en-IN" sz="11200" dirty="0" smtClean="0">
-                <a:solidFill>
-                  <a:srgbClr val="451717"/>
-                </a:solidFill>
-              </a:rPr>
-              <a:t>3, </a:t>
-            </a:r>
-            <a:r>
-              <a:rPr lang="en-IN" sz="11200" dirty="0">
-                <a:solidFill>
-                  <a:srgbClr val="451717"/>
-                </a:solidFill>
-              </a:rPr>
-              <a:t>2025</a:t>
-            </a:r>
-            <a:r>
-              <a:rPr lang="en-IN" sz="11200" dirty="0" smtClean="0">
-                <a:solidFill>
-                  <a:srgbClr val="451717"/>
-                </a:solidFill>
-              </a:rPr>
-              <a:t>].</a:t>
-            </a:r>
-          </a:p>
-          <a:p>
-            <a:pPr marL="0" indent="0">
-              <a:buNone/>
-            </a:pPr>
-            <a:r>
-              <a:rPr lang="en-IN" sz="11200" dirty="0" smtClean="0">
-                <a:solidFill>
-                  <a:srgbClr val="451717"/>
-                </a:solidFill>
-              </a:rPr>
-              <a:t>[5</a:t>
-            </a:r>
-            <a:r>
-              <a:rPr lang="en-IN" sz="11200" dirty="0">
-                <a:solidFill>
-                  <a:srgbClr val="451717"/>
-                </a:solidFill>
-              </a:rPr>
-              <a:t>] </a:t>
-            </a:r>
-            <a:r>
-              <a:rPr lang="en-IN" sz="11200" dirty="0" smtClean="0">
-                <a:solidFill>
-                  <a:srgbClr val="451717"/>
-                </a:solidFill>
-              </a:rPr>
-              <a:t>becomminghuman.AI, </a:t>
-            </a:r>
-            <a:r>
-              <a:rPr lang="en-IN" sz="11200" b="1" dirty="0" smtClean="0">
-                <a:solidFill>
-                  <a:srgbClr val="451717"/>
-                </a:solidFill>
-              </a:rPr>
-              <a:t>computer-vision-applications-in-self-driving-cars Image</a:t>
-            </a:r>
-            <a:r>
-              <a:rPr lang="en-IN" sz="11200" dirty="0" smtClean="0">
-                <a:solidFill>
-                  <a:srgbClr val="451717"/>
-                </a:solidFill>
-              </a:rPr>
-              <a:t>, </a:t>
-            </a:r>
-            <a:r>
-              <a:rPr lang="en-IN" sz="11200" dirty="0">
-                <a:solidFill>
-                  <a:srgbClr val="451717"/>
-                </a:solidFill>
-              </a:rPr>
-              <a:t>becomminghuman.AI</a:t>
-            </a:r>
-            <a:r>
-              <a:rPr lang="en-IN" sz="11200" dirty="0" smtClean="0">
-                <a:solidFill>
-                  <a:srgbClr val="451717"/>
-                </a:solidFill>
-              </a:rPr>
-              <a:t>, </a:t>
-            </a:r>
-            <a:r>
-              <a:rPr lang="en-IN" sz="11200" dirty="0">
-                <a:solidFill>
-                  <a:srgbClr val="451717"/>
-                </a:solidFill>
-                <a:hlinkClick r:id="rId7"/>
-              </a:rPr>
-              <a:t>URL</a:t>
-            </a:r>
-            <a:r>
-              <a:rPr lang="en-IN" sz="11200" dirty="0">
-                <a:solidFill>
-                  <a:srgbClr val="451717"/>
-                </a:solidFill>
-              </a:rPr>
-              <a:t>, [Accessed: Feb. 3, 2025</a:t>
-            </a:r>
-            <a:r>
-              <a:rPr lang="en-IN" sz="11200" dirty="0" smtClean="0">
-                <a:solidFill>
-                  <a:srgbClr val="451717"/>
-                </a:solidFill>
-              </a:rPr>
-              <a:t>].</a:t>
-            </a:r>
-          </a:p>
-          <a:p>
-            <a:pPr marL="0" indent="0">
-              <a:buNone/>
-            </a:pPr>
-            <a:r>
-              <a:rPr lang="en-IN" sz="11200" dirty="0" smtClean="0">
-                <a:solidFill>
-                  <a:srgbClr val="451717"/>
-                </a:solidFill>
-              </a:rPr>
-              <a:t>[6] </a:t>
-            </a:r>
-            <a:r>
-              <a:rPr lang="en-IN" sz="11200" b="1" dirty="0" smtClean="0">
-                <a:solidFill>
-                  <a:srgbClr val="451717"/>
-                </a:solidFill>
-                <a:hlinkClick r:id="rId8"/>
-              </a:rPr>
-              <a:t>Harry </a:t>
-            </a:r>
-            <a:r>
-              <a:rPr lang="en-IN" sz="11200" b="1" dirty="0" err="1" smtClean="0">
-                <a:solidFill>
-                  <a:srgbClr val="451717"/>
-                </a:solidFill>
-                <a:hlinkClick r:id="rId8"/>
-              </a:rPr>
-              <a:t>Thapa</a:t>
-            </a:r>
-            <a:r>
-              <a:rPr lang="en-IN" sz="11200" b="1" dirty="0" smtClean="0">
-                <a:solidFill>
-                  <a:srgbClr val="451717"/>
-                </a:solidFill>
-                <a:hlinkClick r:id="rId8"/>
-              </a:rPr>
-              <a:t>, </a:t>
-            </a:r>
-            <a:r>
-              <a:rPr lang="en-IN" sz="11200" b="1" dirty="0" err="1" smtClean="0">
-                <a:solidFill>
-                  <a:srgbClr val="451717"/>
-                </a:solidFill>
-              </a:rPr>
-              <a:t>ai</a:t>
-            </a:r>
-            <a:r>
-              <a:rPr lang="en-IN" sz="11200" b="1" dirty="0" smtClean="0">
-                <a:solidFill>
-                  <a:srgbClr val="451717"/>
-                </a:solidFill>
-              </a:rPr>
-              <a:t>-machine-learning-facial-recognition Image,</a:t>
-            </a:r>
-            <a:r>
-              <a:rPr lang="en-IN" sz="11200" dirty="0" smtClean="0">
-                <a:solidFill>
-                  <a:srgbClr val="451717"/>
-                </a:solidFill>
-              </a:rPr>
-              <a:t> </a:t>
-            </a:r>
-            <a:r>
-              <a:rPr lang="en-IN" sz="11200" dirty="0" err="1" smtClean="0">
-                <a:solidFill>
-                  <a:srgbClr val="451717"/>
-                </a:solidFill>
-              </a:rPr>
-              <a:t>Linkdin</a:t>
-            </a:r>
-            <a:r>
-              <a:rPr lang="en-IN" sz="11200" b="1" dirty="0" smtClean="0">
-                <a:solidFill>
-                  <a:srgbClr val="451717"/>
-                </a:solidFill>
-              </a:rPr>
-              <a:t>, </a:t>
-            </a:r>
-            <a:r>
-              <a:rPr lang="en-IN" sz="11200" b="1" dirty="0" smtClean="0">
-                <a:solidFill>
-                  <a:srgbClr val="451717"/>
-                </a:solidFill>
-                <a:hlinkClick r:id="rId9"/>
-              </a:rPr>
-              <a:t>URL</a:t>
-            </a:r>
-            <a:r>
-              <a:rPr lang="en-IN" sz="11200" b="1" dirty="0" smtClean="0">
-                <a:solidFill>
-                  <a:srgbClr val="451717"/>
-                </a:solidFill>
-              </a:rPr>
-              <a:t>, </a:t>
-            </a:r>
-            <a:r>
-              <a:rPr lang="en-IN" sz="11200" dirty="0" smtClean="0">
-                <a:solidFill>
-                  <a:srgbClr val="451717"/>
-                </a:solidFill>
-              </a:rPr>
-              <a:t>[Accessed: Feb. 3, 2025].</a:t>
-            </a:r>
-            <a:endParaRPr lang="en-IN" sz="11200" b="1" dirty="0" smtClean="0">
-              <a:solidFill>
-                <a:srgbClr val="451717"/>
-              </a:solidFill>
-              <a:hlinkClick r:id="rId8"/>
-            </a:endParaRPr>
           </a:p>
           <a:p>
             <a:pPr marL="0" indent="0">
@@ -21970,7 +20941,7 @@
               <a:buNone/>
             </a:pPr>
             <a:endParaRPr lang="en-IN" b="1" dirty="0">
-              <a:hlinkClick r:id="rId8"/>
+              <a:hlinkClick r:id="rId2"/>
             </a:endParaRPr>
           </a:p>
           <a:p>
@@ -22118,8 +21089,8 @@
         </p:nvSpPr>
         <p:spPr>
           <a:xfrm>
-            <a:off x="620712" y="1518107"/>
-            <a:ext cx="10947399" cy="5335572"/>
+            <a:off x="399068" y="1207022"/>
+            <a:ext cx="11792932" cy="5335572"/>
           </a:xfrm>
         </p:spPr>
         <p:txBody>
@@ -22132,20 +21103,97 @@
               <a:buNone/>
             </a:pPr>
             <a:r>
+              <a:rPr lang="en-IN" sz="11200" dirty="0">
+                <a:solidFill>
+                  <a:srgbClr val="451717"/>
+                </a:solidFill>
+              </a:rPr>
+              <a:t>[5] </a:t>
+            </a:r>
+            <a:r>
+              <a:rPr lang="en-IN" sz="11200" b="1" dirty="0" smtClean="0">
+                <a:solidFill>
+                  <a:srgbClr val="451717"/>
+                </a:solidFill>
+              </a:rPr>
+              <a:t>computer-vision-applications-in-self-driving-cars </a:t>
+            </a:r>
+            <a:r>
+              <a:rPr lang="en-IN" sz="11200" b="1" dirty="0">
+                <a:solidFill>
+                  <a:srgbClr val="451717"/>
+                </a:solidFill>
+              </a:rPr>
+              <a:t>Image</a:t>
+            </a:r>
+            <a:r>
+              <a:rPr lang="en-IN" sz="11200" dirty="0">
+                <a:solidFill>
+                  <a:srgbClr val="451717"/>
+                </a:solidFill>
+              </a:rPr>
+              <a:t>, </a:t>
+            </a:r>
+            <a:r>
               <a:rPr lang="en-IN" sz="11200" dirty="0" smtClean="0">
                 <a:solidFill>
                   <a:srgbClr val="451717"/>
                 </a:solidFill>
               </a:rPr>
-              <a:t>[</a:t>
+              <a:t>becominghuman.AI</a:t>
+            </a:r>
+            <a:r>
+              <a:rPr lang="en-IN" sz="11200" dirty="0" smtClean="0">
+                <a:solidFill>
+                  <a:srgbClr val="451717"/>
+                </a:solidFill>
+              </a:rPr>
+              <a:t>, [Available at: </a:t>
             </a:r>
             <a:r>
               <a:rPr lang="en-IN" sz="11200" dirty="0">
                 <a:solidFill>
+                  <a:srgbClr val="0000FF"/>
+                </a:solidFill>
+              </a:rPr>
+              <a:t>https://</a:t>
+            </a:r>
+            <a:r>
+              <a:rPr lang="en-IN" sz="11200" dirty="0" smtClean="0">
+                <a:solidFill>
+                  <a:srgbClr val="0000FF"/>
+                </a:solidFill>
+              </a:rPr>
+              <a:t>becominghuman.ai/computer-vision-applications-in-self-driving-cars-610561e14118</a:t>
+            </a:r>
+            <a:r>
+              <a:rPr lang="en-IN" sz="11200" dirty="0" smtClean="0">
+                <a:solidFill>
                   <a:srgbClr val="451717"/>
                 </a:solidFill>
               </a:rPr>
-              <a:t>7] yolov8, </a:t>
+              <a:t>], </a:t>
+            </a:r>
+            <a:r>
+              <a:rPr lang="en-IN" sz="11200" dirty="0">
+                <a:solidFill>
+                  <a:srgbClr val="451717"/>
+                </a:solidFill>
+              </a:rPr>
+              <a:t>[Accessed: Feb. 13, 2025].</a:t>
+            </a:r>
+          </a:p>
+          <a:p>
+            <a:pPr marL="0" indent="0">
+              <a:buNone/>
+            </a:pPr>
+            <a:r>
+              <a:rPr lang="en-IN" sz="11200" dirty="0">
+                <a:solidFill>
+                  <a:srgbClr val="451717"/>
+                </a:solidFill>
+              </a:rPr>
+              <a:t>[6] </a:t>
             </a:r>
             <a:r>
               <a:rPr lang="en-IN" sz="11200" b="1" dirty="0">
@@ -22153,7 +21201,47 @@
                   <a:srgbClr val="451717"/>
                 </a:solidFill>
               </a:rPr>
-              <a:t>Object Detection Image</a:t>
+              <a:t>Harry </a:t>
+            </a:r>
+            <a:r>
+              <a:rPr lang="en-IN" sz="11200" b="1" dirty="0" err="1" smtClean="0">
+                <a:solidFill>
+                  <a:srgbClr val="451717"/>
+                </a:solidFill>
+              </a:rPr>
+              <a:t>Thapa</a:t>
+            </a:r>
+            <a:r>
+              <a:rPr lang="en-IN" sz="11200" b="1" dirty="0" smtClean="0">
+                <a:solidFill>
+                  <a:srgbClr val="451717"/>
+                </a:solidFill>
+              </a:rPr>
+              <a:t>, </a:t>
+            </a:r>
+            <a:r>
+              <a:rPr lang="en-IN" sz="11200" b="1" dirty="0" err="1" smtClean="0">
+                <a:solidFill>
+                  <a:srgbClr val="451717"/>
+                </a:solidFill>
+              </a:rPr>
+              <a:t>ai</a:t>
+            </a:r>
+            <a:r>
+              <a:rPr lang="en-IN" sz="11200" b="1" dirty="0" smtClean="0">
+                <a:solidFill>
+                  <a:srgbClr val="451717"/>
+                </a:solidFill>
+              </a:rPr>
+              <a:t>-machine-learning-facial-recognition </a:t>
+            </a:r>
+            <a:r>
+              <a:rPr lang="en-IN" sz="11200" b="1" dirty="0">
+                <a:solidFill>
+                  <a:srgbClr val="451717"/>
+                </a:solidFill>
+              </a:rPr>
+              <a:t>Image,</a:t>
             </a:r>
             <a:r>
               <a:rPr lang="en-IN" sz="11200" dirty="0">
@@ -22161,16 +21249,71 @@
                   <a:srgbClr val="451717"/>
                 </a:solidFill>
               </a:rPr>
-              <a:t>, YoloV8, </a:t>
+              <a:t> </a:t>
+            </a:r>
+            <a:r>
+              <a:rPr lang="en-IN" sz="11200" smtClean="0">
+                <a:solidFill>
+                  <a:srgbClr val="451717"/>
+                </a:solidFill>
+              </a:rPr>
+              <a:t>Linkedin</a:t>
+            </a:r>
+            <a:r>
+              <a:rPr lang="en-IN" sz="11200" b="1" dirty="0">
+                <a:solidFill>
+                  <a:srgbClr val="451717"/>
+                </a:solidFill>
+              </a:rPr>
+              <a:t>, </a:t>
+            </a:r>
+            <a:r>
+              <a:rPr lang="en-IN" sz="11200" dirty="0" smtClean="0">
+                <a:solidFill>
+                  <a:srgbClr val="451717"/>
+                </a:solidFill>
+              </a:rPr>
+              <a:t>[Available at: </a:t>
+            </a:r>
+            <a:r>
+              <a:rPr lang="en-IN" sz="11200" dirty="0" smtClean="0">
+                <a:solidFill>
+                  <a:srgbClr val="0000FF"/>
+                </a:solidFill>
+              </a:rPr>
+              <a:t>https</a:t>
             </a:r>
             <a:r>
               <a:rPr lang="en-IN" sz="11200" dirty="0">
                 <a:solidFill>
+                  <a:srgbClr val="0000FF"/>
+                </a:solidFill>
+              </a:rPr>
+              <a:t>://</a:t>
+            </a:r>
+            <a:r>
+              <a:rPr lang="en-IN" sz="11200" dirty="0" smtClean="0">
+                <a:solidFill>
+                  <a:srgbClr val="0000FF"/>
+                </a:solidFill>
+              </a:rPr>
+              <a:t>www.linkedin.com/pulse/ai-machine-learning-facial-recognition-opencv-hemant-thapa</a:t>
+            </a:r>
+            <a:r>
+              <a:rPr lang="en-IN" sz="11200" dirty="0" smtClean="0">
+                <a:solidFill>
                   <a:srgbClr val="451717"/>
                 </a:solidFill>
-                <a:hlinkClick r:id="rId2"/>
-              </a:rPr>
-              <a:t>URL</a:t>
+              </a:rPr>
+              <a:t>]</a:t>
+            </a:r>
+            <a:r>
+              <a:rPr lang="en-IN" sz="11200" b="1" dirty="0" smtClean="0">
+                <a:solidFill>
+                  <a:srgbClr val="451717"/>
+                </a:solidFill>
+              </a:rPr>
+              <a:t>, </a:t>
             </a:r>
             <a:r>
               <a:rPr lang="en-IN" sz="11200" dirty="0">
@@ -22178,7 +21321,7 @@
                   <a:srgbClr val="451717"/>
                 </a:solidFill>
               </a:rPr>
-              <a:t>, [Accessed: Feb. 3, 2025</a:t>
+              <a:t>[Accessed: Feb. 13, 2025</a:t>
             </a:r>
             <a:r>
               <a:rPr lang="en-IN" sz="11200" dirty="0" smtClean="0">
@@ -22199,20 +21342,158 @@
               <a:buNone/>
             </a:pPr>
             <a:r>
+              <a:rPr lang="en-IN" sz="11200" dirty="0" smtClean="0">
+                <a:solidFill>
+                  <a:srgbClr val="451717"/>
+                </a:solidFill>
+              </a:rPr>
+              <a:t>[</a:t>
+            </a:r>
+            <a:r>
+              <a:rPr lang="en-IN" sz="11200" dirty="0">
+                <a:solidFill>
+                  <a:srgbClr val="451717"/>
+                </a:solidFill>
+              </a:rPr>
+              <a:t>7] </a:t>
+            </a:r>
+            <a:r>
               <a:rPr lang="en-IN" sz="11200" b="1" dirty="0" smtClean="0">
                 <a:solidFill>
                   <a:srgbClr val="451717"/>
                 </a:solidFill>
               </a:rPr>
+              <a:t>Object </a:t>
+            </a:r>
+            <a:r>
+              <a:rPr lang="en-IN" sz="11200" b="1" dirty="0">
+                <a:solidFill>
+                  <a:srgbClr val="451717"/>
+                </a:solidFill>
+              </a:rPr>
+              <a:t>Detection Image</a:t>
+            </a:r>
+            <a:r>
+              <a:rPr lang="en-IN" sz="11200" dirty="0">
+                <a:solidFill>
+                  <a:srgbClr val="451717"/>
+                </a:solidFill>
+              </a:rPr>
+              <a:t>, YoloV8, </a:t>
+            </a:r>
+            <a:r>
+              <a:rPr lang="en-IN" sz="11200" dirty="0" smtClean="0">
+                <a:solidFill>
+                  <a:srgbClr val="451717"/>
+                </a:solidFill>
+              </a:rPr>
+              <a:t>[Available at: </a:t>
+            </a:r>
+            <a:r>
+              <a:rPr lang="en-IN" sz="11200" dirty="0" smtClean="0">
+                <a:solidFill>
+                  <a:srgbClr val="0000FF"/>
+                </a:solidFill>
+              </a:rPr>
+              <a:t>https</a:t>
+            </a:r>
+            <a:r>
+              <a:rPr lang="en-IN" sz="11200" dirty="0">
+                <a:solidFill>
+                  <a:srgbClr val="0000FF"/>
+                </a:solidFill>
+              </a:rPr>
+              <a:t>://</a:t>
+            </a:r>
+            <a:r>
+              <a:rPr lang="en-IN" sz="11200" dirty="0" smtClean="0">
+                <a:solidFill>
+                  <a:srgbClr val="0000FF"/>
+                </a:solidFill>
+              </a:rPr>
+              <a:t>visionplatform.ai/yolov8</a:t>
+            </a:r>
+            <a:r>
+              <a:rPr lang="en-IN" sz="11200" dirty="0" smtClean="0">
+                <a:solidFill>
+                  <a:srgbClr val="451717"/>
+                </a:solidFill>
+              </a:rPr>
+              <a:t>], </a:t>
+            </a:r>
+            <a:r>
+              <a:rPr lang="en-IN" sz="11200" dirty="0">
+                <a:solidFill>
+                  <a:srgbClr val="451717"/>
+                </a:solidFill>
+              </a:rPr>
+              <a:t>[Accessed: Feb. </a:t>
+            </a:r>
+            <a:r>
+              <a:rPr lang="en-IN" sz="11200" dirty="0" smtClean="0">
+                <a:solidFill>
+                  <a:srgbClr val="451717"/>
+                </a:solidFill>
+              </a:rPr>
+              <a:t>13</a:t>
+            </a:r>
+            <a:r>
+              <a:rPr lang="en-IN" sz="11200" dirty="0">
+                <a:solidFill>
+                  <a:srgbClr val="451717"/>
+                </a:solidFill>
+              </a:rPr>
+              <a:t>, 2025</a:t>
+            </a:r>
+            <a:r>
+              <a:rPr lang="en-IN" sz="11200" dirty="0" smtClean="0">
+                <a:solidFill>
+                  <a:srgbClr val="451717"/>
+                </a:solidFill>
+              </a:rPr>
+              <a:t>].</a:t>
+            </a:r>
+            <a:endParaRPr lang="en-IN" sz="11200" b="1" dirty="0" smtClean="0">
+              <a:solidFill>
+                <a:srgbClr val="451717"/>
+              </a:solidFill>
+            </a:endParaRPr>
+          </a:p>
+          <a:p>
+            <a:pPr marL="0" indent="0">
+              <a:buNone/>
+            </a:pPr>
+            <a:r>
+              <a:rPr lang="en-IN" sz="11200" dirty="0" smtClean="0">
+                <a:solidFill>
+                  <a:srgbClr val="451717"/>
+                </a:solidFill>
+              </a:rPr>
               <a:t>[</a:t>
             </a:r>
             <a:r>
+              <a:rPr lang="en-IN" sz="11200" dirty="0">
+                <a:solidFill>
+                  <a:srgbClr val="451717"/>
+                </a:solidFill>
+              </a:rPr>
+              <a:t>8] </a:t>
+            </a:r>
+            <a:r>
+              <a:rPr lang="en-IN" sz="11200" b="1" dirty="0" smtClean="0">
+                <a:solidFill>
+                  <a:srgbClr val="451717"/>
+                </a:solidFill>
+              </a:rPr>
+              <a:t>computer-vision-in-manufacturing </a:t>
+            </a:r>
+            <a:r>
               <a:rPr lang="en-IN" sz="11200" b="1" dirty="0">
                 <a:solidFill>
                   <a:srgbClr val="451717"/>
                 </a:solidFill>
               </a:rPr>
-              <a:t>8] </a:t>
+              <a:t>Image, viso.ai, </a:t>
             </a:r>
             <a:r>
               <a:rPr lang="en-IN" sz="11200" dirty="0">
@@ -22220,326 +21501,47 @@
                   <a:srgbClr val="451717"/>
                 </a:solidFill>
               </a:rPr>
-              <a:t>viso.ai</a:t>
-            </a:r>
-            <a:r>
-              <a:rPr lang="en-IN" sz="11200" b="1" dirty="0">
+              <a:t>[Available at: </a:t>
+            </a:r>
+            <a:r>
+              <a:rPr lang="en-IN" sz="11200" dirty="0">
+                <a:solidFill>
+                  <a:srgbClr val="0000FF"/>
+                </a:solidFill>
+              </a:rPr>
+              <a:t>https://</a:t>
+            </a:r>
+            <a:r>
+              <a:rPr lang="en-IN" sz="11200" dirty="0" smtClean="0">
+                <a:solidFill>
+                  <a:srgbClr val="0000FF"/>
+                </a:solidFill>
+              </a:rPr>
+              <a:t>viso.ai/applications/computer-vision-in-manufacturing</a:t>
+            </a:r>
+            <a:r>
+              <a:rPr lang="en-IN" sz="11200" dirty="0" smtClean="0">
                 <a:solidFill>
                   <a:srgbClr val="451717"/>
                 </a:solidFill>
               </a:rPr>
-              <a:t>, computer-vision-in-manufacturing Image, viso.ai, </a:t>
-            </a:r>
-            <a:r>
-              <a:rPr lang="en-IN" sz="11200" b="1" dirty="0">
+              <a:t>]</a:t>
+            </a:r>
+            <a:r>
+              <a:rPr lang="en-IN" sz="11200" b="1" dirty="0" smtClean="0">
                 <a:solidFill>
                   <a:srgbClr val="451717"/>
                 </a:solidFill>
-                <a:hlinkClick r:id="rId3"/>
-              </a:rPr>
-              <a:t>URL</a:t>
-            </a:r>
-            <a:r>
-              <a:rPr lang="en-IN" sz="11200" b="1" dirty="0">
+              </a:rPr>
+              <a:t>, </a:t>
+            </a:r>
+            <a:r>
+              <a:rPr lang="en-IN" sz="11200" dirty="0">
                 <a:solidFill>
                   <a:srgbClr val="451717"/>
                 </a:solidFill>
               </a:rPr>
-              <a:t>, </a:t>
-            </a:r>
-            <a:r>
-              <a:rPr lang="en-IN" sz="11200" dirty="0">
-                <a:solidFill>
-                  <a:srgbClr val="451717"/>
-                </a:solidFill>
-              </a:rPr>
               <a:t>[Accessed: Feb. 3, 2025].</a:t>
-            </a:r>
-          </a:p>
-          <a:p>
-            <a:pPr marL="0" indent="0">
-              <a:buNone/>
-            </a:pPr>
-            <a:r>
-              <a:rPr lang="en-IN" sz="11200" dirty="0">
-                <a:solidFill>
-                  <a:srgbClr val="451717"/>
-                </a:solidFill>
-              </a:rPr>
-              <a:t>[9] </a:t>
-            </a:r>
-            <a:r>
-              <a:rPr lang="en-IN" sz="11200" dirty="0" err="1">
-                <a:solidFill>
-                  <a:srgbClr val="451717"/>
-                </a:solidFill>
-              </a:rPr>
-              <a:t>beebom</a:t>
-            </a:r>
-            <a:r>
-              <a:rPr lang="en-IN" sz="11200" dirty="0">
-                <a:solidFill>
-                  <a:srgbClr val="451717"/>
-                </a:solidFill>
-              </a:rPr>
-              <a:t>, </a:t>
-            </a:r>
-            <a:r>
-              <a:rPr lang="en-IN" sz="11200" b="1" dirty="0">
-                <a:solidFill>
-                  <a:srgbClr val="451717"/>
-                </a:solidFill>
-              </a:rPr>
-              <a:t>Google Lens Image</a:t>
-            </a:r>
-            <a:r>
-              <a:rPr lang="en-IN" sz="11200" dirty="0">
-                <a:solidFill>
-                  <a:srgbClr val="451717"/>
-                </a:solidFill>
-              </a:rPr>
-              <a:t>, </a:t>
-            </a:r>
-            <a:r>
-              <a:rPr lang="en-IN" sz="11200" dirty="0" err="1">
-                <a:solidFill>
-                  <a:srgbClr val="451717"/>
-                </a:solidFill>
-              </a:rPr>
-              <a:t>beebom</a:t>
-            </a:r>
-            <a:r>
-              <a:rPr lang="en-IN" sz="11200" dirty="0">
-                <a:solidFill>
-                  <a:srgbClr val="451717"/>
-                </a:solidFill>
-                <a:hlinkClick r:id="rId4"/>
-              </a:rPr>
-              <a:t>, URL</a:t>
-            </a:r>
-            <a:r>
-              <a:rPr lang="en-IN" sz="11200" dirty="0">
-                <a:solidFill>
-                  <a:srgbClr val="451717"/>
-                </a:solidFill>
-              </a:rPr>
-              <a:t>, [Accessed: Feb. 3, 2025].</a:t>
-            </a:r>
-          </a:p>
-          <a:p>
-            <a:pPr marL="0" indent="0">
-              <a:buNone/>
-            </a:pPr>
-            <a:r>
-              <a:rPr lang="en-IN" sz="11200" dirty="0">
-                <a:solidFill>
-                  <a:srgbClr val="451717"/>
-                </a:solidFill>
-              </a:rPr>
-              <a:t>[10] </a:t>
-            </a:r>
-            <a:r>
-              <a:rPr lang="en-IN" sz="11200" dirty="0" err="1">
-                <a:solidFill>
-                  <a:srgbClr val="451717"/>
-                </a:solidFill>
-              </a:rPr>
-              <a:t>opencv</a:t>
-            </a:r>
-            <a:r>
-              <a:rPr lang="en-IN" sz="11200" dirty="0">
-                <a:solidFill>
-                  <a:srgbClr val="451717"/>
-                </a:solidFill>
-              </a:rPr>
-              <a:t>, </a:t>
-            </a:r>
-            <a:r>
-              <a:rPr lang="en-IN" sz="11200" b="1" dirty="0">
-                <a:solidFill>
-                  <a:srgbClr val="451717"/>
-                </a:solidFill>
-              </a:rPr>
-              <a:t>computer-vision-problems</a:t>
-            </a:r>
-            <a:r>
-              <a:rPr lang="en-IN" sz="11200" dirty="0">
-                <a:solidFill>
-                  <a:srgbClr val="451717"/>
-                </a:solidFill>
-              </a:rPr>
-              <a:t>, </a:t>
-            </a:r>
-            <a:r>
-              <a:rPr lang="en-IN" sz="11200" dirty="0" err="1">
-                <a:solidFill>
-                  <a:srgbClr val="451717"/>
-                </a:solidFill>
-              </a:rPr>
-              <a:t>OpenCv.Org</a:t>
-            </a:r>
-            <a:r>
-              <a:rPr lang="en-IN" sz="11200" dirty="0">
-                <a:solidFill>
-                  <a:srgbClr val="451717"/>
-                </a:solidFill>
-              </a:rPr>
-              <a:t>, </a:t>
-            </a:r>
-            <a:r>
-              <a:rPr lang="en-IN" sz="11200" dirty="0">
-                <a:solidFill>
-                  <a:srgbClr val="451717"/>
-                </a:solidFill>
-                <a:hlinkClick r:id="rId5"/>
-              </a:rPr>
-              <a:t>URL</a:t>
-            </a:r>
-            <a:r>
-              <a:rPr lang="en-IN" sz="11200" dirty="0">
-                <a:solidFill>
-                  <a:srgbClr val="451717"/>
-                </a:solidFill>
-              </a:rPr>
-              <a:t>, [Accessed: Feb. 4, 2025].</a:t>
-            </a:r>
-          </a:p>
-          <a:p>
-            <a:pPr marL="0" indent="0">
-              <a:buNone/>
-            </a:pPr>
-            <a:r>
-              <a:rPr lang="en-IN" sz="11200" dirty="0">
-                <a:solidFill>
-                  <a:srgbClr val="451717"/>
-                </a:solidFill>
-              </a:rPr>
-              <a:t>[11] Neha </a:t>
-            </a:r>
-            <a:r>
-              <a:rPr lang="en-IN" sz="11200" dirty="0" err="1" smtClean="0">
-                <a:solidFill>
-                  <a:srgbClr val="451717"/>
-                </a:solidFill>
-              </a:rPr>
-              <a:t>Bagawari</a:t>
-            </a:r>
-            <a:r>
-              <a:rPr lang="en-IN" sz="11200" dirty="0" smtClean="0">
-                <a:solidFill>
-                  <a:srgbClr val="451717"/>
-                </a:solidFill>
-              </a:rPr>
-              <a:t>, </a:t>
-            </a:r>
-            <a:r>
-              <a:rPr lang="en-IN" sz="11200" dirty="0" err="1">
-                <a:solidFill>
-                  <a:srgbClr val="451717"/>
-                </a:solidFill>
-              </a:rPr>
-              <a:t>Tarushi</a:t>
-            </a:r>
-            <a:r>
-              <a:rPr lang="en-IN" sz="11200" dirty="0">
-                <a:solidFill>
-                  <a:srgbClr val="451717"/>
-                </a:solidFill>
-              </a:rPr>
-              <a:t> Khanna,</a:t>
-            </a:r>
-            <a:r>
-              <a:rPr lang="en-US" sz="11200" dirty="0">
-                <a:solidFill>
-                  <a:srgbClr val="451717"/>
-                </a:solidFill>
-              </a:rPr>
-              <a:t> </a:t>
-            </a:r>
-            <a:r>
-              <a:rPr lang="en-US" sz="11200" b="1" dirty="0">
-                <a:solidFill>
-                  <a:srgbClr val="451717"/>
-                </a:solidFill>
-              </a:rPr>
-              <a:t>Computer Vision And Its Application </a:t>
-            </a:r>
-            <a:r>
-              <a:rPr lang="en-US" sz="11200" b="1" dirty="0" smtClean="0">
-                <a:solidFill>
-                  <a:srgbClr val="451717"/>
-                </a:solidFill>
-              </a:rPr>
-              <a:t>Areas</a:t>
-            </a:r>
-            <a:r>
-              <a:rPr lang="en-IN" sz="11200" dirty="0" smtClean="0">
-                <a:solidFill>
-                  <a:srgbClr val="451717"/>
-                </a:solidFill>
-              </a:rPr>
-              <a:t>,</a:t>
-            </a:r>
-            <a:r>
-              <a:rPr lang="en-US" sz="9600" dirty="0"/>
-              <a:t> </a:t>
-            </a:r>
-            <a:r>
-              <a:rPr lang="en-US" sz="9600" dirty="0">
-                <a:solidFill>
-                  <a:srgbClr val="451717"/>
-                </a:solidFill>
-              </a:rPr>
-              <a:t>GLIMPSE -Journal of Computer Science •Vol. 1(1) , JANUARY-JUNE 2022, pp. </a:t>
-            </a:r>
-            <a:r>
-              <a:rPr lang="en-US" sz="9600" dirty="0" smtClean="0">
-                <a:solidFill>
-                  <a:srgbClr val="451717"/>
-                </a:solidFill>
-              </a:rPr>
-              <a:t>7-10,</a:t>
-            </a:r>
-            <a:r>
-              <a:rPr lang="en-IN" sz="11200" dirty="0" smtClean="0">
-                <a:solidFill>
-                  <a:srgbClr val="451717"/>
-                </a:solidFill>
-              </a:rPr>
-              <a:t> </a:t>
-            </a:r>
-            <a:r>
-              <a:rPr lang="en-IN" sz="11200" dirty="0" err="1">
-                <a:solidFill>
-                  <a:srgbClr val="451717"/>
-                </a:solidFill>
-              </a:rPr>
-              <a:t>akgec</a:t>
-            </a:r>
-            <a:r>
-              <a:rPr lang="en-IN" sz="11200" dirty="0">
-                <a:solidFill>
-                  <a:srgbClr val="451717"/>
-                </a:solidFill>
-              </a:rPr>
-              <a:t>, </a:t>
-            </a:r>
-            <a:r>
-              <a:rPr lang="en-IN" sz="11200" dirty="0">
-                <a:solidFill>
-                  <a:srgbClr val="451717"/>
-                </a:solidFill>
-                <a:hlinkClick r:id="rId6"/>
-              </a:rPr>
-              <a:t>URL</a:t>
-            </a:r>
-            <a:r>
-              <a:rPr lang="en-IN" sz="11200" dirty="0">
-                <a:solidFill>
-                  <a:srgbClr val="451717"/>
-                </a:solidFill>
-              </a:rPr>
-              <a:t>, [Accessed: Feb. 4, 2025].</a:t>
             </a:r>
           </a:p>
           <a:p>
@@ -22559,7 +21561,7 @@
               <a:buNone/>
             </a:pPr>
             <a:endParaRPr lang="en-IN" b="1" dirty="0">
-              <a:hlinkClick r:id="rId7"/>
+              <a:hlinkClick r:id="rId2"/>
             </a:endParaRPr>
           </a:p>
           <a:p>
@@ -22618,7 +21620,680 @@
     </p:spTree>
     <p:extLst>
       <p:ext uri="{BB962C8B-B14F-4D97-AF65-F5344CB8AC3E}">
+        <p14:creationId xmlns:p14="http://schemas.microsoft.com/office/powerpoint/2010/main" val="182799620"/>
+      </p:ext>
+    </p:extLst>
+  </p:cSld>
+  <p:clrMapOvr>
+    <a:masterClrMapping/>
+  </p:clrMapOvr>
+  <p:transition spd="slow">
+    <p:wipe/>
+  </p:transition>
+  <p:timing>
+    <p:tnLst>
+      <p:par>
+        <p:cTn id="1" dur="indefinite" restart="never" nodeType="tmRoot"/>
+      </p:par>
+    </p:tnLst>
+  </p:timing>
+</p:sld>
+</file>
+
+<file path=ppt/slides/slide16.xml><?xml version="1.0" encoding="utf-8"?>
+<p:sld xmlns:a="http://schemas.openxmlformats.org/drawingml/2006/main" xmlns:r="http://schemas.openxmlformats.org/officeDocument/2006/relationships" xmlns:p="http://schemas.openxmlformats.org/presentationml/2006/main">
+  <p:cSld>
+    <p:spTree>
+      <p:nvGrpSpPr>
+        <p:cNvPr id="1" name=""/>
+        <p:cNvGrpSpPr/>
+        <p:nvPr/>
+      </p:nvGrpSpPr>
+      <p:grpSpPr>
+        <a:xfrm>
+          <a:off x="0" y="0"/>
+          <a:ext cx="0" cy="0"/>
+          <a:chOff x="0" y="0"/>
+          <a:chExt cx="0" cy="0"/>
+        </a:xfrm>
+      </p:grpSpPr>
+      <p:sp>
+        <p:nvSpPr>
+          <p:cNvPr id="2" name="Title 1"/>
+          <p:cNvSpPr>
+            <a:spLocks noGrp="1"/>
+          </p:cNvSpPr>
+          <p:nvPr>
+            <p:ph type="title"/>
+          </p:nvPr>
+        </p:nvSpPr>
+        <p:spPr>
+          <a:xfrm>
+            <a:off x="1141413" y="618518"/>
+            <a:ext cx="9905998" cy="710661"/>
+          </a:xfrm>
+        </p:spPr>
+        <p:txBody>
+          <a:bodyPr/>
+          <a:lstStyle/>
+          <a:p>
+            <a:r>
+              <a:rPr lang="en-IN" dirty="0" smtClean="0">
+                <a:solidFill>
+                  <a:schemeClr val="bg2">
+                    <a:lumMod val="50000"/>
+                  </a:schemeClr>
+                </a:solidFill>
+              </a:rPr>
+              <a:t>References Used</a:t>
+            </a:r>
+            <a:endParaRPr lang="en-IN" dirty="0">
+              <a:solidFill>
+                <a:schemeClr val="bg2">
+                  <a:lumMod val="50000"/>
+                </a:schemeClr>
+              </a:solidFill>
+            </a:endParaRPr>
+          </a:p>
+        </p:txBody>
+      </p:sp>
+      <p:sp>
+        <p:nvSpPr>
+          <p:cNvPr id="3" name="Content Placeholder 2"/>
+          <p:cNvSpPr>
+            <a:spLocks noGrp="1"/>
+          </p:cNvSpPr>
+          <p:nvPr>
+            <p:ph idx="1"/>
+          </p:nvPr>
+        </p:nvSpPr>
+        <p:spPr>
+          <a:xfrm>
+            <a:off x="465056" y="1310325"/>
+            <a:ext cx="11726944" cy="5335572"/>
+          </a:xfrm>
+        </p:spPr>
+        <p:txBody>
+          <a:bodyPr>
+            <a:normAutofit fontScale="25000" lnSpcReduction="20000"/>
+          </a:bodyPr>
+          <a:lstStyle/>
+          <a:p>
+            <a:pPr marL="0" indent="0">
+              <a:buNone/>
+            </a:pPr>
+            <a:r>
+              <a:rPr lang="en-IN" sz="11200" dirty="0" smtClean="0">
+                <a:solidFill>
+                  <a:srgbClr val="451717"/>
+                </a:solidFill>
+              </a:rPr>
+              <a:t>[</a:t>
+            </a:r>
+            <a:r>
+              <a:rPr lang="en-IN" sz="11200" dirty="0">
+                <a:solidFill>
+                  <a:srgbClr val="451717"/>
+                </a:solidFill>
+              </a:rPr>
+              <a:t>9] </a:t>
+            </a:r>
+            <a:r>
+              <a:rPr lang="en-IN" sz="11200" b="1" dirty="0" smtClean="0">
+                <a:solidFill>
+                  <a:srgbClr val="451717"/>
+                </a:solidFill>
+              </a:rPr>
+              <a:t>Google </a:t>
+            </a:r>
+            <a:r>
+              <a:rPr lang="en-IN" sz="11200" b="1" dirty="0">
+                <a:solidFill>
+                  <a:srgbClr val="451717"/>
+                </a:solidFill>
+              </a:rPr>
+              <a:t>Lens Image</a:t>
+            </a:r>
+            <a:r>
+              <a:rPr lang="en-IN" sz="11200" dirty="0">
+                <a:solidFill>
+                  <a:srgbClr val="451717"/>
+                </a:solidFill>
+              </a:rPr>
+              <a:t>, </a:t>
+            </a:r>
+            <a:r>
+              <a:rPr lang="en-IN" sz="11200" dirty="0" err="1">
+                <a:solidFill>
+                  <a:srgbClr val="451717"/>
+                </a:solidFill>
+              </a:rPr>
+              <a:t>beebom</a:t>
+            </a:r>
+            <a:r>
+              <a:rPr lang="en-IN" sz="11200" dirty="0" smtClean="0">
+                <a:solidFill>
+                  <a:srgbClr val="451717"/>
+                </a:solidFill>
+              </a:rPr>
+              <a:t>, [Available at:  </a:t>
+            </a:r>
+            <a:r>
+              <a:rPr lang="en-IN" sz="11200" dirty="0">
+                <a:solidFill>
+                  <a:srgbClr val="0000FF"/>
+                </a:solidFill>
+              </a:rPr>
+              <a:t>https://</a:t>
+            </a:r>
+            <a:r>
+              <a:rPr lang="en-IN" sz="11200" dirty="0" smtClean="0">
+                <a:solidFill>
+                  <a:srgbClr val="0000FF"/>
+                </a:solidFill>
+              </a:rPr>
+              <a:t>beebom.com/how-use-google-lens</a:t>
+            </a:r>
+            <a:r>
+              <a:rPr lang="en-IN" sz="11200" dirty="0" smtClean="0">
+                <a:solidFill>
+                  <a:srgbClr val="451717"/>
+                </a:solidFill>
+              </a:rPr>
+              <a:t>], </a:t>
+            </a:r>
+            <a:r>
+              <a:rPr lang="en-IN" sz="11200" dirty="0">
+                <a:solidFill>
+                  <a:srgbClr val="451717"/>
+                </a:solidFill>
+              </a:rPr>
+              <a:t>[Accessed: Feb. </a:t>
+            </a:r>
+            <a:r>
+              <a:rPr lang="en-IN" sz="11200" dirty="0" smtClean="0">
+                <a:solidFill>
+                  <a:srgbClr val="451717"/>
+                </a:solidFill>
+              </a:rPr>
+              <a:t>13</a:t>
+            </a:r>
+            <a:r>
+              <a:rPr lang="en-IN" sz="11200" dirty="0">
+                <a:solidFill>
+                  <a:srgbClr val="451717"/>
+                </a:solidFill>
+              </a:rPr>
+              <a:t>, 2025].</a:t>
+            </a:r>
+          </a:p>
+          <a:p>
+            <a:pPr marL="0" indent="0">
+              <a:buNone/>
+            </a:pPr>
+            <a:r>
+              <a:rPr lang="en-IN" sz="11200" dirty="0">
+                <a:solidFill>
+                  <a:srgbClr val="451717"/>
+                </a:solidFill>
+              </a:rPr>
+              <a:t>[10] </a:t>
+            </a:r>
+            <a:r>
+              <a:rPr lang="en-IN" sz="11200" b="1" dirty="0" smtClean="0">
+                <a:solidFill>
+                  <a:srgbClr val="451717"/>
+                </a:solidFill>
+              </a:rPr>
+              <a:t>computer-vision-problems</a:t>
+            </a:r>
+            <a:r>
+              <a:rPr lang="en-IN" sz="11200" dirty="0">
+                <a:solidFill>
+                  <a:srgbClr val="451717"/>
+                </a:solidFill>
+              </a:rPr>
+              <a:t>, </a:t>
+            </a:r>
+            <a:r>
+              <a:rPr lang="en-IN" sz="11200" dirty="0" err="1">
+                <a:solidFill>
+                  <a:srgbClr val="451717"/>
+                </a:solidFill>
+              </a:rPr>
+              <a:t>OpenCv.Org</a:t>
+            </a:r>
+            <a:r>
+              <a:rPr lang="en-IN" sz="11200" dirty="0">
+                <a:solidFill>
+                  <a:srgbClr val="451717"/>
+                </a:solidFill>
+              </a:rPr>
+              <a:t>, </a:t>
+            </a:r>
+            <a:r>
+              <a:rPr lang="en-IN" sz="11200" dirty="0" smtClean="0">
+                <a:solidFill>
+                  <a:srgbClr val="451717"/>
+                </a:solidFill>
+              </a:rPr>
+              <a:t>[Available at: </a:t>
+            </a:r>
+            <a:r>
+              <a:rPr lang="en-IN" sz="11200" dirty="0" smtClean="0">
+                <a:solidFill>
+                  <a:srgbClr val="0000FF"/>
+                </a:solidFill>
+              </a:rPr>
+              <a:t>https</a:t>
+            </a:r>
+            <a:r>
+              <a:rPr lang="en-IN" sz="11200" dirty="0">
+                <a:solidFill>
+                  <a:srgbClr val="0000FF"/>
+                </a:solidFill>
+              </a:rPr>
+              <a:t>://</a:t>
+            </a:r>
+            <a:r>
+              <a:rPr lang="en-IN" sz="11200" dirty="0" smtClean="0">
+                <a:solidFill>
+                  <a:srgbClr val="0000FF"/>
+                </a:solidFill>
+              </a:rPr>
+              <a:t>opencv.org/blog/computer-vision-problems</a:t>
+            </a:r>
+            <a:r>
+              <a:rPr lang="en-IN" sz="11200" dirty="0" smtClean="0">
+                <a:solidFill>
+                  <a:srgbClr val="451717"/>
+                </a:solidFill>
+              </a:rPr>
+              <a:t>], </a:t>
+            </a:r>
+            <a:r>
+              <a:rPr lang="en-IN" sz="11200" dirty="0">
+                <a:solidFill>
+                  <a:srgbClr val="451717"/>
+                </a:solidFill>
+              </a:rPr>
+              <a:t>[Accessed: Feb. </a:t>
+            </a:r>
+            <a:r>
+              <a:rPr lang="en-IN" sz="11200" dirty="0" smtClean="0">
+                <a:solidFill>
+                  <a:srgbClr val="451717"/>
+                </a:solidFill>
+              </a:rPr>
+              <a:t>14</a:t>
+            </a:r>
+            <a:r>
+              <a:rPr lang="en-IN" sz="11200" dirty="0">
+                <a:solidFill>
+                  <a:srgbClr val="451717"/>
+                </a:solidFill>
+              </a:rPr>
+              <a:t>, 2025].</a:t>
+            </a:r>
+          </a:p>
+          <a:p>
+            <a:pPr marL="0" indent="0">
+              <a:buNone/>
+            </a:pPr>
+            <a:r>
+              <a:rPr lang="en-IN" sz="11200" dirty="0">
+                <a:solidFill>
+                  <a:srgbClr val="451717"/>
+                </a:solidFill>
+              </a:rPr>
+              <a:t>[11] Neha </a:t>
+            </a:r>
+            <a:r>
+              <a:rPr lang="en-IN" sz="11200" dirty="0" err="1" smtClean="0">
+                <a:solidFill>
+                  <a:srgbClr val="451717"/>
+                </a:solidFill>
+              </a:rPr>
+              <a:t>Bagawari</a:t>
+            </a:r>
+            <a:r>
+              <a:rPr lang="en-IN" sz="11200" dirty="0" smtClean="0">
+                <a:solidFill>
+                  <a:srgbClr val="451717"/>
+                </a:solidFill>
+              </a:rPr>
+              <a:t>, </a:t>
+            </a:r>
+            <a:r>
+              <a:rPr lang="en-IN" sz="11200" dirty="0" err="1">
+                <a:solidFill>
+                  <a:srgbClr val="451717"/>
+                </a:solidFill>
+              </a:rPr>
+              <a:t>Tarushi</a:t>
+            </a:r>
+            <a:r>
+              <a:rPr lang="en-IN" sz="11200" dirty="0">
+                <a:solidFill>
+                  <a:srgbClr val="451717"/>
+                </a:solidFill>
+              </a:rPr>
+              <a:t> Khanna,</a:t>
+            </a:r>
+            <a:r>
+              <a:rPr lang="en-US" sz="11200" dirty="0">
+                <a:solidFill>
+                  <a:srgbClr val="451717"/>
+                </a:solidFill>
+              </a:rPr>
+              <a:t> </a:t>
+            </a:r>
+            <a:r>
+              <a:rPr lang="en-US" sz="11200" b="1" dirty="0">
+                <a:solidFill>
+                  <a:srgbClr val="451717"/>
+                </a:solidFill>
+              </a:rPr>
+              <a:t>Computer Vision And Its Application </a:t>
+            </a:r>
+            <a:r>
+              <a:rPr lang="en-US" sz="11200" b="1" dirty="0" smtClean="0">
+                <a:solidFill>
+                  <a:srgbClr val="451717"/>
+                </a:solidFill>
+              </a:rPr>
+              <a:t>Areas</a:t>
+            </a:r>
+            <a:r>
+              <a:rPr lang="en-IN" sz="11200" dirty="0" smtClean="0">
+                <a:solidFill>
+                  <a:srgbClr val="451717"/>
+                </a:solidFill>
+              </a:rPr>
+              <a:t>,</a:t>
+            </a:r>
+            <a:r>
+              <a:rPr lang="en-US" sz="9600" dirty="0"/>
+              <a:t> </a:t>
+            </a:r>
+            <a:r>
+              <a:rPr lang="en-US" sz="9600" dirty="0">
+                <a:solidFill>
+                  <a:srgbClr val="451717"/>
+                </a:solidFill>
+              </a:rPr>
+              <a:t>GLIMPSE -Journal of Computer Science •Vol. 1(1) , JANUARY-JUNE 2022, pp. </a:t>
+            </a:r>
+            <a:r>
+              <a:rPr lang="en-US" sz="9600" dirty="0" smtClean="0">
+                <a:solidFill>
+                  <a:srgbClr val="451717"/>
+                </a:solidFill>
+              </a:rPr>
+              <a:t>7-10,</a:t>
+            </a:r>
+            <a:r>
+              <a:rPr lang="en-IN" sz="11200" dirty="0" smtClean="0">
+                <a:solidFill>
+                  <a:srgbClr val="451717"/>
+                </a:solidFill>
+              </a:rPr>
+              <a:t> </a:t>
+            </a:r>
+            <a:r>
+              <a:rPr lang="en-IN" sz="11200" dirty="0" err="1" smtClean="0">
+                <a:solidFill>
+                  <a:srgbClr val="451717"/>
+                </a:solidFill>
+              </a:rPr>
+              <a:t>akgec</a:t>
+            </a:r>
+            <a:r>
+              <a:rPr lang="en-IN" sz="11200" dirty="0" smtClean="0">
+                <a:solidFill>
+                  <a:srgbClr val="451717"/>
+                </a:solidFill>
+              </a:rPr>
+              <a:t>, [Available at: </a:t>
+            </a:r>
+            <a:r>
+              <a:rPr lang="en-IN" sz="11200" dirty="0" smtClean="0">
+                <a:solidFill>
+                  <a:srgbClr val="0000FF"/>
+                </a:solidFill>
+              </a:rPr>
+              <a:t>https</a:t>
+            </a:r>
+            <a:r>
+              <a:rPr lang="en-IN" sz="11200" dirty="0">
+                <a:solidFill>
+                  <a:srgbClr val="0000FF"/>
+                </a:solidFill>
+              </a:rPr>
+              <a:t>://</a:t>
+            </a:r>
+            <a:r>
+              <a:rPr lang="en-IN" sz="11200" dirty="0" smtClean="0">
+                <a:solidFill>
+                  <a:srgbClr val="0000FF"/>
+                </a:solidFill>
+              </a:rPr>
+              <a:t>www.akgec.ac.in/wp-content/uploads/2024/01/Jan-Jun2022_2.pdf</a:t>
+            </a:r>
+            <a:r>
+              <a:rPr lang="en-IN" sz="11200" dirty="0" smtClean="0">
+                <a:solidFill>
+                  <a:srgbClr val="451717"/>
+                </a:solidFill>
+              </a:rPr>
+              <a:t>], </a:t>
+            </a:r>
+            <a:r>
+              <a:rPr lang="en-IN" sz="11200" dirty="0">
+                <a:solidFill>
+                  <a:srgbClr val="451717"/>
+                </a:solidFill>
+              </a:rPr>
+              <a:t>[Accessed: Feb. </a:t>
+            </a:r>
+            <a:r>
+              <a:rPr lang="en-IN" sz="11200" dirty="0" smtClean="0">
+                <a:solidFill>
+                  <a:srgbClr val="451717"/>
+                </a:solidFill>
+              </a:rPr>
+              <a:t>14</a:t>
+            </a:r>
+            <a:r>
+              <a:rPr lang="en-IN" sz="11200" dirty="0">
+                <a:solidFill>
+                  <a:srgbClr val="451717"/>
+                </a:solidFill>
+              </a:rPr>
+              <a:t>, 2025].</a:t>
+            </a:r>
+          </a:p>
+          <a:p>
+            <a:pPr marL="0" indent="0">
+              <a:buNone/>
+            </a:pPr>
+            <a:endParaRPr lang="en-IN" dirty="0"/>
+          </a:p>
+          <a:p>
+            <a:pPr marL="0" indent="0">
+              <a:buNone/>
+            </a:pPr>
+            <a:endParaRPr lang="en-IN" dirty="0"/>
+          </a:p>
+          <a:p>
+            <a:pPr marL="0" indent="0">
+              <a:buNone/>
+            </a:pPr>
+            <a:endParaRPr lang="en-IN" b="1" dirty="0">
+              <a:hlinkClick r:id="rId2"/>
+            </a:endParaRPr>
+          </a:p>
+          <a:p>
+            <a:pPr marL="0" indent="0">
+              <a:buNone/>
+            </a:pPr>
+            <a:endParaRPr lang="en-IN" dirty="0" smtClean="0"/>
+          </a:p>
+          <a:p>
+            <a:pPr marL="0" indent="0">
+              <a:buNone/>
+            </a:pPr>
+            <a:endParaRPr lang="en-IN" dirty="0"/>
+          </a:p>
+          <a:p>
+            <a:pPr marL="0" indent="0">
+              <a:buNone/>
+            </a:pPr>
+            <a:endParaRPr lang="en-IN" dirty="0"/>
+          </a:p>
+          <a:p>
+            <a:pPr marL="0" indent="0">
+              <a:buNone/>
+            </a:pPr>
+            <a:r>
+              <a:rPr lang="en-IN" dirty="0" smtClean="0"/>
+              <a:t> </a:t>
+            </a:r>
+            <a:endParaRPr lang="en-IN" dirty="0"/>
+          </a:p>
+        </p:txBody>
+      </p:sp>
+      <p:sp>
+        <p:nvSpPr>
+          <p:cNvPr id="4" name="Slide Number Placeholder 3"/>
+          <p:cNvSpPr>
+            <a:spLocks noGrp="1"/>
+          </p:cNvSpPr>
+          <p:nvPr>
+            <p:ph type="sldNum" sz="quarter" idx="12"/>
+          </p:nvPr>
+        </p:nvSpPr>
+        <p:spPr/>
+        <p:txBody>
+          <a:bodyPr/>
+          <a:lstStyle/>
+          <a:p>
+            <a:fld id="{E9D42EC4-55FD-406C-82BB-203E3BBE455C}" type="slidenum">
+              <a:rPr lang="en-IN" smtClean="0"/>
+              <a:t>16</a:t>
+            </a:fld>
+            <a:endParaRPr lang="en-IN"/>
+          </a:p>
+        </p:txBody>
+      </p:sp>
+    </p:spTree>
+    <p:extLst>
+      <p:ext uri="{BB962C8B-B14F-4D97-AF65-F5344CB8AC3E}">
         <p14:creationId xmlns:p14="http://schemas.microsoft.com/office/powerpoint/2010/main" val="2219693651"/>
+      </p:ext>
+    </p:extLst>
+  </p:cSld>
+  <p:clrMapOvr>
+    <a:masterClrMapping/>
+  </p:clrMapOvr>
+  <p:transition spd="slow">
+    <p:wipe/>
+  </p:transition>
+  <p:timing>
+    <p:tnLst>
+      <p:par>
+        <p:cTn id="1" dur="indefinite" restart="never" nodeType="tmRoot"/>
+      </p:par>
+    </p:tnLst>
+  </p:timing>
+</p:sld>
+</file>
+
+<file path=ppt/slides/slide17.xml><?xml version="1.0" encoding="utf-8"?>
+<p:sld xmlns:a="http://schemas.openxmlformats.org/drawingml/2006/main" xmlns:r="http://schemas.openxmlformats.org/officeDocument/2006/relationships" xmlns:p="http://schemas.openxmlformats.org/presentationml/2006/main">
+  <p:cSld>
+    <p:spTree>
+      <p:nvGrpSpPr>
+        <p:cNvPr id="1" name=""/>
+        <p:cNvGrpSpPr/>
+        <p:nvPr/>
+      </p:nvGrpSpPr>
+      <p:grpSpPr>
+        <a:xfrm>
+          <a:off x="0" y="0"/>
+          <a:ext cx="0" cy="0"/>
+          <a:chOff x="0" y="0"/>
+          <a:chExt cx="0" cy="0"/>
+        </a:xfrm>
+      </p:grpSpPr>
+      <p:pic>
+        <p:nvPicPr>
+          <p:cNvPr id="5" name="Picture 4" descr="Free Google Thank You Slide &amp; PowerPoint Templates"/>
+          <p:cNvPicPr>
+            <a:picLocks noChangeAspect="1" noChangeArrowheads="1"/>
+          </p:cNvPicPr>
+          <p:nvPr/>
+        </p:nvPicPr>
+        <p:blipFill>
+          <a:blip r:embed="rId2">
+            <a:extLst>
+              <a:ext uri="{28A0092B-C50C-407E-A947-70E740481C1C}">
+                <a14:useLocalDpi xmlns:a14="http://schemas.microsoft.com/office/drawing/2010/main" val="0"/>
+              </a:ext>
+            </a:extLst>
+          </a:blip>
+          <a:srcRect/>
+          <a:stretch>
+            <a:fillRect/>
+          </a:stretch>
+        </p:blipFill>
+        <p:spPr bwMode="auto">
+          <a:xfrm>
+            <a:off x="0" y="0"/>
+            <a:ext cx="12192000" cy="6858001"/>
+          </a:xfrm>
+          <a:prstGeom prst="rect">
+            <a:avLst/>
+          </a:prstGeom>
+          <a:noFill/>
+          <a:extLst>
+            <a:ext uri="{909E8E84-426E-40DD-AFC4-6F175D3DCCD1}">
+              <a14:hiddenFill xmlns:a14="http://schemas.microsoft.com/office/drawing/2010/main">
+                <a:solidFill>
+                  <a:srgbClr val="FFFFFF"/>
+                </a:solidFill>
+              </a14:hiddenFill>
+            </a:ext>
+          </a:extLst>
+        </p:spPr>
+      </p:pic>
+      <p:sp>
+        <p:nvSpPr>
+          <p:cNvPr id="2" name="Slide Number Placeholder 1"/>
+          <p:cNvSpPr>
+            <a:spLocks noGrp="1"/>
+          </p:cNvSpPr>
+          <p:nvPr>
+            <p:ph type="sldNum" sz="quarter" idx="12"/>
+          </p:nvPr>
+        </p:nvSpPr>
+        <p:spPr/>
+        <p:txBody>
+          <a:bodyPr/>
+          <a:lstStyle/>
+          <a:p>
+            <a:fld id="{E9D42EC4-55FD-406C-82BB-203E3BBE455C}" type="slidenum">
+              <a:rPr lang="en-IN" smtClean="0"/>
+              <a:t>17</a:t>
+            </a:fld>
+            <a:endParaRPr lang="en-IN"/>
+          </a:p>
+        </p:txBody>
+      </p:sp>
+    </p:spTree>
+    <p:extLst>
+      <p:ext uri="{BB962C8B-B14F-4D97-AF65-F5344CB8AC3E}">
+        <p14:creationId xmlns:p14="http://schemas.microsoft.com/office/powerpoint/2010/main" val="1852025197"/>
       </p:ext>
     </p:extLst>
   </p:cSld>
@@ -22701,14 +22376,14 @@
             <p:ph idx="1"/>
             <p:extLst>
               <p:ext uri="{D42A27DB-BD31-4B8C-83A1-F6EECF244321}">
-                <p14:modId xmlns:p14="http://schemas.microsoft.com/office/powerpoint/2010/main" val="4227707703"/>
+                <p14:modId xmlns:p14="http://schemas.microsoft.com/office/powerpoint/2010/main" val="3391477489"/>
               </p:ext>
             </p:extLst>
           </p:nvPr>
         </p:nvGraphicFramePr>
         <p:xfrm>
           <a:off x="1141413" y="1564849"/>
-          <a:ext cx="9906000" cy="4600281"/>
+          <a:ext cx="9906000" cy="4788817"/>
         </p:xfrm>
         <a:graphic>
           <a:graphicData uri="http://schemas.openxmlformats.org/drawingml/2006/diagram">
@@ -23225,7 +22900,11 @@
           <a:p>
             <a:pPr algn="ctr"/>
             <a:r>
-              <a:rPr lang="en-IN" dirty="0" smtClean="0"/>
+              <a:rPr lang="en-IN" dirty="0" smtClean="0">
+                <a:solidFill>
+                  <a:srgbClr val="451717"/>
+                </a:solidFill>
+              </a:rPr>
               <a:t>Figure1 : Human Vision vs Computer Vision </a:t>
             </a:r>
             <a:r>
@@ -23419,7 +23098,11 @@
           <a:lstStyle/>
           <a:p>
             <a:r>
-              <a:rPr lang="en-IN" dirty="0" smtClean="0"/>
+              <a:rPr lang="en-IN" dirty="0" smtClean="0">
+                <a:solidFill>
+                  <a:srgbClr val="451717"/>
+                </a:solidFill>
+              </a:rPr>
               <a:t>Figure 2 : Original Image </a:t>
             </a:r>
             <a:r>
@@ -23455,14 +23138,27 @@
           <a:lstStyle/>
           <a:p>
             <a:r>
-              <a:rPr lang="en-IN" dirty="0" smtClean="0"/>
+              <a:rPr lang="en-IN" dirty="0" smtClean="0">
+                <a:solidFill>
+                  <a:srgbClr val="451717"/>
+                </a:solidFill>
+              </a:rPr>
               <a:t>Figure 3 : Pixelated Image</a:t>
+            </a:r>
+            <a:r>
+              <a:rPr lang="en-IN" dirty="0" smtClean="0">
+                <a:solidFill>
+                  <a:srgbClr val="451717"/>
+                </a:solidFill>
+                <a:hlinkClick r:id="" action="ppaction://hlinkshowjump?jump=lastslide"/>
+              </a:rPr>
+              <a:t> </a:t>
             </a:r>
             <a:r>
               <a:rPr lang="en-IN" dirty="0" smtClean="0">
                 <a:hlinkClick r:id="" action="ppaction://hlinkshowjump?jump=lastslide"/>
               </a:rPr>
-              <a:t> [3]</a:t>
+              <a:t>[3]</a:t>
             </a:r>
             <a:endParaRPr lang="en-IN" dirty="0"/>
           </a:p>
@@ -24816,7 +24512,11 @@
           <a:lstStyle/>
           <a:p>
             <a:r>
-              <a:rPr lang="en-IN" dirty="0" smtClean="0"/>
+              <a:rPr lang="en-IN" dirty="0" smtClean="0">
+                <a:solidFill>
+                  <a:srgbClr val="451717"/>
+                </a:solidFill>
+              </a:rPr>
               <a:t>Figure 4 : Face Recognition </a:t>
             </a:r>
             <a:r>
@@ -24894,7 +24594,11 @@
           <a:p>
             <a:pPr algn="ctr"/>
             <a:r>
-              <a:rPr lang="en-IN" dirty="0" smtClean="0"/>
+              <a:rPr lang="en-IN" dirty="0" smtClean="0">
+                <a:solidFill>
+                  <a:srgbClr val="451717"/>
+                </a:solidFill>
+              </a:rPr>
               <a:t>Figure 5: Object Detection </a:t>
             </a:r>
             <a:r>
@@ -24934,7 +24638,13 @@
               <a:buChar char="•"/>
             </a:pPr>
             <a:r>
-              <a:rPr lang="en-IN" dirty="0" smtClean="0"/>
+              <a:rPr lang="en-IN" dirty="0" smtClean="0">
+                <a:solidFill>
+                  <a:schemeClr val="bg2">
+                    <a:lumMod val="50000"/>
+                  </a:schemeClr>
+                </a:solidFill>
+              </a:rPr>
               <a:t>Face Attendance System</a:t>
             </a:r>
           </a:p>
@@ -24944,7 +24654,13 @@
               <a:buChar char="•"/>
             </a:pPr>
             <a:r>
-              <a:rPr lang="en-IN" dirty="0" smtClean="0"/>
+              <a:rPr lang="en-IN" dirty="0" smtClean="0">
+                <a:solidFill>
+                  <a:schemeClr val="bg2">
+                    <a:lumMod val="50000"/>
+                  </a:schemeClr>
+                </a:solidFill>
+              </a:rPr>
               <a:t>Face Locks</a:t>
             </a:r>
           </a:p>
@@ -24954,10 +24670,21 @@
               <a:buChar char="•"/>
             </a:pPr>
             <a:r>
-              <a:rPr lang="en-IN" dirty="0" smtClean="0"/>
+              <a:rPr lang="en-IN" dirty="0" smtClean="0">
+                <a:solidFill>
+                  <a:schemeClr val="bg2">
+                    <a:lumMod val="50000"/>
+                  </a:schemeClr>
+                </a:solidFill>
+              </a:rPr>
               <a:t>Forensic facial reconstruction</a:t>
             </a:r>
             <a:endParaRPr lang="en-IN" dirty="0" smtClean="0">
+              <a:solidFill>
+                <a:schemeClr val="bg2">
+                  <a:lumMod val="50000"/>
+                </a:schemeClr>
+              </a:solidFill>
               <a:hlinkClick r:id="rId4"/>
             </a:endParaRPr>
           </a:p>
@@ -24979,7 +24706,7 @@
         <p:spPr>
           <a:xfrm>
             <a:off x="7117770" y="5599519"/>
-            <a:ext cx="3478491" cy="646331"/>
+            <a:ext cx="3478491" cy="369332"/>
           </a:xfrm>
           <a:prstGeom prst="rect">
             <a:avLst/>
@@ -24997,25 +24724,42 @@
               <a:buChar char="•"/>
             </a:pPr>
             <a:r>
-              <a:rPr lang="en-IN" dirty="0"/>
-              <a:t>Surveillance &amp; Security</a:t>
-            </a:r>
-            <a:endParaRPr lang="en-IN" dirty="0" smtClean="0"/>
-          </a:p>
-          <a:p>
-            <a:pPr marL="285750" indent="-285750" algn="ctr">
-              <a:buFont typeface="Arial" panose="020B0604020202020204" pitchFamily="34" charset="0"/>
-              <a:buChar char="•"/>
-            </a:pPr>
-            <a:r>
-              <a:rPr lang="en-IN" dirty="0"/>
-              <a:t>Retail &amp; </a:t>
-            </a:r>
-            <a:r>
-              <a:rPr lang="en-IN" dirty="0" smtClean="0"/>
+              <a:rPr lang="en-IN" dirty="0" smtClean="0">
+                <a:solidFill>
+                  <a:schemeClr val="bg2">
+                    <a:lumMod val="50000"/>
+                  </a:schemeClr>
+                </a:solidFill>
+              </a:rPr>
+              <a:t>Retail </a:t>
+            </a:r>
+            <a:r>
+              <a:rPr lang="en-IN" dirty="0">
+                <a:solidFill>
+                  <a:schemeClr val="bg2">
+                    <a:lumMod val="50000"/>
+                  </a:schemeClr>
+                </a:solidFill>
+              </a:rPr>
+              <a:t>&amp; </a:t>
+            </a:r>
+            <a:r>
+              <a:rPr lang="en-IN" dirty="0" smtClean="0">
+                <a:solidFill>
+                  <a:schemeClr val="bg2">
+                    <a:lumMod val="50000"/>
+                  </a:schemeClr>
+                </a:solidFill>
+              </a:rPr>
               <a:t>E-commerce</a:t>
             </a:r>
-            <a:endParaRPr lang="en-IN" dirty="0"/>
+            <a:endParaRPr lang="en-IN" dirty="0">
+              <a:solidFill>
+                <a:schemeClr val="bg2">
+                  <a:lumMod val="50000"/>
+                </a:schemeClr>
+              </a:solidFill>
+            </a:endParaRPr>
           </a:p>
         </p:txBody>
       </p:sp>
@@ -25146,7 +24890,11 @@
           <a:lstStyle/>
           <a:p>
             <a:r>
-              <a:rPr lang="en-IN" dirty="0" smtClean="0"/>
+              <a:rPr lang="en-IN" dirty="0" smtClean="0">
+                <a:solidFill>
+                  <a:srgbClr val="451717"/>
+                </a:solidFill>
+              </a:rPr>
               <a:t>Figure 6 : Self Driving Cars </a:t>
             </a:r>
             <a:r>
@@ -25183,7 +24931,11 @@
           <a:p>
             <a:pPr algn="ctr"/>
             <a:r>
-              <a:rPr lang="en-IN" dirty="0" smtClean="0"/>
+              <a:rPr lang="en-IN" dirty="0" smtClean="0">
+                <a:solidFill>
+                  <a:srgbClr val="451717"/>
+                </a:solidFill>
+              </a:rPr>
               <a:t>Figure 5: HealthCare </a:t>
             </a:r>
             <a:r>
@@ -25223,7 +24975,13 @@
               <a:buChar char="•"/>
             </a:pPr>
             <a:r>
-              <a:rPr lang="en-IN" dirty="0" smtClean="0"/>
+              <a:rPr lang="en-IN" dirty="0" smtClean="0">
+                <a:solidFill>
+                  <a:schemeClr val="bg2">
+                    <a:lumMod val="50000"/>
+                  </a:schemeClr>
+                </a:solidFill>
+              </a:rPr>
               <a:t>Uses maps to set source and destination.</a:t>
             </a:r>
           </a:p>
@@ -25233,10 +24991,21 @@
               <a:buChar char="•"/>
             </a:pPr>
             <a:r>
-              <a:rPr lang="en-IN" dirty="0" smtClean="0"/>
+              <a:rPr lang="en-IN" dirty="0" smtClean="0">
+                <a:solidFill>
+                  <a:schemeClr val="bg2">
+                    <a:lumMod val="50000"/>
+                  </a:schemeClr>
+                </a:solidFill>
+              </a:rPr>
               <a:t>Use Computer Vision Object Detection to Identify the obstacles in the road and traffic lights.</a:t>
             </a:r>
             <a:endParaRPr lang="en-IN" dirty="0" smtClean="0">
+              <a:solidFill>
+                <a:schemeClr val="bg2">
+                  <a:lumMod val="50000"/>
+                </a:schemeClr>
+              </a:solidFill>
               <a:hlinkClick r:id="rId2"/>
             </a:endParaRPr>
           </a:p>
@@ -25276,7 +25045,13 @@
               <a:buChar char="•"/>
             </a:pPr>
             <a:r>
-              <a:rPr lang="en-IN" dirty="0" smtClean="0"/>
+              <a:rPr lang="en-IN" dirty="0" smtClean="0">
+                <a:solidFill>
+                  <a:schemeClr val="bg2">
+                    <a:lumMod val="50000"/>
+                  </a:schemeClr>
+                </a:solidFill>
+              </a:rPr>
               <a:t>Used to analyse medical reports like X-Rays, MRI etc.</a:t>
             </a:r>
           </a:p>
@@ -25286,10 +25061,22 @@
               <a:buChar char="•"/>
             </a:pPr>
             <a:r>
-              <a:rPr lang="en-IN" dirty="0" smtClean="0"/>
+              <a:rPr lang="en-IN" dirty="0" smtClean="0">
+                <a:solidFill>
+                  <a:schemeClr val="bg2">
+                    <a:lumMod val="50000"/>
+                  </a:schemeClr>
+                </a:solidFill>
+              </a:rPr>
               <a:t>Helps in the diagnosis of disease</a:t>
             </a:r>
-            <a:endParaRPr lang="en-IN" dirty="0"/>
+            <a:endParaRPr lang="en-IN" dirty="0">
+              <a:solidFill>
+                <a:schemeClr val="bg2">
+                  <a:lumMod val="50000"/>
+                </a:schemeClr>
+              </a:solidFill>
+            </a:endParaRPr>
           </a:p>
         </p:txBody>
       </p:sp>
@@ -25502,7 +25289,11 @@
           <a:lstStyle/>
           <a:p>
             <a:r>
-              <a:rPr lang="en-IN" dirty="0" smtClean="0"/>
+              <a:rPr lang="en-IN" dirty="0" smtClean="0">
+                <a:solidFill>
+                  <a:srgbClr val="451717"/>
+                </a:solidFill>
+              </a:rPr>
               <a:t>Figure 6 : Monitoring Task </a:t>
             </a:r>
             <a:r>
@@ -25539,7 +25330,11 @@
           <a:p>
             <a:pPr algn="ctr"/>
             <a:r>
-              <a:rPr lang="en-IN" dirty="0" smtClean="0"/>
+              <a:rPr lang="en-IN" dirty="0" smtClean="0">
+                <a:solidFill>
+                  <a:srgbClr val="451717"/>
+                </a:solidFill>
+              </a:rPr>
               <a:t>Figure 5: Google Lens </a:t>
             </a:r>
             <a:r>
@@ -25579,7 +25374,13 @@
               <a:buChar char="•"/>
             </a:pPr>
             <a:r>
-              <a:rPr lang="en-IN" dirty="0" smtClean="0"/>
+              <a:rPr lang="en-IN" dirty="0" smtClean="0">
+                <a:solidFill>
+                  <a:schemeClr val="bg2">
+                    <a:lumMod val="50000"/>
+                  </a:schemeClr>
+                </a:solidFill>
+              </a:rPr>
               <a:t>Used for monitor the tasks in a manufacturing Industries.</a:t>
             </a:r>
           </a:p>
@@ -25612,8 +25413,14 @@
               <a:buChar char="•"/>
             </a:pPr>
             <a:r>
-              <a:rPr lang="en-IN" dirty="0" smtClean="0"/>
-              <a:t>Google Lens also uses and image detection of computer vision to show the similar results of objects on web.</a:t>
+              <a:rPr lang="en-IN" dirty="0" smtClean="0">
+                <a:solidFill>
+                  <a:schemeClr val="bg2">
+                    <a:lumMod val="50000"/>
+                  </a:schemeClr>
+                </a:solidFill>
+              </a:rPr>
+              <a:t>Google Lens also uses object detection to show the similar results of objects on web.</a:t>
             </a:r>
           </a:p>
           <a:p>
@@ -25622,10 +25429,22 @@
               <a:buChar char="•"/>
             </a:pPr>
             <a:r>
-              <a:rPr lang="en-IN" dirty="0" smtClean="0"/>
+              <a:rPr lang="en-IN" dirty="0" smtClean="0">
+                <a:solidFill>
+                  <a:schemeClr val="bg2">
+                    <a:lumMod val="50000"/>
+                  </a:schemeClr>
+                </a:solidFill>
+              </a:rPr>
               <a:t>Google Lens also identify text in an image and convert in into digital text. </a:t>
             </a:r>
-            <a:endParaRPr lang="en-IN" dirty="0"/>
+            <a:endParaRPr lang="en-IN" dirty="0">
+              <a:solidFill>
+                <a:schemeClr val="bg2">
+                  <a:lumMod val="50000"/>
+                </a:schemeClr>
+              </a:solidFill>
+            </a:endParaRPr>
           </a:p>
         </p:txBody>
       </p:sp>

</xml_diff>

<commit_message>
Adaptive Thresholding and matplot library
</commit_message>
<xml_diff>
--- a/Presentation/22BEC032-ARYAN-PURI.pptx
+++ b/Presentation/22BEC032-ARYAN-PURI.pptx
@@ -1422,22 +1422,22 @@
     </dgm:pt>
   </dgm:ptLst>
   <dgm:cxnLst>
+    <dgm:cxn modelId="{8F9FE852-55B8-41EF-95B9-194576ED6D23}" srcId="{0D8B6200-36CB-496B-A007-5DAAA3F8C926}" destId="{E197CE62-D2D9-4474-B8DD-D6A83AFE5E13}" srcOrd="5" destOrd="0" parTransId="{9C538898-33CF-4FD3-8EC9-BCB78387CC87}" sibTransId="{BEB174B4-BC92-4F78-B621-FDD68AFC82E0}"/>
+    <dgm:cxn modelId="{C1DBC5AD-3D8D-4671-BE55-253995E4DC0A}" type="presOf" srcId="{E197CE62-D2D9-4474-B8DD-D6A83AFE5E13}" destId="{A48CB934-370D-46C4-9E18-8387D2B3C2EB}" srcOrd="0" destOrd="0" presId="urn:microsoft.com/office/officeart/2008/layout/VerticalCurvedList"/>
+    <dgm:cxn modelId="{E0CA08E1-9DA5-4913-929E-1F58C0166DFA}" type="presOf" srcId="{981712A5-4D1F-4057-ADDF-F51F5F31B68F}" destId="{37778989-5798-4D95-B81A-80D77CF6FC02}" srcOrd="0" destOrd="0" presId="urn:microsoft.com/office/officeart/2008/layout/VerticalCurvedList"/>
+    <dgm:cxn modelId="{3432E45D-1782-40C6-B687-F584E4BE9999}" srcId="{0D8B6200-36CB-496B-A007-5DAAA3F8C926}" destId="{9C46430F-50A9-4207-A596-CFD56A7964A8}" srcOrd="0" destOrd="0" parTransId="{6401AA60-E921-408B-BF16-EE62C4EA14E6}" sibTransId="{981712A5-4D1F-4057-ADDF-F51F5F31B68F}"/>
+    <dgm:cxn modelId="{4B5AF97A-1C4D-43DF-B54D-2E88D1CF595A}" srcId="{0D8B6200-36CB-496B-A007-5DAAA3F8C926}" destId="{148D630E-3757-4BF6-B265-BC86D0FD2B6F}" srcOrd="2" destOrd="0" parTransId="{09BB42E4-BD8D-4F82-AF7C-9E280BBE90CA}" sibTransId="{EA4C80C4-3059-4758-8497-7462C2521651}"/>
+    <dgm:cxn modelId="{B8A8BFC2-7F5F-4884-8C38-49D4A69EC718}" type="presOf" srcId="{9C46430F-50A9-4207-A596-CFD56A7964A8}" destId="{83DD4071-084D-40DA-837B-DC7C5BA59E04}" srcOrd="0" destOrd="0" presId="urn:microsoft.com/office/officeart/2008/layout/VerticalCurvedList"/>
+    <dgm:cxn modelId="{08704E1D-F19E-451C-A4A7-41157453A695}" type="presOf" srcId="{83E2B95D-66A7-4327-9961-2061916E3E46}" destId="{2B77186D-785D-46AA-9937-2EE65C6F063B}" srcOrd="0" destOrd="0" presId="urn:microsoft.com/office/officeart/2008/layout/VerticalCurvedList"/>
+    <dgm:cxn modelId="{8FA0CAF8-C600-4BD7-B2FE-45283D9FB57D}" type="presOf" srcId="{D2B65C22-24C4-40EF-B91D-7C3B1F1801E5}" destId="{0334CE2A-2A6B-43E9-9368-1323632FE16B}" srcOrd="0" destOrd="0" presId="urn:microsoft.com/office/officeart/2008/layout/VerticalCurvedList"/>
+    <dgm:cxn modelId="{EE05BDC6-802D-4B18-BB61-22C246282187}" type="presOf" srcId="{0D8B6200-36CB-496B-A007-5DAAA3F8C926}" destId="{4518BE26-FBAB-4EC9-99D6-BE7A85193408}" srcOrd="0" destOrd="0" presId="urn:microsoft.com/office/officeart/2008/layout/VerticalCurvedList"/>
     <dgm:cxn modelId="{BAE68B0C-9E7C-4861-9CE2-2AC5DC103225}" type="presOf" srcId="{7D2C1D18-851C-48E4-8BBC-DEAA6E7E8A63}" destId="{3D121B7A-4475-4525-B7A2-7EC5375930D9}" srcOrd="0" destOrd="0" presId="urn:microsoft.com/office/officeart/2008/layout/VerticalCurvedList"/>
+    <dgm:cxn modelId="{6EC377C2-30AA-41A4-B29B-B0810B82B0DA}" srcId="{0D8B6200-36CB-496B-A007-5DAAA3F8C926}" destId="{72849F99-3770-4015-922D-3B4BE6975D2B}" srcOrd="3" destOrd="0" parTransId="{358A1A72-D5E4-4DD0-B01B-38CDBAEADB5B}" sibTransId="{F97998E5-24C7-49B5-97BD-B30682308B95}"/>
+    <dgm:cxn modelId="{1D7E246D-463A-45A0-B01C-E6C65D3BEF4D}" type="presOf" srcId="{72849F99-3770-4015-922D-3B4BE6975D2B}" destId="{88300636-204D-4FD9-9486-55F8262BDC0E}" srcOrd="0" destOrd="0" presId="urn:microsoft.com/office/officeart/2008/layout/VerticalCurvedList"/>
+    <dgm:cxn modelId="{EEE8F807-5201-494D-905A-775DEA33CA61}" type="presOf" srcId="{148D630E-3757-4BF6-B265-BC86D0FD2B6F}" destId="{14AB2552-7751-4877-934C-7EED7EADC334}" srcOrd="0" destOrd="0" presId="urn:microsoft.com/office/officeart/2008/layout/VerticalCurvedList"/>
+    <dgm:cxn modelId="{C25BA4EC-B277-4CAD-B90D-ECDF78F7A438}" srcId="{0D8B6200-36CB-496B-A007-5DAAA3F8C926}" destId="{83E2B95D-66A7-4327-9961-2061916E3E46}" srcOrd="4" destOrd="0" parTransId="{B123ABDF-E441-420B-B19A-54F40BEFB9E6}" sibTransId="{E3624C02-4F65-48C6-95C4-53E6A0933F60}"/>
+    <dgm:cxn modelId="{1A112639-CEAA-42E2-807C-5C4A998F557D}" srcId="{0D8B6200-36CB-496B-A007-5DAAA3F8C926}" destId="{D2B65C22-24C4-40EF-B91D-7C3B1F1801E5}" srcOrd="6" destOrd="0" parTransId="{2D5A9D9E-A5A0-4ADB-AC9D-F4F62AFDFAF7}" sibTransId="{56502258-EC50-484D-A5BE-25D25443D442}"/>
     <dgm:cxn modelId="{399C53FF-B35B-42F6-8A1E-9109375E86C1}" srcId="{0D8B6200-36CB-496B-A007-5DAAA3F8C926}" destId="{7D2C1D18-851C-48E4-8BBC-DEAA6E7E8A63}" srcOrd="1" destOrd="0" parTransId="{E717E16D-8201-4B7D-B910-9A0CEC0D432B}" sibTransId="{D76DCCAE-BE7E-4E5B-8D8D-96DB602B1744}"/>
-    <dgm:cxn modelId="{8F9FE852-55B8-41EF-95B9-194576ED6D23}" srcId="{0D8B6200-36CB-496B-A007-5DAAA3F8C926}" destId="{E197CE62-D2D9-4474-B8DD-D6A83AFE5E13}" srcOrd="5" destOrd="0" parTransId="{9C538898-33CF-4FD3-8EC9-BCB78387CC87}" sibTransId="{BEB174B4-BC92-4F78-B621-FDD68AFC82E0}"/>
-    <dgm:cxn modelId="{1D7E246D-463A-45A0-B01C-E6C65D3BEF4D}" type="presOf" srcId="{72849F99-3770-4015-922D-3B4BE6975D2B}" destId="{88300636-204D-4FD9-9486-55F8262BDC0E}" srcOrd="0" destOrd="0" presId="urn:microsoft.com/office/officeart/2008/layout/VerticalCurvedList"/>
-    <dgm:cxn modelId="{8FA0CAF8-C600-4BD7-B2FE-45283D9FB57D}" type="presOf" srcId="{D2B65C22-24C4-40EF-B91D-7C3B1F1801E5}" destId="{0334CE2A-2A6B-43E9-9368-1323632FE16B}" srcOrd="0" destOrd="0" presId="urn:microsoft.com/office/officeart/2008/layout/VerticalCurvedList"/>
-    <dgm:cxn modelId="{EEE8F807-5201-494D-905A-775DEA33CA61}" type="presOf" srcId="{148D630E-3757-4BF6-B265-BC86D0FD2B6F}" destId="{14AB2552-7751-4877-934C-7EED7EADC334}" srcOrd="0" destOrd="0" presId="urn:microsoft.com/office/officeart/2008/layout/VerticalCurvedList"/>
-    <dgm:cxn modelId="{E0CA08E1-9DA5-4913-929E-1F58C0166DFA}" type="presOf" srcId="{981712A5-4D1F-4057-ADDF-F51F5F31B68F}" destId="{37778989-5798-4D95-B81A-80D77CF6FC02}" srcOrd="0" destOrd="0" presId="urn:microsoft.com/office/officeart/2008/layout/VerticalCurvedList"/>
-    <dgm:cxn modelId="{4B5AF97A-1C4D-43DF-B54D-2E88D1CF595A}" srcId="{0D8B6200-36CB-496B-A007-5DAAA3F8C926}" destId="{148D630E-3757-4BF6-B265-BC86D0FD2B6F}" srcOrd="2" destOrd="0" parTransId="{09BB42E4-BD8D-4F82-AF7C-9E280BBE90CA}" sibTransId="{EA4C80C4-3059-4758-8497-7462C2521651}"/>
-    <dgm:cxn modelId="{C1DBC5AD-3D8D-4671-BE55-253995E4DC0A}" type="presOf" srcId="{E197CE62-D2D9-4474-B8DD-D6A83AFE5E13}" destId="{A48CB934-370D-46C4-9E18-8387D2B3C2EB}" srcOrd="0" destOrd="0" presId="urn:microsoft.com/office/officeart/2008/layout/VerticalCurvedList"/>
-    <dgm:cxn modelId="{1A112639-CEAA-42E2-807C-5C4A998F557D}" srcId="{0D8B6200-36CB-496B-A007-5DAAA3F8C926}" destId="{D2B65C22-24C4-40EF-B91D-7C3B1F1801E5}" srcOrd="6" destOrd="0" parTransId="{2D5A9D9E-A5A0-4ADB-AC9D-F4F62AFDFAF7}" sibTransId="{56502258-EC50-484D-A5BE-25D25443D442}"/>
-    <dgm:cxn modelId="{B8A8BFC2-7F5F-4884-8C38-49D4A69EC718}" type="presOf" srcId="{9C46430F-50A9-4207-A596-CFD56A7964A8}" destId="{83DD4071-084D-40DA-837B-DC7C5BA59E04}" srcOrd="0" destOrd="0" presId="urn:microsoft.com/office/officeart/2008/layout/VerticalCurvedList"/>
-    <dgm:cxn modelId="{EE05BDC6-802D-4B18-BB61-22C246282187}" type="presOf" srcId="{0D8B6200-36CB-496B-A007-5DAAA3F8C926}" destId="{4518BE26-FBAB-4EC9-99D6-BE7A85193408}" srcOrd="0" destOrd="0" presId="urn:microsoft.com/office/officeart/2008/layout/VerticalCurvedList"/>
-    <dgm:cxn modelId="{6EC377C2-30AA-41A4-B29B-B0810B82B0DA}" srcId="{0D8B6200-36CB-496B-A007-5DAAA3F8C926}" destId="{72849F99-3770-4015-922D-3B4BE6975D2B}" srcOrd="3" destOrd="0" parTransId="{358A1A72-D5E4-4DD0-B01B-38CDBAEADB5B}" sibTransId="{F97998E5-24C7-49B5-97BD-B30682308B95}"/>
-    <dgm:cxn modelId="{08704E1D-F19E-451C-A4A7-41157453A695}" type="presOf" srcId="{83E2B95D-66A7-4327-9961-2061916E3E46}" destId="{2B77186D-785D-46AA-9937-2EE65C6F063B}" srcOrd="0" destOrd="0" presId="urn:microsoft.com/office/officeart/2008/layout/VerticalCurvedList"/>
-    <dgm:cxn modelId="{C25BA4EC-B277-4CAD-B90D-ECDF78F7A438}" srcId="{0D8B6200-36CB-496B-A007-5DAAA3F8C926}" destId="{83E2B95D-66A7-4327-9961-2061916E3E46}" srcOrd="4" destOrd="0" parTransId="{B123ABDF-E441-420B-B19A-54F40BEFB9E6}" sibTransId="{E3624C02-4F65-48C6-95C4-53E6A0933F60}"/>
-    <dgm:cxn modelId="{3432E45D-1782-40C6-B687-F584E4BE9999}" srcId="{0D8B6200-36CB-496B-A007-5DAAA3F8C926}" destId="{9C46430F-50A9-4207-A596-CFD56A7964A8}" srcOrd="0" destOrd="0" parTransId="{6401AA60-E921-408B-BF16-EE62C4EA14E6}" sibTransId="{981712A5-4D1F-4057-ADDF-F51F5F31B68F}"/>
     <dgm:cxn modelId="{F2502E17-BE88-4145-A957-FBC3F8A1F0B3}" type="presParOf" srcId="{4518BE26-FBAB-4EC9-99D6-BE7A85193408}" destId="{9343E378-D2F9-4F7B-9B84-99E80207056A}" srcOrd="0" destOrd="0" presId="urn:microsoft.com/office/officeart/2008/layout/VerticalCurvedList"/>
     <dgm:cxn modelId="{00C4F62B-96C6-4707-B2EC-94BB21842413}" type="presParOf" srcId="{9343E378-D2F9-4F7B-9B84-99E80207056A}" destId="{5DA60F15-34FB-4A06-9360-14431F0B5D5B}" srcOrd="0" destOrd="0" presId="urn:microsoft.com/office/officeart/2008/layout/VerticalCurvedList"/>
     <dgm:cxn modelId="{63041955-5452-4E48-A251-44BF6E9B799F}" type="presParOf" srcId="{5DA60F15-34FB-4A06-9360-14431F0B5D5B}" destId="{8FE4046D-2646-47C4-847D-5308E63E2E9D}" srcOrd="0" destOrd="0" presId="urn:microsoft.com/office/officeart/2008/layout/VerticalCurvedList"/>
@@ -4802,7 +4802,7 @@
           <a:p>
             <a:fld id="{2A7BC5EC-9E33-49A7-9216-DEE32BFA872B}" type="datetimeFigureOut">
               <a:rPr lang="en-IN" smtClean="0"/>
-              <a:t>13-02-2025</a:t>
+              <a:t>02-03-2025</a:t>
             </a:fld>
             <a:endParaRPr lang="en-IN"/>
           </a:p>
@@ -5120,7 +5120,7 @@
           <a:noFill/>
           <a:extLst>
             <a:ext uri="{909E8E84-426E-40dd-AFC4-6F175D3DCCD1}">
-              <a14:hiddenFill xmlns:a14="http://schemas.microsoft.com/office/drawing/2010/main" xmlns="">
+              <a14:hiddenFill xmlns="" xmlns:a14="http://schemas.microsoft.com/office/drawing/2010/main">
                 <a:solidFill>
                   <a:srgbClr val="FFFFFF"/>
                 </a:solidFill>
@@ -5180,7 +5180,7 @@
             </a:ln>
             <a:extLst>
               <a:ext uri="{91240B29-F687-4f45-9708-019B960494DF}">
-                <a14:hiddenLine xmlns:a14="http://schemas.microsoft.com/office/drawing/2010/main" xmlns="" w="9525">
+                <a14:hiddenLine xmlns="" xmlns:a14="http://schemas.microsoft.com/office/drawing/2010/main" w="9525">
                   <a:solidFill>
                     <a:srgbClr val="000000"/>
                   </a:solidFill>
@@ -5270,7 +5270,7 @@
             </a:ln>
             <a:extLst>
               <a:ext uri="{91240B29-F687-4f45-9708-019B960494DF}">
-                <a14:hiddenLine xmlns:a14="http://schemas.microsoft.com/office/drawing/2010/main" xmlns="" w="9525">
+                <a14:hiddenLine xmlns="" xmlns:a14="http://schemas.microsoft.com/office/drawing/2010/main" w="9525">
                   <a:solidFill>
                     <a:srgbClr val="000000"/>
                   </a:solidFill>
@@ -5360,7 +5360,7 @@
             </a:ln>
             <a:extLst>
               <a:ext uri="{91240B29-F687-4f45-9708-019B960494DF}">
-                <a14:hiddenLine xmlns:a14="http://schemas.microsoft.com/office/drawing/2010/main" xmlns="" w="9525">
+                <a14:hiddenLine xmlns="" xmlns:a14="http://schemas.microsoft.com/office/drawing/2010/main" w="9525">
                   <a:solidFill>
                     <a:srgbClr val="000000"/>
                   </a:solidFill>
@@ -5394,7 +5394,7 @@
             </a:ln>
             <a:extLst>
               <a:ext uri="{91240B29-F687-4f45-9708-019B960494DF}">
-                <a14:hiddenLine xmlns:a14="http://schemas.microsoft.com/office/drawing/2010/main" xmlns="" w="9525">
+                <a14:hiddenLine xmlns="" xmlns:a14="http://schemas.microsoft.com/office/drawing/2010/main" w="9525">
                   <a:solidFill>
                     <a:srgbClr val="000000"/>
                   </a:solidFill>
@@ -5484,7 +5484,7 @@
             </a:ln>
             <a:extLst>
               <a:ext uri="{91240B29-F687-4f45-9708-019B960494DF}">
-                <a14:hiddenLine xmlns:a14="http://schemas.microsoft.com/office/drawing/2010/main" xmlns="" w="9525">
+                <a14:hiddenLine xmlns="" xmlns:a14="http://schemas.microsoft.com/office/drawing/2010/main" w="9525">
                   <a:solidFill>
                     <a:srgbClr val="000000"/>
                   </a:solidFill>
@@ -5546,7 +5546,7 @@
             </a:ln>
             <a:extLst>
               <a:ext uri="{91240B29-F687-4f45-9708-019B960494DF}">
-                <a14:hiddenLine xmlns:a14="http://schemas.microsoft.com/office/drawing/2010/main" xmlns="" w="9525">
+                <a14:hiddenLine xmlns="" xmlns:a14="http://schemas.microsoft.com/office/drawing/2010/main" w="9525">
                   <a:solidFill>
                     <a:srgbClr val="000000"/>
                   </a:solidFill>
@@ -5608,7 +5608,7 @@
             </a:ln>
             <a:extLst>
               <a:ext uri="{91240B29-F687-4f45-9708-019B960494DF}">
-                <a14:hiddenLine xmlns:a14="http://schemas.microsoft.com/office/drawing/2010/main" xmlns="" w="9525">
+                <a14:hiddenLine xmlns="" xmlns:a14="http://schemas.microsoft.com/office/drawing/2010/main" w="9525">
                   <a:solidFill>
                     <a:srgbClr val="000000"/>
                   </a:solidFill>
@@ -5698,7 +5698,7 @@
             </a:ln>
             <a:extLst>
               <a:ext uri="{91240B29-F687-4f45-9708-019B960494DF}">
-                <a14:hiddenLine xmlns:a14="http://schemas.microsoft.com/office/drawing/2010/main" xmlns="" w="9525">
+                <a14:hiddenLine xmlns="" xmlns:a14="http://schemas.microsoft.com/office/drawing/2010/main" w="9525">
                   <a:solidFill>
                     <a:srgbClr val="000000"/>
                   </a:solidFill>
@@ -5760,7 +5760,7 @@
             </a:ln>
             <a:extLst>
               <a:ext uri="{91240B29-F687-4f45-9708-019B960494DF}">
-                <a14:hiddenLine xmlns:a14="http://schemas.microsoft.com/office/drawing/2010/main" xmlns="" w="9525">
+                <a14:hiddenLine xmlns="" xmlns:a14="http://schemas.microsoft.com/office/drawing/2010/main" w="9525">
                   <a:solidFill>
                     <a:srgbClr val="000000"/>
                   </a:solidFill>
@@ -5822,7 +5822,7 @@
             </a:ln>
             <a:extLst>
               <a:ext uri="{91240B29-F687-4f45-9708-019B960494DF}">
-                <a14:hiddenLine xmlns:a14="http://schemas.microsoft.com/office/drawing/2010/main" xmlns="" w="9525">
+                <a14:hiddenLine xmlns="" xmlns:a14="http://schemas.microsoft.com/office/drawing/2010/main" w="9525">
                   <a:solidFill>
                     <a:srgbClr val="000000"/>
                   </a:solidFill>
@@ -5912,7 +5912,7 @@
             </a:ln>
             <a:extLst>
               <a:ext uri="{91240B29-F687-4f45-9708-019B960494DF}">
-                <a14:hiddenLine xmlns:a14="http://schemas.microsoft.com/office/drawing/2010/main" xmlns="" w="9525">
+                <a14:hiddenLine xmlns="" xmlns:a14="http://schemas.microsoft.com/office/drawing/2010/main" w="9525">
                   <a:solidFill>
                     <a:srgbClr val="000000"/>
                   </a:solidFill>
@@ -6002,7 +6002,7 @@
             </a:ln>
             <a:extLst>
               <a:ext uri="{91240B29-F687-4f45-9708-019B960494DF}">
-                <a14:hiddenLine xmlns:a14="http://schemas.microsoft.com/office/drawing/2010/main" xmlns="" w="9525">
+                <a14:hiddenLine xmlns="" xmlns:a14="http://schemas.microsoft.com/office/drawing/2010/main" w="9525">
                   <a:solidFill>
                     <a:srgbClr val="000000"/>
                   </a:solidFill>
@@ -6064,7 +6064,7 @@
             </a:ln>
             <a:extLst>
               <a:ext uri="{91240B29-F687-4f45-9708-019B960494DF}">
-                <a14:hiddenLine xmlns:a14="http://schemas.microsoft.com/office/drawing/2010/main" xmlns="" w="9525">
+                <a14:hiddenLine xmlns="" xmlns:a14="http://schemas.microsoft.com/office/drawing/2010/main" w="9525">
                   <a:solidFill>
                     <a:srgbClr val="000000"/>
                   </a:solidFill>
@@ -6174,7 +6174,7 @@
             </a:ln>
             <a:extLst>
               <a:ext uri="{91240B29-F687-4f45-9708-019B960494DF}">
-                <a14:hiddenLine xmlns:a14="http://schemas.microsoft.com/office/drawing/2010/main" xmlns="" w="9525">
+                <a14:hiddenLine xmlns="" xmlns:a14="http://schemas.microsoft.com/office/drawing/2010/main" w="9525">
                   <a:solidFill>
                     <a:srgbClr val="000000"/>
                   </a:solidFill>
@@ -6236,7 +6236,7 @@
             </a:ln>
             <a:extLst>
               <a:ext uri="{91240B29-F687-4f45-9708-019B960494DF}">
-                <a14:hiddenLine xmlns:a14="http://schemas.microsoft.com/office/drawing/2010/main" xmlns="" w="9525">
+                <a14:hiddenLine xmlns="" xmlns:a14="http://schemas.microsoft.com/office/drawing/2010/main" w="9525">
                   <a:solidFill>
                     <a:srgbClr val="000000"/>
                   </a:solidFill>
@@ -6326,7 +6326,7 @@
             </a:ln>
             <a:extLst>
               <a:ext uri="{91240B29-F687-4f45-9708-019B960494DF}">
-                <a14:hiddenLine xmlns:a14="http://schemas.microsoft.com/office/drawing/2010/main" xmlns="" w="9525">
+                <a14:hiddenLine xmlns="" xmlns:a14="http://schemas.microsoft.com/office/drawing/2010/main" w="9525">
                   <a:solidFill>
                     <a:srgbClr val="000000"/>
                   </a:solidFill>
@@ -6416,7 +6416,7 @@
             </a:ln>
             <a:extLst>
               <a:ext uri="{91240B29-F687-4f45-9708-019B960494DF}">
-                <a14:hiddenLine xmlns:a14="http://schemas.microsoft.com/office/drawing/2010/main" xmlns="" w="9525">
+                <a14:hiddenLine xmlns="" xmlns:a14="http://schemas.microsoft.com/office/drawing/2010/main" w="9525">
                   <a:solidFill>
                     <a:srgbClr val="000000"/>
                   </a:solidFill>
@@ -6478,7 +6478,7 @@
             </a:ln>
             <a:extLst>
               <a:ext uri="{91240B29-F687-4f45-9708-019B960494DF}">
-                <a14:hiddenLine xmlns:a14="http://schemas.microsoft.com/office/drawing/2010/main" xmlns="" w="9525">
+                <a14:hiddenLine xmlns="" xmlns:a14="http://schemas.microsoft.com/office/drawing/2010/main" w="9525">
                   <a:solidFill>
                     <a:srgbClr val="000000"/>
                   </a:solidFill>
@@ -6568,7 +6568,7 @@
             </a:ln>
             <a:extLst>
               <a:ext uri="{91240B29-F687-4f45-9708-019B960494DF}">
-                <a14:hiddenLine xmlns:a14="http://schemas.microsoft.com/office/drawing/2010/main" xmlns="" w="9525">
+                <a14:hiddenLine xmlns="" xmlns:a14="http://schemas.microsoft.com/office/drawing/2010/main" w="9525">
                   <a:solidFill>
                     <a:srgbClr val="000000"/>
                   </a:solidFill>
@@ -6658,7 +6658,7 @@
             </a:ln>
             <a:extLst>
               <a:ext uri="{91240B29-F687-4f45-9708-019B960494DF}">
-                <a14:hiddenLine xmlns:a14="http://schemas.microsoft.com/office/drawing/2010/main" xmlns="" w="9525">
+                <a14:hiddenLine xmlns="" xmlns:a14="http://schemas.microsoft.com/office/drawing/2010/main" w="9525">
                   <a:solidFill>
                     <a:srgbClr val="000000"/>
                   </a:solidFill>
@@ -6714,7 +6714,7 @@
             </a:ln>
             <a:extLst>
               <a:ext uri="{91240B29-F687-4f45-9708-019B960494DF}">
-                <a14:hiddenLine xmlns:a14="http://schemas.microsoft.com/office/drawing/2010/main" xmlns="" w="9525">
+                <a14:hiddenLine xmlns="" xmlns:a14="http://schemas.microsoft.com/office/drawing/2010/main" w="9525">
                   <a:solidFill>
                     <a:srgbClr val="000000"/>
                   </a:solidFill>
@@ -6804,7 +6804,7 @@
             </a:ln>
             <a:extLst>
               <a:ext uri="{91240B29-F687-4f45-9708-019B960494DF}">
-                <a14:hiddenLine xmlns:a14="http://schemas.microsoft.com/office/drawing/2010/main" xmlns="" w="9525">
+                <a14:hiddenLine xmlns="" xmlns:a14="http://schemas.microsoft.com/office/drawing/2010/main" w="9525">
                   <a:solidFill>
                     <a:srgbClr val="000000"/>
                   </a:solidFill>
@@ -6860,7 +6860,7 @@
             </a:ln>
             <a:extLst>
               <a:ext uri="{91240B29-F687-4f45-9708-019B960494DF}">
-                <a14:hiddenLine xmlns:a14="http://schemas.microsoft.com/office/drawing/2010/main" xmlns="" w="9525">
+                <a14:hiddenLine xmlns="" xmlns:a14="http://schemas.microsoft.com/office/drawing/2010/main" w="9525">
                   <a:solidFill>
                     <a:srgbClr val="000000"/>
                   </a:solidFill>
@@ -6950,7 +6950,7 @@
             </a:ln>
             <a:extLst>
               <a:ext uri="{91240B29-F687-4f45-9708-019B960494DF}">
-                <a14:hiddenLine xmlns:a14="http://schemas.microsoft.com/office/drawing/2010/main" xmlns="" w="9525">
+                <a14:hiddenLine xmlns="" xmlns:a14="http://schemas.microsoft.com/office/drawing/2010/main" w="9525">
                   <a:solidFill>
                     <a:srgbClr val="000000"/>
                   </a:solidFill>
@@ -7018,7 +7018,7 @@
             </a:ln>
             <a:extLst>
               <a:ext uri="{91240B29-F687-4f45-9708-019B960494DF}">
-                <a14:hiddenLine xmlns:a14="http://schemas.microsoft.com/office/drawing/2010/main" xmlns="" w="9525">
+                <a14:hiddenLine xmlns="" xmlns:a14="http://schemas.microsoft.com/office/drawing/2010/main" w="9525">
                   <a:solidFill>
                     <a:srgbClr val="000000"/>
                   </a:solidFill>
@@ -7108,7 +7108,7 @@
             </a:ln>
             <a:extLst>
               <a:ext uri="{91240B29-F687-4f45-9708-019B960494DF}">
-                <a14:hiddenLine xmlns:a14="http://schemas.microsoft.com/office/drawing/2010/main" xmlns="" w="9525">
+                <a14:hiddenLine xmlns="" xmlns:a14="http://schemas.microsoft.com/office/drawing/2010/main" w="9525">
                   <a:solidFill>
                     <a:srgbClr val="000000"/>
                   </a:solidFill>
@@ -7176,7 +7176,7 @@
             </a:ln>
             <a:extLst>
               <a:ext uri="{91240B29-F687-4f45-9708-019B960494DF}">
-                <a14:hiddenLine xmlns:a14="http://schemas.microsoft.com/office/drawing/2010/main" xmlns="" w="9525">
+                <a14:hiddenLine xmlns="" xmlns:a14="http://schemas.microsoft.com/office/drawing/2010/main" w="9525">
                   <a:solidFill>
                     <a:srgbClr val="000000"/>
                   </a:solidFill>
@@ -7266,7 +7266,7 @@
             </a:ln>
             <a:extLst>
               <a:ext uri="{91240B29-F687-4f45-9708-019B960494DF}">
-                <a14:hiddenLine xmlns:a14="http://schemas.microsoft.com/office/drawing/2010/main" xmlns="" w="9525">
+                <a14:hiddenLine xmlns="" xmlns:a14="http://schemas.microsoft.com/office/drawing/2010/main" w="9525">
                   <a:solidFill>
                     <a:srgbClr val="000000"/>
                   </a:solidFill>
@@ -7300,7 +7300,7 @@
             </a:ln>
             <a:extLst>
               <a:ext uri="{91240B29-F687-4f45-9708-019B960494DF}">
-                <a14:hiddenLine xmlns:a14="http://schemas.microsoft.com/office/drawing/2010/main" xmlns="" w="9525">
+                <a14:hiddenLine xmlns="" xmlns:a14="http://schemas.microsoft.com/office/drawing/2010/main" w="9525">
                   <a:solidFill>
                     <a:srgbClr val="000000"/>
                   </a:solidFill>
@@ -7390,7 +7390,7 @@
             </a:ln>
             <a:extLst>
               <a:ext uri="{91240B29-F687-4f45-9708-019B960494DF}">
-                <a14:hiddenLine xmlns:a14="http://schemas.microsoft.com/office/drawing/2010/main" xmlns="" w="9525">
+                <a14:hiddenLine xmlns="" xmlns:a14="http://schemas.microsoft.com/office/drawing/2010/main" w="9525">
                   <a:solidFill>
                     <a:srgbClr val="000000"/>
                   </a:solidFill>
@@ -7452,7 +7452,7 @@
             </a:ln>
             <a:extLst>
               <a:ext uri="{91240B29-F687-4f45-9708-019B960494DF}">
-                <a14:hiddenLine xmlns:a14="http://schemas.microsoft.com/office/drawing/2010/main" xmlns="" w="9525">
+                <a14:hiddenLine xmlns="" xmlns:a14="http://schemas.microsoft.com/office/drawing/2010/main" w="9525">
                   <a:solidFill>
                     <a:srgbClr val="000000"/>
                   </a:solidFill>
@@ -7514,7 +7514,7 @@
             </a:ln>
             <a:extLst>
               <a:ext uri="{91240B29-F687-4f45-9708-019B960494DF}">
-                <a14:hiddenLine xmlns:a14="http://schemas.microsoft.com/office/drawing/2010/main" xmlns="" w="9525">
+                <a14:hiddenLine xmlns="" xmlns:a14="http://schemas.microsoft.com/office/drawing/2010/main" w="9525">
                   <a:solidFill>
                     <a:srgbClr val="000000"/>
                   </a:solidFill>
@@ -7604,7 +7604,7 @@
             </a:ln>
             <a:extLst>
               <a:ext uri="{91240B29-F687-4f45-9708-019B960494DF}">
-                <a14:hiddenLine xmlns:a14="http://schemas.microsoft.com/office/drawing/2010/main" xmlns="" w="9525">
+                <a14:hiddenLine xmlns="" xmlns:a14="http://schemas.microsoft.com/office/drawing/2010/main" w="9525">
                   <a:solidFill>
                     <a:srgbClr val="000000"/>
                   </a:solidFill>
@@ -7672,7 +7672,7 @@
             </a:ln>
             <a:extLst>
               <a:ext uri="{91240B29-F687-4f45-9708-019B960494DF}">
-                <a14:hiddenLine xmlns:a14="http://schemas.microsoft.com/office/drawing/2010/main" xmlns="" w="9525">
+                <a14:hiddenLine xmlns="" xmlns:a14="http://schemas.microsoft.com/office/drawing/2010/main" w="9525">
                   <a:solidFill>
                     <a:srgbClr val="000000"/>
                   </a:solidFill>
@@ -7734,7 +7734,7 @@
             </a:ln>
             <a:extLst>
               <a:ext uri="{91240B29-F687-4f45-9708-019B960494DF}">
-                <a14:hiddenLine xmlns:a14="http://schemas.microsoft.com/office/drawing/2010/main" xmlns="" w="9525">
+                <a14:hiddenLine xmlns="" xmlns:a14="http://schemas.microsoft.com/office/drawing/2010/main" w="9525">
                   <a:solidFill>
                     <a:srgbClr val="000000"/>
                   </a:solidFill>
@@ -7824,7 +7824,7 @@
             </a:ln>
             <a:extLst>
               <a:ext uri="{91240B29-F687-4f45-9708-019B960494DF}">
-                <a14:hiddenLine xmlns:a14="http://schemas.microsoft.com/office/drawing/2010/main" xmlns="" w="9525">
+                <a14:hiddenLine xmlns="" xmlns:a14="http://schemas.microsoft.com/office/drawing/2010/main" w="9525">
                   <a:solidFill>
                     <a:srgbClr val="000000"/>
                   </a:solidFill>
@@ -7886,7 +7886,7 @@
             </a:ln>
             <a:extLst>
               <a:ext uri="{91240B29-F687-4f45-9708-019B960494DF}">
-                <a14:hiddenLine xmlns:a14="http://schemas.microsoft.com/office/drawing/2010/main" xmlns="" w="9525">
+                <a14:hiddenLine xmlns="" xmlns:a14="http://schemas.microsoft.com/office/drawing/2010/main" w="9525">
                   <a:solidFill>
                     <a:srgbClr val="000000"/>
                   </a:solidFill>
@@ -7976,7 +7976,7 @@
             </a:ln>
             <a:extLst>
               <a:ext uri="{91240B29-F687-4f45-9708-019B960494DF}">
-                <a14:hiddenLine xmlns:a14="http://schemas.microsoft.com/office/drawing/2010/main" xmlns="" w="9525">
+                <a14:hiddenLine xmlns="" xmlns:a14="http://schemas.microsoft.com/office/drawing/2010/main" w="9525">
                   <a:solidFill>
                     <a:srgbClr val="000000"/>
                   </a:solidFill>
@@ -8038,7 +8038,7 @@
             </a:ln>
             <a:extLst>
               <a:ext uri="{91240B29-F687-4f45-9708-019B960494DF}">
-                <a14:hiddenLine xmlns:a14="http://schemas.microsoft.com/office/drawing/2010/main" xmlns="" w="9525">
+                <a14:hiddenLine xmlns="" xmlns:a14="http://schemas.microsoft.com/office/drawing/2010/main" w="9525">
                   <a:solidFill>
                     <a:srgbClr val="000000"/>
                   </a:solidFill>
@@ -8128,7 +8128,7 @@
             </a:ln>
             <a:extLst>
               <a:ext uri="{91240B29-F687-4f45-9708-019B960494DF}">
-                <a14:hiddenLine xmlns:a14="http://schemas.microsoft.com/office/drawing/2010/main" xmlns="" w="9525">
+                <a14:hiddenLine xmlns="" xmlns:a14="http://schemas.microsoft.com/office/drawing/2010/main" w="9525">
                   <a:solidFill>
                     <a:srgbClr val="000000"/>
                   </a:solidFill>
@@ -8162,7 +8162,7 @@
             </a:ln>
             <a:extLst>
               <a:ext uri="{91240B29-F687-4f45-9708-019B960494DF}">
-                <a14:hiddenLine xmlns:a14="http://schemas.microsoft.com/office/drawing/2010/main" xmlns="" w="9525">
+                <a14:hiddenLine xmlns="" xmlns:a14="http://schemas.microsoft.com/office/drawing/2010/main" w="9525">
                   <a:solidFill>
                     <a:srgbClr val="000000"/>
                   </a:solidFill>
@@ -8227,7 +8227,7 @@
             </a:ln>
             <a:extLst>
               <a:ext uri="{91240B29-F687-4f45-9708-019B960494DF}">
-                <a14:hiddenLine xmlns:a14="http://schemas.microsoft.com/office/drawing/2010/main" xmlns="" w="9525">
+                <a14:hiddenLine xmlns="" xmlns:a14="http://schemas.microsoft.com/office/drawing/2010/main" w="9525">
                   <a:solidFill>
                     <a:srgbClr val="000000"/>
                   </a:solidFill>
@@ -8317,7 +8317,7 @@
             </a:ln>
             <a:extLst>
               <a:ext uri="{91240B29-F687-4f45-9708-019B960494DF}">
-                <a14:hiddenLine xmlns:a14="http://schemas.microsoft.com/office/drawing/2010/main" xmlns="" w="9525">
+                <a14:hiddenLine xmlns="" xmlns:a14="http://schemas.microsoft.com/office/drawing/2010/main" w="9525">
                   <a:solidFill>
                     <a:srgbClr val="000000"/>
                   </a:solidFill>
@@ -8379,7 +8379,7 @@
             </a:ln>
             <a:extLst>
               <a:ext uri="{91240B29-F687-4f45-9708-019B960494DF}">
-                <a14:hiddenLine xmlns:a14="http://schemas.microsoft.com/office/drawing/2010/main" xmlns="" w="9525">
+                <a14:hiddenLine xmlns="" xmlns:a14="http://schemas.microsoft.com/office/drawing/2010/main" w="9525">
                   <a:solidFill>
                     <a:srgbClr val="000000"/>
                   </a:solidFill>
@@ -8469,7 +8469,7 @@
             </a:ln>
             <a:extLst>
               <a:ext uri="{91240B29-F687-4f45-9708-019B960494DF}">
-                <a14:hiddenLine xmlns:a14="http://schemas.microsoft.com/office/drawing/2010/main" xmlns="" w="9525">
+                <a14:hiddenLine xmlns="" xmlns:a14="http://schemas.microsoft.com/office/drawing/2010/main" w="9525">
                   <a:solidFill>
                     <a:srgbClr val="000000"/>
                   </a:solidFill>
@@ -8559,7 +8559,7 @@
             </a:ln>
             <a:extLst>
               <a:ext uri="{91240B29-F687-4f45-9708-019B960494DF}">
-                <a14:hiddenLine xmlns:a14="http://schemas.microsoft.com/office/drawing/2010/main" xmlns="" w="9525">
+                <a14:hiddenLine xmlns="" xmlns:a14="http://schemas.microsoft.com/office/drawing/2010/main" w="9525">
                   <a:solidFill>
                     <a:srgbClr val="000000"/>
                   </a:solidFill>
@@ -8624,7 +8624,7 @@
             </a:ln>
             <a:extLst>
               <a:ext uri="{91240B29-F687-4f45-9708-019B960494DF}">
-                <a14:hiddenLine xmlns:a14="http://schemas.microsoft.com/office/drawing/2010/main" xmlns="" w="9525">
+                <a14:hiddenLine xmlns="" xmlns:a14="http://schemas.microsoft.com/office/drawing/2010/main" w="9525">
                   <a:solidFill>
                     <a:srgbClr val="000000"/>
                   </a:solidFill>
@@ -8686,7 +8686,7 @@
             </a:ln>
             <a:extLst>
               <a:ext uri="{91240B29-F687-4f45-9708-019B960494DF}">
-                <a14:hiddenLine xmlns:a14="http://schemas.microsoft.com/office/drawing/2010/main" xmlns="" w="9525">
+                <a14:hiddenLine xmlns="" xmlns:a14="http://schemas.microsoft.com/office/drawing/2010/main" w="9525">
                   <a:solidFill>
                     <a:srgbClr val="000000"/>
                   </a:solidFill>
@@ -8776,7 +8776,7 @@
             </a:ln>
             <a:extLst>
               <a:ext uri="{91240B29-F687-4f45-9708-019B960494DF}">
-                <a14:hiddenLine xmlns:a14="http://schemas.microsoft.com/office/drawing/2010/main" xmlns="" w="9525">
+                <a14:hiddenLine xmlns="" xmlns:a14="http://schemas.microsoft.com/office/drawing/2010/main" w="9525">
                   <a:solidFill>
                     <a:srgbClr val="000000"/>
                   </a:solidFill>
@@ -8866,7 +8866,7 @@
             </a:ln>
             <a:extLst>
               <a:ext uri="{91240B29-F687-4f45-9708-019B960494DF}">
-                <a14:hiddenLine xmlns:a14="http://schemas.microsoft.com/office/drawing/2010/main" xmlns="" w="9525">
+                <a14:hiddenLine xmlns="" xmlns:a14="http://schemas.microsoft.com/office/drawing/2010/main" w="9525">
                   <a:solidFill>
                     <a:srgbClr val="000000"/>
                   </a:solidFill>
@@ -8928,7 +8928,7 @@
             </a:ln>
             <a:extLst>
               <a:ext uri="{91240B29-F687-4f45-9708-019B960494DF}">
-                <a14:hiddenLine xmlns:a14="http://schemas.microsoft.com/office/drawing/2010/main" xmlns="" w="9525">
+                <a14:hiddenLine xmlns="" xmlns:a14="http://schemas.microsoft.com/office/drawing/2010/main" w="9525">
                   <a:solidFill>
                     <a:srgbClr val="000000"/>
                   </a:solidFill>
@@ -9048,7 +9048,7 @@
             </a:ln>
             <a:extLst>
               <a:ext uri="{91240B29-F687-4f45-9708-019B960494DF}">
-                <a14:hiddenLine xmlns:a14="http://schemas.microsoft.com/office/drawing/2010/main" xmlns="" w="9525">
+                <a14:hiddenLine xmlns="" xmlns:a14="http://schemas.microsoft.com/office/drawing/2010/main" w="9525">
                   <a:solidFill>
                     <a:srgbClr val="000000"/>
                   </a:solidFill>
@@ -9116,7 +9116,7 @@
             </a:ln>
             <a:extLst>
               <a:ext uri="{91240B29-F687-4f45-9708-019B960494DF}">
-                <a14:hiddenLine xmlns:a14="http://schemas.microsoft.com/office/drawing/2010/main" xmlns="" w="9525">
+                <a14:hiddenLine xmlns="" xmlns:a14="http://schemas.microsoft.com/office/drawing/2010/main" w="9525">
                   <a:solidFill>
                     <a:srgbClr val="000000"/>
                   </a:solidFill>
@@ -9206,7 +9206,7 @@
             </a:ln>
             <a:extLst>
               <a:ext uri="{91240B29-F687-4f45-9708-019B960494DF}">
-                <a14:hiddenLine xmlns:a14="http://schemas.microsoft.com/office/drawing/2010/main" xmlns="" w="9525">
+                <a14:hiddenLine xmlns="" xmlns:a14="http://schemas.microsoft.com/office/drawing/2010/main" w="9525">
                   <a:solidFill>
                     <a:srgbClr val="000000"/>
                   </a:solidFill>
@@ -9346,7 +9346,7 @@
           <a:p>
             <a:fld id="{B52A910B-62A7-4E1E-B3C0-ADEE33A92941}" type="datetime1">
               <a:rPr lang="en-IN" smtClean="0"/>
-              <a:t>13-02-2025</a:t>
+              <a:t>02-03-2025</a:t>
             </a:fld>
             <a:endParaRPr lang="en-IN"/>
           </a:p>
@@ -9616,7 +9616,7 @@
           <a:p>
             <a:fld id="{9D628BE6-4C6E-4407-966D-63568283CF98}" type="datetime1">
               <a:rPr lang="en-IN" smtClean="0"/>
-              <a:t>13-02-2025</a:t>
+              <a:t>02-03-2025</a:t>
             </a:fld>
             <a:endParaRPr lang="en-IN"/>
           </a:p>
@@ -9815,7 +9815,7 @@
           <a:p>
             <a:fld id="{DA48C904-E2DD-4142-982B-F6DD47119002}" type="datetime1">
               <a:rPr lang="en-IN" smtClean="0"/>
-              <a:t>13-02-2025</a:t>
+              <a:t>02-03-2025</a:t>
             </a:fld>
             <a:endParaRPr lang="en-IN"/>
           </a:p>
@@ -10081,7 +10081,7 @@
           <a:p>
             <a:fld id="{40948B57-0A93-4B85-A16B-FBC3E100F2BC}" type="datetime1">
               <a:rPr lang="en-IN" smtClean="0"/>
-              <a:t>13-02-2025</a:t>
+              <a:t>02-03-2025</a:t>
             </a:fld>
             <a:endParaRPr lang="en-IN"/>
           </a:p>
@@ -10518,7 +10518,7 @@
           <a:p>
             <a:fld id="{FECAAA6D-2E8C-4D9A-A6A9-BE966EE6CF5A}" type="datetime1">
               <a:rPr lang="en-IN" smtClean="0"/>
-              <a:t>13-02-2025</a:t>
+              <a:t>02-03-2025</a:t>
             </a:fld>
             <a:endParaRPr lang="en-IN"/>
           </a:p>
@@ -11067,7 +11067,7 @@
           <a:p>
             <a:fld id="{A93EA0AC-39D6-4A25-9A5E-51C62B544299}" type="datetime1">
               <a:rPr lang="en-IN" smtClean="0"/>
-              <a:t>13-02-2025</a:t>
+              <a:t>02-03-2025</a:t>
             </a:fld>
             <a:endParaRPr lang="en-IN"/>
           </a:p>
@@ -11790,7 +11790,7 @@
           <a:p>
             <a:fld id="{98569F31-AFCF-445E-850E-43B6AA89D957}" type="datetime1">
               <a:rPr lang="en-IN" smtClean="0"/>
-              <a:t>13-02-2025</a:t>
+              <a:t>02-03-2025</a:t>
             </a:fld>
             <a:endParaRPr lang="en-IN"/>
           </a:p>
@@ -11963,7 +11963,7 @@
           <a:p>
             <a:fld id="{C50A078A-B9C1-4794-984A-4747680CD064}" type="datetime1">
               <a:rPr lang="en-IN" smtClean="0"/>
-              <a:t>13-02-2025</a:t>
+              <a:t>02-03-2025</a:t>
             </a:fld>
             <a:endParaRPr lang="en-IN"/>
           </a:p>
@@ -12146,7 +12146,7 @@
           <a:p>
             <a:fld id="{5D51BB25-042A-40C5-88E0-EEF356BF3F4C}" type="datetime1">
               <a:rPr lang="en-IN" smtClean="0"/>
-              <a:t>13-02-2025</a:t>
+              <a:t>02-03-2025</a:t>
             </a:fld>
             <a:endParaRPr lang="en-IN"/>
           </a:p>
@@ -12319,7 +12319,7 @@
           <a:p>
             <a:fld id="{62E42470-D56A-4076-8F51-8478B15A0D73}" type="datetime1">
               <a:rPr lang="en-IN" smtClean="0"/>
-              <a:t>13-02-2025</a:t>
+              <a:t>02-03-2025</a:t>
             </a:fld>
             <a:endParaRPr lang="en-IN"/>
           </a:p>
@@ -12572,7 +12572,7 @@
           <a:p>
             <a:fld id="{AF607E66-EC2A-416B-B9FE-FAE715ED5641}" type="datetime1">
               <a:rPr lang="en-IN" smtClean="0"/>
-              <a:t>13-02-2025</a:t>
+              <a:t>02-03-2025</a:t>
             </a:fld>
             <a:endParaRPr lang="en-IN"/>
           </a:p>
@@ -12807,7 +12807,7 @@
           <a:p>
             <a:fld id="{DC163DA8-612F-4F9C-BE0D-205AD2D114B0}" type="datetime1">
               <a:rPr lang="en-IN" smtClean="0"/>
-              <a:t>13-02-2025</a:t>
+              <a:t>02-03-2025</a:t>
             </a:fld>
             <a:endParaRPr lang="en-IN"/>
           </a:p>
@@ -13191,7 +13191,7 @@
           <a:p>
             <a:fld id="{0C329C18-71EC-42F0-B82C-DCB74A79C8EE}" type="datetime1">
               <a:rPr lang="en-IN" smtClean="0"/>
-              <a:t>13-02-2025</a:t>
+              <a:t>02-03-2025</a:t>
             </a:fld>
             <a:endParaRPr lang="en-IN"/>
           </a:p>
@@ -13312,7 +13312,7 @@
           <a:p>
             <a:fld id="{42701395-1742-4394-8CB2-120F27E3D1DB}" type="datetime1">
               <a:rPr lang="en-IN" smtClean="0"/>
-              <a:t>13-02-2025</a:t>
+              <a:t>02-03-2025</a:t>
             </a:fld>
             <a:endParaRPr lang="en-IN"/>
           </a:p>
@@ -13410,7 +13410,7 @@
           <a:p>
             <a:fld id="{87BE0915-5F51-45F2-95F1-63B9B88E8B70}" type="datetime1">
               <a:rPr lang="en-IN" smtClean="0"/>
-              <a:t>13-02-2025</a:t>
+              <a:t>02-03-2025</a:t>
             </a:fld>
             <a:endParaRPr lang="en-IN"/>
           </a:p>
@@ -13662,7 +13662,7 @@
           <a:p>
             <a:fld id="{A70AB531-F652-4E7F-8AAF-BB3DD532AE35}" type="datetime1">
               <a:rPr lang="en-IN" smtClean="0"/>
-              <a:t>13-02-2025</a:t>
+              <a:t>02-03-2025</a:t>
             </a:fld>
             <a:endParaRPr lang="en-IN"/>
           </a:p>
@@ -13945,7 +13945,7 @@
           <a:p>
             <a:fld id="{EC34000F-8204-4D65-BB89-382291F3BC36}" type="datetime1">
               <a:rPr lang="en-IN" smtClean="0"/>
-              <a:t>13-02-2025</a:t>
+              <a:t>02-03-2025</a:t>
             </a:fld>
             <a:endParaRPr lang="en-IN"/>
           </a:p>
@@ -14098,7 +14098,7 @@
           <a:noFill/>
           <a:extLst>
             <a:ext uri="{909E8E84-426E-40dd-AFC4-6F175D3DCCD1}">
-              <a14:hiddenFill xmlns:a14="http://schemas.microsoft.com/office/drawing/2010/main" xmlns="">
+              <a14:hiddenFill xmlns="" xmlns:a14="http://schemas.microsoft.com/office/drawing/2010/main">
                 <a:solidFill>
                   <a:srgbClr val="FFFFFF"/>
                 </a:solidFill>
@@ -14172,7 +14172,7 @@
               </a:ln>
               <a:extLst>
                 <a:ext uri="{91240B29-F687-4f45-9708-019B960494DF}">
-                  <a14:hiddenLine xmlns:a14="http://schemas.microsoft.com/office/drawing/2010/main" xmlns="" w="9525">
+                  <a14:hiddenLine xmlns="" xmlns:a14="http://schemas.microsoft.com/office/drawing/2010/main" w="9525">
                     <a:solidFill>
                       <a:srgbClr val="000000"/>
                     </a:solidFill>
@@ -14262,7 +14262,7 @@
               </a:ln>
               <a:extLst>
                 <a:ext uri="{91240B29-F687-4f45-9708-019B960494DF}">
-                  <a14:hiddenLine xmlns:a14="http://schemas.microsoft.com/office/drawing/2010/main" xmlns="" w="9525">
+                  <a14:hiddenLine xmlns="" xmlns:a14="http://schemas.microsoft.com/office/drawing/2010/main" w="9525">
                     <a:solidFill>
                       <a:srgbClr val="000000"/>
                     </a:solidFill>
@@ -14352,7 +14352,7 @@
               </a:ln>
               <a:extLst>
                 <a:ext uri="{91240B29-F687-4f45-9708-019B960494DF}">
-                  <a14:hiddenLine xmlns:a14="http://schemas.microsoft.com/office/drawing/2010/main" xmlns="" w="9525">
+                  <a14:hiddenLine xmlns="" xmlns:a14="http://schemas.microsoft.com/office/drawing/2010/main" w="9525">
                     <a:solidFill>
                       <a:srgbClr val="000000"/>
                     </a:solidFill>
@@ -14414,7 +14414,7 @@
               </a:ln>
               <a:extLst>
                 <a:ext uri="{91240B29-F687-4f45-9708-019B960494DF}">
-                  <a14:hiddenLine xmlns:a14="http://schemas.microsoft.com/office/drawing/2010/main" xmlns="" w="9525">
+                  <a14:hiddenLine xmlns="" xmlns:a14="http://schemas.microsoft.com/office/drawing/2010/main" w="9525">
                     <a:solidFill>
                       <a:srgbClr val="000000"/>
                     </a:solidFill>
@@ -14504,7 +14504,7 @@
               </a:ln>
               <a:extLst>
                 <a:ext uri="{91240B29-F687-4f45-9708-019B960494DF}">
-                  <a14:hiddenLine xmlns:a14="http://schemas.microsoft.com/office/drawing/2010/main" xmlns="" w="9525">
+                  <a14:hiddenLine xmlns="" xmlns:a14="http://schemas.microsoft.com/office/drawing/2010/main" w="9525">
                     <a:solidFill>
                       <a:srgbClr val="000000"/>
                     </a:solidFill>
@@ -14566,7 +14566,7 @@
               </a:ln>
               <a:extLst>
                 <a:ext uri="{91240B29-F687-4f45-9708-019B960494DF}">
-                  <a14:hiddenLine xmlns:a14="http://schemas.microsoft.com/office/drawing/2010/main" xmlns="" w="9525">
+                  <a14:hiddenLine xmlns="" xmlns:a14="http://schemas.microsoft.com/office/drawing/2010/main" w="9525">
                     <a:solidFill>
                       <a:srgbClr val="000000"/>
                     </a:solidFill>
@@ -14628,7 +14628,7 @@
               </a:ln>
               <a:extLst>
                 <a:ext uri="{91240B29-F687-4f45-9708-019B960494DF}">
-                  <a14:hiddenLine xmlns:a14="http://schemas.microsoft.com/office/drawing/2010/main" xmlns="" w="9525">
+                  <a14:hiddenLine xmlns="" xmlns:a14="http://schemas.microsoft.com/office/drawing/2010/main" w="9525">
                     <a:solidFill>
                       <a:srgbClr val="000000"/>
                     </a:solidFill>
@@ -14718,7 +14718,7 @@
               </a:ln>
               <a:extLst>
                 <a:ext uri="{91240B29-F687-4f45-9708-019B960494DF}">
-                  <a14:hiddenLine xmlns:a14="http://schemas.microsoft.com/office/drawing/2010/main" xmlns="" w="9525">
+                  <a14:hiddenLine xmlns="" xmlns:a14="http://schemas.microsoft.com/office/drawing/2010/main" w="9525">
                     <a:solidFill>
                       <a:srgbClr val="000000"/>
                     </a:solidFill>
@@ -14808,7 +14808,7 @@
               </a:ln>
               <a:extLst>
                 <a:ext uri="{91240B29-F687-4f45-9708-019B960494DF}">
-                  <a14:hiddenLine xmlns:a14="http://schemas.microsoft.com/office/drawing/2010/main" xmlns="" w="9525">
+                  <a14:hiddenLine xmlns="" xmlns:a14="http://schemas.microsoft.com/office/drawing/2010/main" w="9525">
                     <a:solidFill>
                       <a:srgbClr val="000000"/>
                     </a:solidFill>
@@ -14870,7 +14870,7 @@
               </a:ln>
               <a:extLst>
                 <a:ext uri="{91240B29-F687-4f45-9708-019B960494DF}">
-                  <a14:hiddenLine xmlns:a14="http://schemas.microsoft.com/office/drawing/2010/main" xmlns="" w="9525">
+                  <a14:hiddenLine xmlns="" xmlns:a14="http://schemas.microsoft.com/office/drawing/2010/main" w="9525">
                     <a:solidFill>
                       <a:srgbClr val="000000"/>
                     </a:solidFill>
@@ -14980,7 +14980,7 @@
               </a:ln>
               <a:extLst>
                 <a:ext uri="{91240B29-F687-4f45-9708-019B960494DF}">
-                  <a14:hiddenLine xmlns:a14="http://schemas.microsoft.com/office/drawing/2010/main" xmlns="" w="9525">
+                  <a14:hiddenLine xmlns="" xmlns:a14="http://schemas.microsoft.com/office/drawing/2010/main" w="9525">
                     <a:solidFill>
                       <a:srgbClr val="000000"/>
                     </a:solidFill>
@@ -15064,7 +15064,7 @@
               </a:ln>
               <a:extLst>
                 <a:ext uri="{91240B29-F687-4f45-9708-019B960494DF}">
-                  <a14:hiddenLine xmlns:a14="http://schemas.microsoft.com/office/drawing/2010/main" xmlns="" w="9525">
+                  <a14:hiddenLine xmlns="" xmlns:a14="http://schemas.microsoft.com/office/drawing/2010/main" w="9525">
                     <a:solidFill>
                       <a:srgbClr val="000000"/>
                     </a:solidFill>
@@ -15126,7 +15126,7 @@
               </a:ln>
               <a:extLst>
                 <a:ext uri="{91240B29-F687-4f45-9708-019B960494DF}">
-                  <a14:hiddenLine xmlns:a14="http://schemas.microsoft.com/office/drawing/2010/main" xmlns="" w="9525">
+                  <a14:hiddenLine xmlns="" xmlns:a14="http://schemas.microsoft.com/office/drawing/2010/main" w="9525">
                     <a:solidFill>
                       <a:srgbClr val="000000"/>
                     </a:solidFill>
@@ -15188,7 +15188,7 @@
               </a:ln>
               <a:extLst>
                 <a:ext uri="{91240B29-F687-4f45-9708-019B960494DF}">
-                  <a14:hiddenLine xmlns:a14="http://schemas.microsoft.com/office/drawing/2010/main" xmlns="" w="9525">
+                  <a14:hiddenLine xmlns="" xmlns:a14="http://schemas.microsoft.com/office/drawing/2010/main" w="9525">
                     <a:solidFill>
                       <a:srgbClr val="000000"/>
                     </a:solidFill>
@@ -15278,7 +15278,7 @@
               </a:ln>
               <a:extLst>
                 <a:ext uri="{91240B29-F687-4f45-9708-019B960494DF}">
-                  <a14:hiddenLine xmlns:a14="http://schemas.microsoft.com/office/drawing/2010/main" xmlns="" w="9525">
+                  <a14:hiddenLine xmlns="" xmlns:a14="http://schemas.microsoft.com/office/drawing/2010/main" w="9525">
                     <a:solidFill>
                       <a:srgbClr val="000000"/>
                     </a:solidFill>
@@ -15312,7 +15312,7 @@
               </a:ln>
               <a:extLst>
                 <a:ext uri="{91240B29-F687-4f45-9708-019B960494DF}">
-                  <a14:hiddenLine xmlns:a14="http://schemas.microsoft.com/office/drawing/2010/main" xmlns="" w="9525">
+                  <a14:hiddenLine xmlns="" xmlns:a14="http://schemas.microsoft.com/office/drawing/2010/main" w="9525">
                     <a:solidFill>
                       <a:srgbClr val="000000"/>
                     </a:solidFill>
@@ -15377,7 +15377,7 @@
               </a:ln>
               <a:extLst>
                 <a:ext uri="{91240B29-F687-4f45-9708-019B960494DF}">
-                  <a14:hiddenLine xmlns:a14="http://schemas.microsoft.com/office/drawing/2010/main" xmlns="" w="9525">
+                  <a14:hiddenLine xmlns="" xmlns:a14="http://schemas.microsoft.com/office/drawing/2010/main" w="9525">
                     <a:solidFill>
                       <a:srgbClr val="000000"/>
                     </a:solidFill>
@@ -15467,7 +15467,7 @@
               </a:ln>
               <a:extLst>
                 <a:ext uri="{91240B29-F687-4f45-9708-019B960494DF}">
-                  <a14:hiddenLine xmlns:a14="http://schemas.microsoft.com/office/drawing/2010/main" xmlns="" w="9525">
+                  <a14:hiddenLine xmlns="" xmlns:a14="http://schemas.microsoft.com/office/drawing/2010/main" w="9525">
                     <a:solidFill>
                       <a:srgbClr val="000000"/>
                     </a:solidFill>
@@ -15529,7 +15529,7 @@
               </a:ln>
               <a:extLst>
                 <a:ext uri="{91240B29-F687-4f45-9708-019B960494DF}">
-                  <a14:hiddenLine xmlns:a14="http://schemas.microsoft.com/office/drawing/2010/main" xmlns="" w="9525">
+                  <a14:hiddenLine xmlns="" xmlns:a14="http://schemas.microsoft.com/office/drawing/2010/main" w="9525">
                     <a:solidFill>
                       <a:srgbClr val="000000"/>
                     </a:solidFill>
@@ -15619,7 +15619,7 @@
               </a:ln>
               <a:extLst>
                 <a:ext uri="{91240B29-F687-4f45-9708-019B960494DF}">
-                  <a14:hiddenLine xmlns:a14="http://schemas.microsoft.com/office/drawing/2010/main" xmlns="" w="9525">
+                  <a14:hiddenLine xmlns="" xmlns:a14="http://schemas.microsoft.com/office/drawing/2010/main" w="9525">
                     <a:solidFill>
                       <a:srgbClr val="000000"/>
                     </a:solidFill>
@@ -15684,7 +15684,7 @@
               </a:ln>
               <a:extLst>
                 <a:ext uri="{91240B29-F687-4f45-9708-019B960494DF}">
-                  <a14:hiddenLine xmlns:a14="http://schemas.microsoft.com/office/drawing/2010/main" xmlns="" w="9525">
+                  <a14:hiddenLine xmlns="" xmlns:a14="http://schemas.microsoft.com/office/drawing/2010/main" w="9525">
                     <a:solidFill>
                       <a:srgbClr val="000000"/>
                     </a:solidFill>
@@ -15746,7 +15746,7 @@
               </a:ln>
               <a:extLst>
                 <a:ext uri="{91240B29-F687-4f45-9708-019B960494DF}">
-                  <a14:hiddenLine xmlns:a14="http://schemas.microsoft.com/office/drawing/2010/main" xmlns="" w="9525">
+                  <a14:hiddenLine xmlns="" xmlns:a14="http://schemas.microsoft.com/office/drawing/2010/main" w="9525">
                     <a:solidFill>
                       <a:srgbClr val="000000"/>
                     </a:solidFill>
@@ -15836,7 +15836,7 @@
               </a:ln>
               <a:extLst>
                 <a:ext uri="{91240B29-F687-4f45-9708-019B960494DF}">
-                  <a14:hiddenLine xmlns:a14="http://schemas.microsoft.com/office/drawing/2010/main" xmlns="" w="9525">
+                  <a14:hiddenLine xmlns="" xmlns:a14="http://schemas.microsoft.com/office/drawing/2010/main" w="9525">
                     <a:solidFill>
                       <a:srgbClr val="000000"/>
                     </a:solidFill>
@@ -15926,7 +15926,7 @@
               </a:ln>
               <a:extLst>
                 <a:ext uri="{91240B29-F687-4f45-9708-019B960494DF}">
-                  <a14:hiddenLine xmlns:a14="http://schemas.microsoft.com/office/drawing/2010/main" xmlns="" w="9525">
+                  <a14:hiddenLine xmlns="" xmlns:a14="http://schemas.microsoft.com/office/drawing/2010/main" w="9525">
                     <a:solidFill>
                       <a:srgbClr val="000000"/>
                     </a:solidFill>
@@ -15991,7 +15991,7 @@
               </a:ln>
               <a:extLst>
                 <a:ext uri="{91240B29-F687-4f45-9708-019B960494DF}">
-                  <a14:hiddenLine xmlns:a14="http://schemas.microsoft.com/office/drawing/2010/main" xmlns="" w="9525">
+                  <a14:hiddenLine xmlns="" xmlns:a14="http://schemas.microsoft.com/office/drawing/2010/main" w="9525">
                     <a:solidFill>
                       <a:srgbClr val="000000"/>
                     </a:solidFill>
@@ -16111,7 +16111,7 @@
               </a:ln>
               <a:extLst>
                 <a:ext uri="{91240B29-F687-4f45-9708-019B960494DF}">
-                  <a14:hiddenLine xmlns:a14="http://schemas.microsoft.com/office/drawing/2010/main" xmlns="" w="9525">
+                  <a14:hiddenLine xmlns="" xmlns:a14="http://schemas.microsoft.com/office/drawing/2010/main" w="9525">
                     <a:solidFill>
                       <a:srgbClr val="000000"/>
                     </a:solidFill>
@@ -16209,7 +16209,7 @@
               </a:ln>
               <a:extLst>
                 <a:ext uri="{91240B29-F687-4f45-9708-019B960494DF}">
-                  <a14:hiddenLine xmlns:a14="http://schemas.microsoft.com/office/drawing/2010/main" xmlns="" w="9525">
+                  <a14:hiddenLine xmlns="" xmlns:a14="http://schemas.microsoft.com/office/drawing/2010/main" w="9525">
                     <a:solidFill>
                       <a:srgbClr val="000000"/>
                     </a:solidFill>
@@ -16324,7 +16324,7 @@
               </a:ln>
               <a:extLst>
                 <a:ext uri="{91240B29-F687-4f45-9708-019B960494DF}">
-                  <a14:hiddenLine xmlns:a14="http://schemas.microsoft.com/office/drawing/2010/main" xmlns="" w="9525">
+                  <a14:hiddenLine xmlns="" xmlns:a14="http://schemas.microsoft.com/office/drawing/2010/main" w="9525">
                     <a:solidFill>
                       <a:srgbClr val="000000"/>
                     </a:solidFill>
@@ -16414,7 +16414,7 @@
               </a:ln>
               <a:extLst>
                 <a:ext uri="{91240B29-F687-4f45-9708-019B960494DF}">
-                  <a14:hiddenLine xmlns:a14="http://schemas.microsoft.com/office/drawing/2010/main" xmlns="" w="9525">
+                  <a14:hiddenLine xmlns="" xmlns:a14="http://schemas.microsoft.com/office/drawing/2010/main" w="9525">
                     <a:solidFill>
                       <a:srgbClr val="000000"/>
                     </a:solidFill>
@@ -16479,7 +16479,7 @@
               </a:ln>
               <a:extLst>
                 <a:ext uri="{91240B29-F687-4f45-9708-019B960494DF}">
-                  <a14:hiddenLine xmlns:a14="http://schemas.microsoft.com/office/drawing/2010/main" xmlns="" w="9525">
+                  <a14:hiddenLine xmlns="" xmlns:a14="http://schemas.microsoft.com/office/drawing/2010/main" w="9525">
                     <a:solidFill>
                       <a:srgbClr val="000000"/>
                     </a:solidFill>
@@ -16569,7 +16569,7 @@
               </a:ln>
               <a:extLst>
                 <a:ext uri="{91240B29-F687-4f45-9708-019B960494DF}">
-                  <a14:hiddenLine xmlns:a14="http://schemas.microsoft.com/office/drawing/2010/main" xmlns="" w="9525">
+                  <a14:hiddenLine xmlns="" xmlns:a14="http://schemas.microsoft.com/office/drawing/2010/main" w="9525">
                     <a:solidFill>
                       <a:srgbClr val="000000"/>
                     </a:solidFill>
@@ -16637,7 +16637,7 @@
               </a:ln>
               <a:extLst>
                 <a:ext uri="{91240B29-F687-4f45-9708-019B960494DF}">
-                  <a14:hiddenLine xmlns:a14="http://schemas.microsoft.com/office/drawing/2010/main" xmlns="" w="9525">
+                  <a14:hiddenLine xmlns="" xmlns:a14="http://schemas.microsoft.com/office/drawing/2010/main" w="9525">
                     <a:solidFill>
                       <a:srgbClr val="000000"/>
                     </a:solidFill>
@@ -16727,7 +16727,7 @@
               </a:ln>
               <a:extLst>
                 <a:ext uri="{91240B29-F687-4f45-9708-019B960494DF}">
-                  <a14:hiddenLine xmlns:a14="http://schemas.microsoft.com/office/drawing/2010/main" xmlns="" w="9525">
+                  <a14:hiddenLine xmlns="" xmlns:a14="http://schemas.microsoft.com/office/drawing/2010/main" w="9525">
                     <a:solidFill>
                       <a:srgbClr val="000000"/>
                     </a:solidFill>
@@ -16795,7 +16795,7 @@
               </a:ln>
               <a:extLst>
                 <a:ext uri="{91240B29-F687-4f45-9708-019B960494DF}">
-                  <a14:hiddenLine xmlns:a14="http://schemas.microsoft.com/office/drawing/2010/main" xmlns="" w="9525">
+                  <a14:hiddenLine xmlns="" xmlns:a14="http://schemas.microsoft.com/office/drawing/2010/main" w="9525">
                     <a:solidFill>
                       <a:srgbClr val="000000"/>
                     </a:solidFill>
@@ -16885,7 +16885,7 @@
               </a:ln>
               <a:extLst>
                 <a:ext uri="{91240B29-F687-4f45-9708-019B960494DF}">
-                  <a14:hiddenLine xmlns:a14="http://schemas.microsoft.com/office/drawing/2010/main" xmlns="" w="9525">
+                  <a14:hiddenLine xmlns="" xmlns:a14="http://schemas.microsoft.com/office/drawing/2010/main" w="9525">
                     <a:solidFill>
                       <a:srgbClr val="000000"/>
                     </a:solidFill>
@@ -16919,7 +16919,7 @@
               </a:ln>
               <a:extLst>
                 <a:ext uri="{91240B29-F687-4f45-9708-019B960494DF}">
-                  <a14:hiddenLine xmlns:a14="http://schemas.microsoft.com/office/drawing/2010/main" xmlns="" w="9525">
+                  <a14:hiddenLine xmlns="" xmlns:a14="http://schemas.microsoft.com/office/drawing/2010/main" w="9525">
                     <a:solidFill>
                       <a:srgbClr val="000000"/>
                     </a:solidFill>
@@ -17059,7 +17059,7 @@
           <a:p>
             <a:fld id="{7788B477-5DB7-41ED-AFC5-9BEA61AD1BC6}" type="datetime1">
               <a:rPr lang="en-IN" smtClean="0"/>
-              <a:t>13-02-2025</a:t>
+              <a:t>02-03-2025</a:t>
             </a:fld>
             <a:endParaRPr lang="en-IN"/>
           </a:p>
@@ -20602,7 +20602,39 @@
                   <a:srgbClr val="451717"/>
                 </a:solidFill>
               </a:rPr>
-              <a:t>Feb. 12, 2025].</a:t>
+              <a:t>Mar.</a:t>
+            </a:r>
+            <a:r>
+              <a:rPr lang="en-IN" sz="11200" dirty="0" smtClean="0">
+                <a:solidFill>
+                  <a:srgbClr val="451717"/>
+                </a:solidFill>
+              </a:rPr>
+              <a:t> </a:t>
+            </a:r>
+            <a:r>
+              <a:rPr lang="en-IN" sz="11200" dirty="0">
+                <a:solidFill>
+                  <a:srgbClr val="451717"/>
+                </a:solidFill>
+              </a:rPr>
+              <a:t>1</a:t>
+            </a:r>
+            <a:r>
+              <a:rPr lang="en-IN" sz="11200" dirty="0" smtClean="0">
+                <a:solidFill>
+                  <a:srgbClr val="451717"/>
+                </a:solidFill>
+              </a:rPr>
+              <a:t>, </a:t>
+            </a:r>
+            <a:r>
+              <a:rPr lang="en-IN" sz="11200" dirty="0" smtClean="0">
+                <a:solidFill>
+                  <a:srgbClr val="451717"/>
+                </a:solidFill>
+              </a:rPr>
+              <a:t>2025].</a:t>
             </a:r>
           </a:p>
           <a:p>
@@ -20703,7 +20735,7 @@
                   <a:srgbClr val="451717"/>
                 </a:solidFill>
               </a:rPr>
-              <a:t>[Accessed: Feb. </a:t>
+              <a:t>[</a:t>
             </a:r>
             <a:r>
               <a:rPr lang="en-IN" sz="11200" dirty="0" smtClean="0">
@@ -20711,7 +20743,7 @@
                   <a:srgbClr val="451717"/>
                 </a:solidFill>
               </a:rPr>
-              <a:t>12</a:t>
+              <a:t>Accessed: </a:t>
             </a:r>
             <a:r>
               <a:rPr lang="en-IN" sz="11200" dirty="0">
@@ -20719,7 +20751,7 @@
                   <a:srgbClr val="451717"/>
                 </a:solidFill>
               </a:rPr>
-              <a:t>, 2025</a:t>
+              <a:t>Mar. 1, 2025</a:t>
             </a:r>
             <a:r>
               <a:rPr lang="en-IN" sz="11200" dirty="0" smtClean="0">
@@ -20804,7 +20836,15 @@
                   <a:srgbClr val="451717"/>
                 </a:solidFill>
               </a:rPr>
-              <a:t>[Accessed: Feb. </a:t>
+              <a:t>[Accessed: </a:t>
+            </a:r>
+            <a:r>
+              <a:rPr lang="en-IN" sz="11200" dirty="0">
+                <a:solidFill>
+                  <a:srgbClr val="451717"/>
+                </a:solidFill>
+              </a:rPr>
+              <a:t>Mar. 1, 2025</a:t>
             </a:r>
             <a:r>
               <a:rPr lang="en-IN" sz="11200" dirty="0" smtClean="0">
@@ -20812,7 +20852,36 @@
                   <a:srgbClr val="451717"/>
                 </a:solidFill>
               </a:rPr>
-              <a:t>12</a:t>
+              <a:t>].</a:t>
+            </a:r>
+          </a:p>
+          <a:p>
+            <a:pPr marL="0" indent="0">
+              <a:buNone/>
+            </a:pPr>
+            <a:r>
+              <a:rPr lang="en-IN" sz="11200" dirty="0" smtClean="0">
+                <a:solidFill>
+                  <a:srgbClr val="451717"/>
+                </a:solidFill>
+              </a:rPr>
+              <a:t>[4] </a:t>
+            </a:r>
+            <a:r>
+              <a:rPr lang="en-IN" sz="11200" b="1" dirty="0" smtClean="0">
+                <a:solidFill>
+                  <a:srgbClr val="451717"/>
+                </a:solidFill>
+              </a:rPr>
+              <a:t>top-11-computer-vision-applications-in-healthcare Image</a:t>
+            </a:r>
+            <a:r>
+              <a:rPr lang="en-IN" sz="11200" dirty="0" smtClean="0">
+                <a:solidFill>
+                  <a:srgbClr val="451717"/>
+                </a:solidFill>
+              </a:rPr>
+              <a:t>, Plugger.AI</a:t>
             </a:r>
             <a:r>
               <a:rPr lang="en-IN" sz="11200" dirty="0">
@@ -20820,100 +20889,47 @@
                   <a:srgbClr val="451717"/>
                 </a:solidFill>
               </a:rPr>
-              <a:t>, 2025</a:t>
+              <a:t>, [Available at: </a:t>
+            </a:r>
+            <a:r>
+              <a:rPr lang="en-IN" sz="11200" dirty="0">
+                <a:solidFill>
+                  <a:srgbClr val="0000FF"/>
+                </a:solidFill>
+              </a:rPr>
+              <a:t>https://</a:t>
             </a:r>
             <a:r>
               <a:rPr lang="en-IN" sz="11200" dirty="0" smtClean="0">
                 <a:solidFill>
+                  <a:srgbClr val="0000FF"/>
+                </a:solidFill>
+              </a:rPr>
+              <a:t>www.plugger.ai/blog/top-11-computer-vision-applications-in-healthcare</a:t>
+            </a:r>
+            <a:r>
+              <a:rPr lang="en-IN" sz="11200" dirty="0" smtClean="0">
+                <a:solidFill>
                   <a:srgbClr val="451717"/>
                 </a:solidFill>
               </a:rPr>
-              <a:t>].</a:t>
-            </a:r>
-          </a:p>
-          <a:p>
-            <a:pPr marL="0" indent="0">
-              <a:buNone/>
-            </a:pPr>
-            <a:r>
-              <a:rPr lang="en-IN" sz="11200" dirty="0" smtClean="0">
+              <a:t>], </a:t>
+            </a:r>
+            <a:r>
+              <a:rPr lang="en-IN" sz="11200" dirty="0">
                 <a:solidFill>
                   <a:srgbClr val="451717"/>
                 </a:solidFill>
               </a:rPr>
-              <a:t>[4] </a:t>
-            </a:r>
-            <a:r>
-              <a:rPr lang="en-IN" sz="11200" b="1" dirty="0" smtClean="0">
+              <a:t>[Accessed: </a:t>
+            </a:r>
+            <a:r>
+              <a:rPr lang="en-IN" sz="11200" dirty="0">
                 <a:solidFill>
                   <a:srgbClr val="451717"/>
                 </a:solidFill>
               </a:rPr>
-              <a:t>top-11-computer-vision-applications-in-healthcare Image</a:t>
-            </a:r>
-            <a:r>
-              <a:rPr lang="en-IN" sz="11200" dirty="0" smtClean="0">
-                <a:solidFill>
-                  <a:srgbClr val="451717"/>
-                </a:solidFill>
-              </a:rPr>
-              <a:t>, Plugger.AI</a:t>
-            </a:r>
-            <a:r>
-              <a:rPr lang="en-IN" sz="11200" dirty="0">
-                <a:solidFill>
-                  <a:srgbClr val="451717"/>
-                </a:solidFill>
-              </a:rPr>
-              <a:t>, [Available at: </a:t>
-            </a:r>
-            <a:r>
-              <a:rPr lang="en-IN" sz="11200" dirty="0">
-                <a:solidFill>
-                  <a:srgbClr val="0000FF"/>
-                </a:solidFill>
-              </a:rPr>
-              <a:t>https://</a:t>
-            </a:r>
-            <a:r>
-              <a:rPr lang="en-IN" sz="11200" dirty="0" smtClean="0">
-                <a:solidFill>
-                  <a:srgbClr val="0000FF"/>
-                </a:solidFill>
-              </a:rPr>
-              <a:t>www.plugger.ai/blog/top-11-computer-vision-applications-in-healthcare</a:t>
-            </a:r>
-            <a:r>
-              <a:rPr lang="en-IN" sz="11200" dirty="0" smtClean="0">
-                <a:solidFill>
-                  <a:srgbClr val="451717"/>
-                </a:solidFill>
-              </a:rPr>
-              <a:t>], </a:t>
-            </a:r>
-            <a:r>
-              <a:rPr lang="en-IN" sz="11200" dirty="0">
-                <a:solidFill>
-                  <a:srgbClr val="451717"/>
-                </a:solidFill>
-              </a:rPr>
-              <a:t>[Accessed: Feb. </a:t>
-            </a:r>
-            <a:r>
-              <a:rPr lang="en-IN" sz="11200" dirty="0" smtClean="0">
-                <a:solidFill>
-                  <a:srgbClr val="451717"/>
-                </a:solidFill>
-              </a:rPr>
-              <a:t>13, </a:t>
-            </a:r>
-            <a:r>
-              <a:rPr lang="en-IN" sz="11200" dirty="0">
-                <a:solidFill>
-                  <a:srgbClr val="451717"/>
-                </a:solidFill>
-              </a:rPr>
-              <a:t>2025</a:t>
+              <a:t>Mar. 1, 2025</a:t>
             </a:r>
             <a:r>
               <a:rPr lang="en-IN" sz="11200" dirty="0" smtClean="0">
@@ -21140,23 +21156,164 @@
                   <a:srgbClr val="451717"/>
                 </a:solidFill>
               </a:rPr>
-              <a:t>becominghuman.AI</a:t>
+              <a:t>becominghuman.AI, [Available at: </a:t>
+            </a:r>
+            <a:r>
+              <a:rPr lang="en-IN" sz="11200" dirty="0">
+                <a:solidFill>
+                  <a:srgbClr val="0000FF"/>
+                </a:solidFill>
+              </a:rPr>
+              <a:t>https://</a:t>
             </a:r>
             <a:r>
               <a:rPr lang="en-IN" sz="11200" dirty="0" smtClean="0">
                 <a:solidFill>
+                  <a:srgbClr val="0000FF"/>
+                </a:solidFill>
+              </a:rPr>
+              <a:t>becominghuman.ai/computer-vision-applications-in-self-driving-cars-610561e14118</a:t>
+            </a:r>
+            <a:r>
+              <a:rPr lang="en-IN" sz="11200" dirty="0" smtClean="0">
+                <a:solidFill>
                   <a:srgbClr val="451717"/>
                 </a:solidFill>
               </a:rPr>
-              <a:t>, [Available at: </a:t>
+              <a:t>], </a:t>
             </a:r>
             <a:r>
               <a:rPr lang="en-IN" sz="11200" dirty="0">
                 <a:solidFill>
+                  <a:srgbClr val="451717"/>
+                </a:solidFill>
+              </a:rPr>
+              <a:t>[Accessed: </a:t>
+            </a:r>
+            <a:r>
+              <a:rPr lang="en-IN" sz="11200" dirty="0">
+                <a:solidFill>
+                  <a:srgbClr val="451717"/>
+                </a:solidFill>
+              </a:rPr>
+              <a:t>Mar. 1, 2025</a:t>
+            </a:r>
+            <a:r>
+              <a:rPr lang="en-IN" sz="11200" dirty="0">
+                <a:solidFill>
+                  <a:srgbClr val="451717"/>
+                </a:solidFill>
+              </a:rPr>
+              <a:t>].</a:t>
+            </a:r>
+          </a:p>
+          <a:p>
+            <a:pPr marL="0" indent="0">
+              <a:buNone/>
+            </a:pPr>
+            <a:r>
+              <a:rPr lang="en-IN" sz="11200" dirty="0">
+                <a:solidFill>
+                  <a:srgbClr val="451717"/>
+                </a:solidFill>
+              </a:rPr>
+              <a:t>[6] </a:t>
+            </a:r>
+            <a:r>
+              <a:rPr lang="en-IN" sz="11200" b="1" dirty="0">
+                <a:solidFill>
+                  <a:srgbClr val="451717"/>
+                </a:solidFill>
+              </a:rPr>
+              <a:t>Harry </a:t>
+            </a:r>
+            <a:r>
+              <a:rPr lang="en-IN" sz="11200" b="1" dirty="0" err="1" smtClean="0">
+                <a:solidFill>
+                  <a:srgbClr val="451717"/>
+                </a:solidFill>
+              </a:rPr>
+              <a:t>Thapa</a:t>
+            </a:r>
+            <a:r>
+              <a:rPr lang="en-IN" sz="11200" b="1" dirty="0" smtClean="0">
+                <a:solidFill>
+                  <a:srgbClr val="451717"/>
+                </a:solidFill>
+              </a:rPr>
+              <a:t>, </a:t>
+            </a:r>
+            <a:r>
+              <a:rPr lang="en-IN" sz="11200" b="1" dirty="0" err="1" smtClean="0">
+                <a:solidFill>
+                  <a:srgbClr val="451717"/>
+                </a:solidFill>
+              </a:rPr>
+              <a:t>ai</a:t>
+            </a:r>
+            <a:r>
+              <a:rPr lang="en-IN" sz="11200" b="1" dirty="0" smtClean="0">
+                <a:solidFill>
+                  <a:srgbClr val="451717"/>
+                </a:solidFill>
+              </a:rPr>
+              <a:t>-machine-learning-facial-recognition </a:t>
+            </a:r>
+            <a:r>
+              <a:rPr lang="en-IN" sz="11200" b="1" dirty="0">
+                <a:solidFill>
+                  <a:srgbClr val="451717"/>
+                </a:solidFill>
+              </a:rPr>
+              <a:t>Image,</a:t>
+            </a:r>
+            <a:r>
+              <a:rPr lang="en-IN" sz="11200" dirty="0">
+                <a:solidFill>
+                  <a:srgbClr val="451717"/>
+                </a:solidFill>
+              </a:rPr>
+              <a:t> </a:t>
+            </a:r>
+            <a:r>
+              <a:rPr lang="en-IN" sz="11200" dirty="0" err="1" smtClean="0">
+                <a:solidFill>
+                  <a:srgbClr val="451717"/>
+                </a:solidFill>
+              </a:rPr>
+              <a:t>Linkedin</a:t>
+            </a:r>
+            <a:r>
+              <a:rPr lang="en-IN" sz="11200" b="1" dirty="0">
+                <a:solidFill>
+                  <a:srgbClr val="451717"/>
+                </a:solidFill>
+              </a:rPr>
+              <a:t>, </a:t>
+            </a:r>
+            <a:r>
+              <a:rPr lang="en-IN" sz="11200" dirty="0" smtClean="0">
+                <a:solidFill>
+                  <a:srgbClr val="451717"/>
+                </a:solidFill>
+              </a:rPr>
+              <a:t>[Available at: </a:t>
+            </a:r>
+            <a:r>
+              <a:rPr lang="en-IN" sz="11200" dirty="0" smtClean="0">
+                <a:solidFill>
                   <a:srgbClr val="0000FF"/>
                 </a:solidFill>
               </a:rPr>
-              <a:t>https://</a:t>
+              <a:t>https</a:t>
+            </a:r>
+            <a:r>
+              <a:rPr lang="en-IN" sz="11200" dirty="0">
+                <a:solidFill>
+                  <a:srgbClr val="0000FF"/>
+                </a:solidFill>
+              </a:rPr>
+              <a:t>://</a:t>
             </a:r>
             <a:r>
               <a:rPr lang="en-IN" sz="11200" dirty="0" smtClean="0">
@@ -21164,7 +21321,7 @@
                   <a:srgbClr val="0000FF"/>
                 </a:solidFill>
               </a:rPr>
-              <a:t>becominghuman.ai/computer-vision-applications-in-self-driving-cars-610561e14118</a:t>
+              <a:t>www.linkedin.com/pulse/ai-machine-learning-facial-recognition-opencv-hemant-thapa</a:t>
             </a:r>
             <a:r>
               <a:rPr lang="en-IN" sz="11200" dirty="0" smtClean="0">
@@ -21172,7 +21329,15 @@
                   <a:srgbClr val="451717"/>
                 </a:solidFill>
               </a:rPr>
-              <a:t>], </a:t>
+              <a:t>]</a:t>
+            </a:r>
+            <a:r>
+              <a:rPr lang="en-IN" sz="11200" b="1" dirty="0" smtClean="0">
+                <a:solidFill>
+                  <a:srgbClr val="451717"/>
+                </a:solidFill>
+              </a:rPr>
+              <a:t>, </a:t>
             </a:r>
             <a:r>
               <a:rPr lang="en-IN" sz="11200" dirty="0">
@@ -21180,148 +21345,31 @@
                   <a:srgbClr val="451717"/>
                 </a:solidFill>
               </a:rPr>
-              <a:t>[Accessed: Feb. 13, 2025].</a:t>
-            </a:r>
-          </a:p>
-          <a:p>
-            <a:pPr marL="0" indent="0">
-              <a:buNone/>
-            </a:pPr>
+              <a:t>[Accessed: </a:t>
+            </a:r>
             <a:r>
               <a:rPr lang="en-IN" sz="11200" dirty="0">
                 <a:solidFill>
                   <a:srgbClr val="451717"/>
                 </a:solidFill>
               </a:rPr>
-              <a:t>[6] </a:t>
-            </a:r>
-            <a:r>
-              <a:rPr lang="en-IN" sz="11200" b="1" dirty="0">
+              <a:t>Mar. </a:t>
+            </a:r>
+            <a:r>
+              <a:rPr lang="en-IN" sz="11200" dirty="0" smtClean="0">
                 <a:solidFill>
                   <a:srgbClr val="451717"/>
                 </a:solidFill>
               </a:rPr>
-              <a:t>Harry </a:t>
-            </a:r>
-            <a:r>
-              <a:rPr lang="en-IN" sz="11200" b="1" dirty="0" err="1" smtClean="0">
+              <a:t>2, </a:t>
+            </a:r>
+            <a:r>
+              <a:rPr lang="en-IN" sz="11200" dirty="0">
                 <a:solidFill>
                   <a:srgbClr val="451717"/>
                 </a:solidFill>
               </a:rPr>
-              <a:t>Thapa</a:t>
-            </a:r>
-            <a:r>
-              <a:rPr lang="en-IN" sz="11200" b="1" dirty="0" smtClean="0">
-                <a:solidFill>
-                  <a:srgbClr val="451717"/>
-                </a:solidFill>
-              </a:rPr>
-              <a:t>, </a:t>
-            </a:r>
-            <a:r>
-              <a:rPr lang="en-IN" sz="11200" b="1" dirty="0" err="1" smtClean="0">
-                <a:solidFill>
-                  <a:srgbClr val="451717"/>
-                </a:solidFill>
-              </a:rPr>
-              <a:t>ai</a:t>
-            </a:r>
-            <a:r>
-              <a:rPr lang="en-IN" sz="11200" b="1" dirty="0" smtClean="0">
-                <a:solidFill>
-                  <a:srgbClr val="451717"/>
-                </a:solidFill>
-              </a:rPr>
-              <a:t>-machine-learning-facial-recognition </a:t>
-            </a:r>
-            <a:r>
-              <a:rPr lang="en-IN" sz="11200" b="1" dirty="0">
-                <a:solidFill>
-                  <a:srgbClr val="451717"/>
-                </a:solidFill>
-              </a:rPr>
-              <a:t>Image,</a:t>
-            </a:r>
-            <a:r>
-              <a:rPr lang="en-IN" sz="11200" dirty="0">
-                <a:solidFill>
-                  <a:srgbClr val="451717"/>
-                </a:solidFill>
-              </a:rPr>
-              <a:t> </a:t>
-            </a:r>
-            <a:r>
-              <a:rPr lang="en-IN" sz="11200" smtClean="0">
-                <a:solidFill>
-                  <a:srgbClr val="451717"/>
-                </a:solidFill>
-              </a:rPr>
-              <a:t>Linkedin</a:t>
-            </a:r>
-            <a:r>
-              <a:rPr lang="en-IN" sz="11200" b="1" dirty="0">
-                <a:solidFill>
-                  <a:srgbClr val="451717"/>
-                </a:solidFill>
-              </a:rPr>
-              <a:t>, </a:t>
-            </a:r>
-            <a:r>
-              <a:rPr lang="en-IN" sz="11200" dirty="0" smtClean="0">
-                <a:solidFill>
-                  <a:srgbClr val="451717"/>
-                </a:solidFill>
-              </a:rPr>
-              <a:t>[Available at: </a:t>
-            </a:r>
-            <a:r>
-              <a:rPr lang="en-IN" sz="11200" dirty="0" smtClean="0">
-                <a:solidFill>
-                  <a:srgbClr val="0000FF"/>
-                </a:solidFill>
-              </a:rPr>
-              <a:t>https</a:t>
-            </a:r>
-            <a:r>
-              <a:rPr lang="en-IN" sz="11200" dirty="0">
-                <a:solidFill>
-                  <a:srgbClr val="0000FF"/>
-                </a:solidFill>
-              </a:rPr>
-              <a:t>://</a:t>
-            </a:r>
-            <a:r>
-              <a:rPr lang="en-IN" sz="11200" dirty="0" smtClean="0">
-                <a:solidFill>
-                  <a:srgbClr val="0000FF"/>
-                </a:solidFill>
-              </a:rPr>
-              <a:t>www.linkedin.com/pulse/ai-machine-learning-facial-recognition-opencv-hemant-thapa</a:t>
-            </a:r>
-            <a:r>
-              <a:rPr lang="en-IN" sz="11200" dirty="0" smtClean="0">
-                <a:solidFill>
-                  <a:srgbClr val="451717"/>
-                </a:solidFill>
-              </a:rPr>
-              <a:t>]</a:t>
-            </a:r>
-            <a:r>
-              <a:rPr lang="en-IN" sz="11200" b="1" dirty="0" smtClean="0">
-                <a:solidFill>
-                  <a:srgbClr val="451717"/>
-                </a:solidFill>
-              </a:rPr>
-              <a:t>, </a:t>
-            </a:r>
-            <a:r>
-              <a:rPr lang="en-IN" sz="11200" dirty="0">
-                <a:solidFill>
-                  <a:srgbClr val="451717"/>
-                </a:solidFill>
-              </a:rPr>
-              <a:t>[Accessed: Feb. 13, 2025</a:t>
+              <a:t>2025</a:t>
             </a:r>
             <a:r>
               <a:rPr lang="en-IN" sz="11200" dirty="0" smtClean="0">
@@ -21427,7 +21475,15 @@
                   <a:srgbClr val="451717"/>
                 </a:solidFill>
               </a:rPr>
-              <a:t>[Accessed: Feb. </a:t>
+              <a:t>[Accessed: </a:t>
+            </a:r>
+            <a:r>
+              <a:rPr lang="en-IN" sz="11200" dirty="0">
+                <a:solidFill>
+                  <a:srgbClr val="451717"/>
+                </a:solidFill>
+              </a:rPr>
+              <a:t>Mar. </a:t>
             </a:r>
             <a:r>
               <a:rPr lang="en-IN" sz="11200" dirty="0" smtClean="0">
@@ -21435,7 +21491,7 @@
                   <a:srgbClr val="451717"/>
                 </a:solidFill>
               </a:rPr>
-              <a:t>13</a:t>
+              <a:t>2, </a:t>
             </a:r>
             <a:r>
               <a:rPr lang="en-IN" sz="11200" dirty="0">
@@ -21443,7 +21499,7 @@
                   <a:srgbClr val="451717"/>
                 </a:solidFill>
               </a:rPr>
-              <a:t>, 2025</a:t>
+              <a:t>2025</a:t>
             </a:r>
             <a:r>
               <a:rPr lang="en-IN" sz="11200" dirty="0" smtClean="0">
@@ -21541,7 +21597,39 @@
                   <a:srgbClr val="451717"/>
                 </a:solidFill>
               </a:rPr>
-              <a:t>[Accessed: Feb. 3, 2025].</a:t>
+              <a:t>[Accessed: </a:t>
+            </a:r>
+            <a:r>
+              <a:rPr lang="en-IN" sz="11200" dirty="0">
+                <a:solidFill>
+                  <a:srgbClr val="451717"/>
+                </a:solidFill>
+              </a:rPr>
+              <a:t>Mar. 2</a:t>
+            </a:r>
+            <a:r>
+              <a:rPr lang="en-IN" sz="11200" dirty="0" smtClean="0">
+                <a:solidFill>
+                  <a:srgbClr val="451717"/>
+                </a:solidFill>
+              </a:rPr>
+              <a:t>, </a:t>
+            </a:r>
+            <a:r>
+              <a:rPr lang="en-IN" sz="11200" dirty="0">
+                <a:solidFill>
+                  <a:srgbClr val="451717"/>
+                </a:solidFill>
+              </a:rPr>
+              <a:t>2025</a:t>
+            </a:r>
+            <a:r>
+              <a:rPr lang="en-IN" sz="11200" dirty="0">
+                <a:solidFill>
+                  <a:srgbClr val="451717"/>
+                </a:solidFill>
+              </a:rPr>
+              <a:t>].</a:t>
             </a:r>
           </a:p>
           <a:p>
@@ -21808,7 +21896,15 @@
                   <a:srgbClr val="451717"/>
                 </a:solidFill>
               </a:rPr>
-              <a:t>[Accessed: Feb. </a:t>
+              <a:t>[Accessed: </a:t>
+            </a:r>
+            <a:r>
+              <a:rPr lang="en-IN" sz="11200" dirty="0">
+                <a:solidFill>
+                  <a:srgbClr val="451717"/>
+                </a:solidFill>
+              </a:rPr>
+              <a:t>Mar. 2</a:t>
             </a:r>
             <a:r>
               <a:rPr lang="en-IN" sz="11200" dirty="0" smtClean="0">
@@ -21816,7 +21912,7 @@
                   <a:srgbClr val="451717"/>
                 </a:solidFill>
               </a:rPr>
-              <a:t>13</a:t>
+              <a:t> </a:t>
             </a:r>
             <a:r>
               <a:rPr lang="en-IN" sz="11200" dirty="0">
@@ -21824,7 +21920,15 @@
                   <a:srgbClr val="451717"/>
                 </a:solidFill>
               </a:rPr>
-              <a:t>, 2025].</a:t>
+              <a:t>, </a:t>
+            </a:r>
+            <a:r>
+              <a:rPr lang="en-IN" sz="11200" dirty="0">
+                <a:solidFill>
+                  <a:srgbClr val="451717"/>
+                </a:solidFill>
+              </a:rPr>
+              <a:t>2025].</a:t>
             </a:r>
           </a:p>
           <a:p>
@@ -21917,7 +22021,15 @@
                   <a:srgbClr val="451717"/>
                 </a:solidFill>
               </a:rPr>
-              <a:t>[Accessed: Feb. </a:t>
+              <a:t>[Accessed: </a:t>
+            </a:r>
+            <a:r>
+              <a:rPr lang="en-IN" sz="11200" dirty="0">
+                <a:solidFill>
+                  <a:srgbClr val="451717"/>
+                </a:solidFill>
+              </a:rPr>
+              <a:t>Mar. </a:t>
             </a:r>
             <a:r>
               <a:rPr lang="en-IN" sz="11200" dirty="0" smtClean="0">
@@ -21925,7 +22037,7 @@
                   <a:srgbClr val="451717"/>
                 </a:solidFill>
               </a:rPr>
-              <a:t>14</a:t>
+              <a:t>2, </a:t>
             </a:r>
             <a:r>
               <a:rPr lang="en-IN" sz="11200" dirty="0">
@@ -21933,7 +22045,15 @@
                   <a:srgbClr val="451717"/>
                 </a:solidFill>
               </a:rPr>
-              <a:t>, 2025].</a:t>
+              <a:t>2025</a:t>
+            </a:r>
+            <a:r>
+              <a:rPr lang="en-IN" sz="11200" dirty="0">
+                <a:solidFill>
+                  <a:srgbClr val="451717"/>
+                </a:solidFill>
+              </a:rPr>
+              <a:t>].</a:t>
             </a:r>
           </a:p>
           <a:p>
@@ -22073,7 +22193,7 @@
               <a:t>://</a:t>
             </a:r>
             <a:r>
-              <a:rPr lang="en-IN" sz="11200" dirty="0" smtClean="0">
+              <a:rPr lang="en-IN" sz="11200" smtClean="0">
                 <a:solidFill>
                   <a:srgbClr val="0000FF"/>
                 </a:solidFill>
@@ -22081,43 +22201,24 @@
               <a:t>www.akgec.ac.in/wp-content/uploads/2024/01/Jan-Jun2022_2.pdf</a:t>
             </a:r>
             <a:r>
-              <a:rPr lang="en-IN" sz="11200" dirty="0" smtClean="0">
+              <a:rPr lang="en-IN" sz="11200" smtClean="0">
                 <a:solidFill>
                   <a:srgbClr val="451717"/>
                 </a:solidFill>
               </a:rPr>
-              <a:t>], </a:t>
-            </a:r>
-            <a:r>
-              <a:rPr lang="en-IN" sz="11200" dirty="0">
-                <a:solidFill>
-                  <a:srgbClr val="451717"/>
-                </a:solidFill>
-              </a:rPr>
-              <a:t>[Accessed: Feb. </a:t>
-            </a:r>
-            <a:r>
-              <a:rPr lang="en-IN" sz="11200" dirty="0" smtClean="0">
-                <a:solidFill>
-                  <a:srgbClr val="451717"/>
-                </a:solidFill>
-              </a:rPr>
-              <a:t>14</a:t>
-            </a:r>
-            <a:r>
-              <a:rPr lang="en-IN" sz="11200" dirty="0">
-                <a:solidFill>
-                  <a:srgbClr val="451717"/>
-                </a:solidFill>
-              </a:rPr>
-              <a:t>, 2025].</a:t>
-            </a:r>
+              <a:t>].</a:t>
+            </a:r>
+            <a:endParaRPr lang="en-IN" sz="11200" dirty="0" smtClean="0">
+              <a:solidFill>
+                <a:srgbClr val="451717"/>
+              </a:solidFill>
+            </a:endParaRPr>
           </a:p>
           <a:p>
             <a:pPr marL="0" indent="0">
               <a:buNone/>
             </a:pPr>
-            <a:endParaRPr lang="en-IN" dirty="0"/>
+            <a:endParaRPr lang="en-IN" dirty="0" smtClean="0"/>
           </a:p>
           <a:p>
             <a:pPr marL="0" indent="0">

</xml_diff>